<commit_message>
összefoglalás + pár apróság
</commit_message>
<xml_diff>
--- a/Dobosy_Kristof_szakdolgozat_2017_GraphEngine_0.pptx
+++ b/Dobosy_Kristof_szakdolgozat_2017_GraphEngine_0.pptx
@@ -6,10 +6,10 @@
     <p:sldMasterId id="2147483655" r:id="rId2"/>
   </p:sldMasterIdLst>
   <p:notesMasterIdLst>
-    <p:notesMasterId r:id="rId23"/>
+    <p:notesMasterId r:id="rId27"/>
   </p:notesMasterIdLst>
   <p:handoutMasterIdLst>
-    <p:handoutMasterId r:id="rId24"/>
+    <p:handoutMasterId r:id="rId28"/>
   </p:handoutMasterIdLst>
   <p:sldIdLst>
     <p:sldId id="304" r:id="rId3"/>
@@ -26,12 +26,16 @@
     <p:sldId id="336" r:id="rId14"/>
     <p:sldId id="344" r:id="rId15"/>
     <p:sldId id="348" r:id="rId16"/>
-    <p:sldId id="345" r:id="rId17"/>
-    <p:sldId id="341" r:id="rId18"/>
-    <p:sldId id="351" r:id="rId19"/>
-    <p:sldId id="352" r:id="rId20"/>
-    <p:sldId id="353" r:id="rId21"/>
-    <p:sldId id="346" r:id="rId22"/>
+    <p:sldId id="357" r:id="rId17"/>
+    <p:sldId id="345" r:id="rId18"/>
+    <p:sldId id="341" r:id="rId19"/>
+    <p:sldId id="354" r:id="rId20"/>
+    <p:sldId id="355" r:id="rId21"/>
+    <p:sldId id="356" r:id="rId22"/>
+    <p:sldId id="351" r:id="rId23"/>
+    <p:sldId id="352" r:id="rId24"/>
+    <p:sldId id="353" r:id="rId25"/>
+    <p:sldId id="358" r:id="rId26"/>
   </p:sldIdLst>
   <p:sldSz cx="9144000" cy="6858000" type="screen4x3"/>
   <p:notesSz cx="6858000" cy="9144000"/>
@@ -149,12 +153,16 @@
             <p14:sldId id="336"/>
             <p14:sldId id="344"/>
             <p14:sldId id="348"/>
+            <p14:sldId id="357"/>
             <p14:sldId id="345"/>
             <p14:sldId id="341"/>
+            <p14:sldId id="354"/>
+            <p14:sldId id="355"/>
+            <p14:sldId id="356"/>
             <p14:sldId id="351"/>
             <p14:sldId id="352"/>
             <p14:sldId id="353"/>
-            <p14:sldId id="346"/>
+            <p14:sldId id="358"/>
           </p14:sldIdLst>
         </p14:section>
       </p14:sectionLst>
@@ -8426,7 +8434,6 @@
             <a:rPr lang="hu-HU"/>
             <a:t>Mérnöki fejlesztési folyamat szimulálása</a:t>
           </a:r>
-          <a:endParaRPr lang="hu-HU"/>
         </a:p>
       </dgm:t>
     </dgm:pt>
@@ -8463,7 +8470,6 @@
             <a:rPr lang="hu-HU"/>
             <a:t>Vasúti elemekből álló modell</a:t>
           </a:r>
-          <a:endParaRPr lang="hu-HU"/>
         </a:p>
       </dgm:t>
     </dgm:pt>
@@ -8500,7 +8506,6 @@
             <a:rPr lang="hu-HU"/>
             <a:t>6 különböző kényszer vizsgálata</a:t>
           </a:r>
-          <a:endParaRPr lang="hu-HU"/>
         </a:p>
       </dgm:t>
     </dgm:pt>
@@ -8537,7 +8542,6 @@
             <a:rPr lang="hu-HU"/>
             <a:t>10 eszközre már elkészült a tesztelés, de Linuxon</a:t>
           </a:r>
-          <a:endParaRPr lang="hu-HU"/>
         </a:p>
       </dgm:t>
     </dgm:pt>
@@ -8574,7 +8578,6 @@
             <a:rPr lang="hu-HU"/>
             <a:t>Különböző forgatókönyvek</a:t>
           </a:r>
-          <a:endParaRPr lang="hu-HU"/>
         </a:p>
       </dgm:t>
     </dgm:pt>
@@ -8716,18 +8719,18 @@
     </dgm:pt>
   </dgm:ptLst>
   <dgm:cxnLst>
+    <dgm:cxn modelId="{DC7D3CDB-B37B-4FB7-969D-9643C50C7519}" srcId="{3C6A0406-5B25-4493-87B2-ECB1AA4A535E}" destId="{50686372-E10C-4468-9638-33EE7AD9AB5A}" srcOrd="1" destOrd="0" parTransId="{AFBF7E3E-A0CE-4430-A33C-9B9FC8120A8D}" sibTransId="{6A608BDD-6A71-4CB7-BCC0-CE3BDFD1F55D}"/>
+    <dgm:cxn modelId="{9DD0649B-C105-438A-8957-2183AF1BCF0D}" srcId="{3C6A0406-5B25-4493-87B2-ECB1AA4A535E}" destId="{C7523A20-B851-4EBE-A754-AD620965643E}" srcOrd="4" destOrd="0" parTransId="{F69A3122-E1F7-453C-8AD5-DFA18964F97E}" sibTransId="{51DF3A8D-E62F-4575-AEBC-98305A734A51}"/>
+    <dgm:cxn modelId="{DB528615-7D92-4E63-9D6B-3CF93B412B37}" type="presOf" srcId="{7ACD33EB-9CEB-4C1C-BE88-7BC95914F7C7}" destId="{D24D3177-94C4-4C3D-A1F7-EBEE9512DF2A}" srcOrd="0" destOrd="0" presId="urn:microsoft.com/office/officeart/2008/layout/VerticalCurvedList"/>
+    <dgm:cxn modelId="{2241D18A-E2F8-458A-B71C-6F45BA8EC025}" type="presOf" srcId="{3C6A0406-5B25-4493-87B2-ECB1AA4A535E}" destId="{E46DB805-9893-415B-AA3D-370C9074F6CC}" srcOrd="0" destOrd="0" presId="urn:microsoft.com/office/officeart/2008/layout/VerticalCurvedList"/>
+    <dgm:cxn modelId="{845C0AD0-11BA-46AC-9C0E-AE595F6BF9EC}" type="presOf" srcId="{50686372-E10C-4468-9638-33EE7AD9AB5A}" destId="{76ECA175-3FB6-43E7-9600-15670A300DE3}" srcOrd="0" destOrd="0" presId="urn:microsoft.com/office/officeart/2008/layout/VerticalCurvedList"/>
+    <dgm:cxn modelId="{C0A45325-FA08-4A89-A62B-E97546EE1D04}" srcId="{3C6A0406-5B25-4493-87B2-ECB1AA4A535E}" destId="{7B1AD26B-E667-4F6C-88B6-4DCA69F4BB0F}" srcOrd="3" destOrd="0" parTransId="{6131106F-22FD-4154-A0B2-3EBE255380E7}" sibTransId="{F6A20EFA-AFD5-4F4A-B639-2D96FB359E48}"/>
+    <dgm:cxn modelId="{77212A71-8CEE-4B62-9194-3739B190B6D8}" type="presOf" srcId="{C7523A20-B851-4EBE-A754-AD620965643E}" destId="{3F708124-61C2-49B7-8B6F-6EB262F1A4F2}" srcOrd="0" destOrd="0" presId="urn:microsoft.com/office/officeart/2008/layout/VerticalCurvedList"/>
+    <dgm:cxn modelId="{00DB7EB4-3333-4A6F-8058-A55044DFD070}" type="presOf" srcId="{84270A7D-CF3D-49E4-8DE2-7D4C2378C546}" destId="{49E9324C-DDFE-4FD7-8C7D-E7394F0314BF}" srcOrd="0" destOrd="0" presId="urn:microsoft.com/office/officeart/2008/layout/VerticalCurvedList"/>
+    <dgm:cxn modelId="{3A7AE555-BEE5-4102-8717-6A8C7EAC7221}" type="presOf" srcId="{7B1AD26B-E667-4F6C-88B6-4DCA69F4BB0F}" destId="{E9B5148A-7669-466F-8030-6CEAA8E1559A}" srcOrd="0" destOrd="0" presId="urn:microsoft.com/office/officeart/2008/layout/VerticalCurvedList"/>
+    <dgm:cxn modelId="{88C92535-08AF-4BA5-9FBD-7F9F5903E036}" srcId="{3C6A0406-5B25-4493-87B2-ECB1AA4A535E}" destId="{DE8E82F2-CEFD-41B4-B1B5-84C86D86324C}" srcOrd="2" destOrd="0" parTransId="{194FC275-A374-48E1-BA77-3C6C5A026B18}" sibTransId="{B02D8492-9D52-4183-8CE7-B0D60F6B962E}"/>
     <dgm:cxn modelId="{BD99F68D-B960-47F3-B067-3B986613DFFD}" srcId="{3C6A0406-5B25-4493-87B2-ECB1AA4A535E}" destId="{7ACD33EB-9CEB-4C1C-BE88-7BC95914F7C7}" srcOrd="0" destOrd="0" parTransId="{573C5A9C-AF10-43D7-A4A6-70ABFF6EE233}" sibTransId="{84270A7D-CF3D-49E4-8DE2-7D4C2378C546}"/>
     <dgm:cxn modelId="{2F9CE21D-18E5-4E5B-854F-4F6B9C21C437}" type="presOf" srcId="{DE8E82F2-CEFD-41B4-B1B5-84C86D86324C}" destId="{2063E44D-849B-455C-8F4A-DBAF33E522B2}" srcOrd="0" destOrd="0" presId="urn:microsoft.com/office/officeart/2008/layout/VerticalCurvedList"/>
-    <dgm:cxn modelId="{845C0AD0-11BA-46AC-9C0E-AE595F6BF9EC}" type="presOf" srcId="{50686372-E10C-4468-9638-33EE7AD9AB5A}" destId="{76ECA175-3FB6-43E7-9600-15670A300DE3}" srcOrd="0" destOrd="0" presId="urn:microsoft.com/office/officeart/2008/layout/VerticalCurvedList"/>
-    <dgm:cxn modelId="{88C92535-08AF-4BA5-9FBD-7F9F5903E036}" srcId="{3C6A0406-5B25-4493-87B2-ECB1AA4A535E}" destId="{DE8E82F2-CEFD-41B4-B1B5-84C86D86324C}" srcOrd="2" destOrd="0" parTransId="{194FC275-A374-48E1-BA77-3C6C5A026B18}" sibTransId="{B02D8492-9D52-4183-8CE7-B0D60F6B962E}"/>
-    <dgm:cxn modelId="{9DD0649B-C105-438A-8957-2183AF1BCF0D}" srcId="{3C6A0406-5B25-4493-87B2-ECB1AA4A535E}" destId="{C7523A20-B851-4EBE-A754-AD620965643E}" srcOrd="4" destOrd="0" parTransId="{F69A3122-E1F7-453C-8AD5-DFA18964F97E}" sibTransId="{51DF3A8D-E62F-4575-AEBC-98305A734A51}"/>
-    <dgm:cxn modelId="{C0A45325-FA08-4A89-A62B-E97546EE1D04}" srcId="{3C6A0406-5B25-4493-87B2-ECB1AA4A535E}" destId="{7B1AD26B-E667-4F6C-88B6-4DCA69F4BB0F}" srcOrd="3" destOrd="0" parTransId="{6131106F-22FD-4154-A0B2-3EBE255380E7}" sibTransId="{F6A20EFA-AFD5-4F4A-B639-2D96FB359E48}"/>
-    <dgm:cxn modelId="{3A7AE555-BEE5-4102-8717-6A8C7EAC7221}" type="presOf" srcId="{7B1AD26B-E667-4F6C-88B6-4DCA69F4BB0F}" destId="{E9B5148A-7669-466F-8030-6CEAA8E1559A}" srcOrd="0" destOrd="0" presId="urn:microsoft.com/office/officeart/2008/layout/VerticalCurvedList"/>
-    <dgm:cxn modelId="{77212A71-8CEE-4B62-9194-3739B190B6D8}" type="presOf" srcId="{C7523A20-B851-4EBE-A754-AD620965643E}" destId="{3F708124-61C2-49B7-8B6F-6EB262F1A4F2}" srcOrd="0" destOrd="0" presId="urn:microsoft.com/office/officeart/2008/layout/VerticalCurvedList"/>
-    <dgm:cxn modelId="{DB528615-7D92-4E63-9D6B-3CF93B412B37}" type="presOf" srcId="{7ACD33EB-9CEB-4C1C-BE88-7BC95914F7C7}" destId="{D24D3177-94C4-4C3D-A1F7-EBEE9512DF2A}" srcOrd="0" destOrd="0" presId="urn:microsoft.com/office/officeart/2008/layout/VerticalCurvedList"/>
-    <dgm:cxn modelId="{00DB7EB4-3333-4A6F-8058-A55044DFD070}" type="presOf" srcId="{84270A7D-CF3D-49E4-8DE2-7D4C2378C546}" destId="{49E9324C-DDFE-4FD7-8C7D-E7394F0314BF}" srcOrd="0" destOrd="0" presId="urn:microsoft.com/office/officeart/2008/layout/VerticalCurvedList"/>
-    <dgm:cxn modelId="{2241D18A-E2F8-458A-B71C-6F45BA8EC025}" type="presOf" srcId="{3C6A0406-5B25-4493-87B2-ECB1AA4A535E}" destId="{E46DB805-9893-415B-AA3D-370C9074F6CC}" srcOrd="0" destOrd="0" presId="urn:microsoft.com/office/officeart/2008/layout/VerticalCurvedList"/>
-    <dgm:cxn modelId="{DC7D3CDB-B37B-4FB7-969D-9643C50C7519}" srcId="{3C6A0406-5B25-4493-87B2-ECB1AA4A535E}" destId="{50686372-E10C-4468-9638-33EE7AD9AB5A}" srcOrd="1" destOrd="0" parTransId="{AFBF7E3E-A0CE-4430-A33C-9B9FC8120A8D}" sibTransId="{6A608BDD-6A71-4CB7-BCC0-CE3BDFD1F55D}"/>
     <dgm:cxn modelId="{DCE30EEB-E672-4928-A60A-922B7F54903C}" type="presParOf" srcId="{E46DB805-9893-415B-AA3D-370C9074F6CC}" destId="{D7C25E50-E66B-4EA7-90D9-115519B0E2A9}" srcOrd="0" destOrd="0" presId="urn:microsoft.com/office/officeart/2008/layout/VerticalCurvedList"/>
     <dgm:cxn modelId="{07F67719-C638-425B-9B67-A1E31EA8CB1D}" type="presParOf" srcId="{D7C25E50-E66B-4EA7-90D9-115519B0E2A9}" destId="{F5CC97F0-BBB6-44D5-A958-61430C7CD04B}" srcOrd="0" destOrd="0" presId="urn:microsoft.com/office/officeart/2008/layout/VerticalCurvedList"/>
     <dgm:cxn modelId="{3F81CBE2-7325-4722-8F0E-31A0613F5F0D}" type="presParOf" srcId="{F5CC97F0-BBB6-44D5-A958-61430C7CD04B}" destId="{A93EA9A7-EAE2-4E28-82B0-15E83EB41696}" srcOrd="0" destOrd="0" presId="urn:microsoft.com/office/officeart/2008/layout/VerticalCurvedList"/>
@@ -9629,11 +9632,6 @@
             </a:rPr>
             <a:t>Egy solution, két project</a:t>
           </a:r>
-          <a:endParaRPr lang="hu-HU">
-            <a:solidFill>
-              <a:schemeClr val="tx1"/>
-            </a:solidFill>
-          </a:endParaRPr>
         </a:p>
       </dgm:t>
     </dgm:pt>
@@ -9683,11 +9681,6 @@
             </a:rPr>
             <a:t>TSL nyelv az adattípusok leírására</a:t>
           </a:r>
-          <a:endParaRPr lang="hu-HU">
-            <a:solidFill>
-              <a:schemeClr val="tx1"/>
-            </a:solidFill>
-          </a:endParaRPr>
         </a:p>
       </dgm:t>
     </dgm:pt>
@@ -9737,11 +9730,6 @@
             </a:rPr>
             <a:t>C# az adateléréshez és manipulációhoz</a:t>
           </a:r>
-          <a:endParaRPr lang="hu-HU">
-            <a:solidFill>
-              <a:schemeClr val="tx1"/>
-            </a:solidFill>
-          </a:endParaRPr>
         </a:p>
       </dgm:t>
     </dgm:pt>
@@ -9791,11 +9779,6 @@
             </a:rPr>
             <a:t>Accessorok</a:t>
           </a:r>
-          <a:endParaRPr lang="hu-HU">
-            <a:solidFill>
-              <a:schemeClr val="tx1"/>
-            </a:solidFill>
-          </a:endParaRPr>
         </a:p>
       </dgm:t>
     </dgm:pt>
@@ -9845,11 +9828,6 @@
             </a:rPr>
             <a:t>Automatikus</a:t>
           </a:r>
-          <a:endParaRPr lang="hu-HU">
-            <a:solidFill>
-              <a:schemeClr val="tx1"/>
-            </a:solidFill>
-          </a:endParaRPr>
         </a:p>
       </dgm:t>
     </dgm:pt>
@@ -9899,11 +9877,6 @@
             </a:rPr>
             <a:t>Objektum-orientált</a:t>
           </a:r>
-          <a:endParaRPr lang="hu-HU">
-            <a:solidFill>
-              <a:schemeClr val="tx1"/>
-            </a:solidFill>
-          </a:endParaRPr>
         </a:p>
       </dgm:t>
     </dgm:pt>
@@ -9946,18 +9919,13 @@
         <a:lstStyle/>
         <a:p>
           <a:r>
-            <a:rPr lang="hu-HU">
+            <a:rPr lang="hu-HU" dirty="0">
               <a:solidFill>
                 <a:schemeClr val="tx1"/>
               </a:solidFill>
             </a:rPr>
             <a:t>LINQ támogatott, de vannak nehézségek</a:t>
           </a:r>
-          <a:endParaRPr lang="hu-HU">
-            <a:solidFill>
-              <a:schemeClr val="tx1"/>
-            </a:solidFill>
-          </a:endParaRPr>
         </a:p>
       </dgm:t>
     </dgm:pt>
@@ -10109,10 +10077,10 @@
     <dgm:cxn modelId="{340BFD6F-2A4E-45EC-9A09-87FB125A6FE0}" srcId="{9AEBEADD-A158-44AC-A8B1-37196740370A}" destId="{BAF34BA6-557A-4FFB-8080-BD3526B42C23}" srcOrd="1" destOrd="0" parTransId="{895FD5C0-9B69-4120-8CD1-601A306365D4}" sibTransId="{C140254E-8C5B-402A-BBC6-CAFCC575BE15}"/>
     <dgm:cxn modelId="{E7480826-4FA7-4731-94B8-400E8F248B0E}" type="presOf" srcId="{9AEBEADD-A158-44AC-A8B1-37196740370A}" destId="{C91565F3-9A7D-49FA-98C3-66325EAE31E9}" srcOrd="0" destOrd="0" presId="urn:microsoft.com/office/officeart/2005/8/layout/vList3"/>
     <dgm:cxn modelId="{7EB72467-11FF-447D-A643-265FB1B694C6}" srcId="{F744667D-9EAC-4635-B19C-677F7FF7D6E9}" destId="{C67636D4-2108-47FC-9CCD-68F9605092F8}" srcOrd="0" destOrd="0" parTransId="{AF4452BD-6AA9-4F7F-8DF5-58E7878AA545}" sibTransId="{90949A4F-B563-420C-9510-DF9E1049628E}"/>
+    <dgm:cxn modelId="{A1E4DFE9-67D1-496B-B694-76B2583D8D65}" srcId="{9AEBEADD-A158-44AC-A8B1-37196740370A}" destId="{72E20752-77DF-4CD3-81BB-68DCBE395620}" srcOrd="0" destOrd="0" parTransId="{BCB32C09-F157-4665-836C-0C6539AA600C}" sibTransId="{6876DCEF-8765-46D8-A8FB-D59FD70E80DF}"/>
     <dgm:cxn modelId="{0F20975C-F055-4D16-AF2C-7E679FDFEF15}" type="presOf" srcId="{F744667D-9EAC-4635-B19C-677F7FF7D6E9}" destId="{8D2648AE-58B5-4360-BBFA-E4C1937A8744}" srcOrd="0" destOrd="0" presId="urn:microsoft.com/office/officeart/2005/8/layout/vList3"/>
-    <dgm:cxn modelId="{A1E4DFE9-67D1-496B-B694-76B2583D8D65}" srcId="{9AEBEADD-A158-44AC-A8B1-37196740370A}" destId="{72E20752-77DF-4CD3-81BB-68DCBE395620}" srcOrd="0" destOrd="0" parTransId="{BCB32C09-F157-4665-836C-0C6539AA600C}" sibTransId="{6876DCEF-8765-46D8-A8FB-D59FD70E80DF}"/>
+    <dgm:cxn modelId="{4CA08725-21F5-4239-854D-D3951DAC3E35}" type="presOf" srcId="{189535F7-B33F-40B1-B49F-83A80D5B7D3C}" destId="{7722CB89-D9F2-4618-B968-2DD99C77C2D7}" srcOrd="0" destOrd="0" presId="urn:microsoft.com/office/officeart/2005/8/layout/vList3"/>
     <dgm:cxn modelId="{708C4CC9-9CE2-409C-AA33-B4B9AA5BA19F}" type="presOf" srcId="{BAF34BA6-557A-4FFB-8080-BD3526B42C23}" destId="{C91565F3-9A7D-49FA-98C3-66325EAE31E9}" srcOrd="0" destOrd="2" presId="urn:microsoft.com/office/officeart/2005/8/layout/vList3"/>
-    <dgm:cxn modelId="{4CA08725-21F5-4239-854D-D3951DAC3E35}" type="presOf" srcId="{189535F7-B33F-40B1-B49F-83A80D5B7D3C}" destId="{7722CB89-D9F2-4618-B968-2DD99C77C2D7}" srcOrd="0" destOrd="0" presId="urn:microsoft.com/office/officeart/2005/8/layout/vList3"/>
     <dgm:cxn modelId="{CB05FAE3-36CC-432E-B6EE-0216C55D3776}" type="presOf" srcId="{6874EA52-DECD-4D01-8229-3024A4A15635}" destId="{8D2648AE-58B5-4360-BBFA-E4C1937A8744}" srcOrd="0" destOrd="2" presId="urn:microsoft.com/office/officeart/2005/8/layout/vList3"/>
     <dgm:cxn modelId="{89A3745C-DBD2-4772-AFDF-225B2728B256}" srcId="{D84C4589-E1B2-42B5-BEBB-BC07DFC7967A}" destId="{189535F7-B33F-40B1-B49F-83A80D5B7D3C}" srcOrd="3" destOrd="0" parTransId="{F787BD31-307F-4928-9C37-F3C7F74F76F9}" sibTransId="{A9BCF6CD-E4A5-4C18-9BF7-4677097F36CE}"/>
     <dgm:cxn modelId="{6FEB866C-67E9-4208-9649-3464A09BF337}" type="presOf" srcId="{D84C4589-E1B2-42B5-BEBB-BC07DFC7967A}" destId="{CF9BC7D5-350D-4D8B-825E-8E40B96F6C3C}" srcOrd="0" destOrd="0" presId="urn:microsoft.com/office/officeart/2005/8/layout/vList3"/>
@@ -10173,7 +10141,6 @@
             <a:rPr lang="hu-HU"/>
             <a:t>Két eszközteszt futtatása Windows környezetben</a:t>
           </a:r>
-          <a:endParaRPr lang="hu-HU"/>
         </a:p>
       </dgm:t>
     </dgm:pt>
@@ -10210,7 +10177,6 @@
             <a:rPr lang="hu-HU"/>
             <a:t>RDF4J &amp; Jena</a:t>
           </a:r>
-          <a:endParaRPr lang="hu-HU"/>
         </a:p>
       </dgm:t>
     </dgm:pt>
@@ -10247,7 +10213,6 @@
             <a:rPr lang="hu-HU"/>
             <a:t>Train Benchmark forgatókönyvek implementálása a Graph Engine használatával</a:t>
           </a:r>
-          <a:endParaRPr lang="hu-HU"/>
         </a:p>
       </dgm:t>
     </dgm:pt>
@@ -10284,7 +10249,6 @@
             <a:rPr lang="hu-HU"/>
             <a:t>6-ból 2 kényszer</a:t>
           </a:r>
-          <a:endParaRPr lang="hu-HU"/>
         </a:p>
       </dgm:t>
     </dgm:pt>
@@ -10321,7 +10285,6 @@
             <a:rPr lang="hu-HU"/>
             <a:t>Különböző méretű modelleken</a:t>
           </a:r>
-          <a:endParaRPr lang="hu-HU"/>
         </a:p>
       </dgm:t>
     </dgm:pt>
@@ -10358,7 +10321,6 @@
             <a:rPr lang="hu-HU"/>
             <a:t>Kb. 5000 - 2,3 millió elem</a:t>
           </a:r>
-          <a:endParaRPr lang="hu-HU"/>
         </a:p>
       </dgm:t>
     </dgm:pt>
@@ -10481,7 +10443,7 @@
   <dgm:whole/>
   <dgm:extLst>
     <a:ext uri="http://schemas.microsoft.com/office/drawing/2008/diagram">
-      <dsp:dataModelExt xmlns:dsp="http://schemas.microsoft.com/office/drawing/2008/diagram" relId="rId7" minVer="http://schemas.openxmlformats.org/drawingml/2006/diagram"/>
+      <dsp:dataModelExt xmlns:dsp="http://schemas.microsoft.com/office/drawing/2008/diagram" relId="rId8" minVer="http://schemas.openxmlformats.org/drawingml/2006/diagram"/>
     </a:ext>
   </dgm:extLst>
 </dgm:dataModel>
@@ -11116,21 +11078,21 @@
     </dgm:pt>
   </dgm:ptLst>
   <dgm:cxnLst>
+    <dgm:cxn modelId="{260E1E07-3643-4612-8020-102596171EDE}" type="presOf" srcId="{BED8E5D3-9B08-47FD-87A3-93717DBBD3C3}" destId="{70A80EEA-7031-44FA-873F-826F837E98A5}" srcOrd="0" destOrd="0" presId="urn:microsoft.com/office/officeart/2005/8/layout/vList2"/>
+    <dgm:cxn modelId="{2A9E9735-23AD-46CB-8EA5-1EB279B466C0}" type="presOf" srcId="{59D516C2-7DE6-48A3-A42D-B3FE85DB3394}" destId="{51DD6D3B-5562-4A8B-B8FD-0B9BEDF08F4C}" srcOrd="0" destOrd="0" presId="urn:microsoft.com/office/officeart/2005/8/layout/vList2"/>
+    <dgm:cxn modelId="{125DBBC5-FC10-461E-85A3-DBB46673ACDF}" srcId="{59D516C2-7DE6-48A3-A42D-B3FE85DB3394}" destId="{50478BC3-7606-4B57-9F76-97C6D3D64996}" srcOrd="1" destOrd="0" parTransId="{F83CBFAB-DFD3-49AB-99B9-59C9EAAA7F55}" sibTransId="{48F0E2E8-B35A-4599-B846-3B6DE4046CED}"/>
+    <dgm:cxn modelId="{7B1A9E83-8DCB-4021-9D14-03CB7B08913C}" srcId="{E50F85DD-BB31-4E24-AC36-35BBDC41352E}" destId="{148A1843-5D27-4CE4-AB3C-73808D9F71BC}" srcOrd="0" destOrd="0" parTransId="{D717F117-E474-4483-990B-092E942C5D52}" sibTransId="{81CB20B6-29F3-425C-8B2E-DAD654A79105}"/>
+    <dgm:cxn modelId="{D53F0562-23F4-4EF1-AA41-63F7342212AA}" srcId="{BED8E5D3-9B08-47FD-87A3-93717DBBD3C3}" destId="{59D516C2-7DE6-48A3-A42D-B3FE85DB3394}" srcOrd="0" destOrd="0" parTransId="{86FE2646-2DE2-455F-BDCB-1A3D16AF24D7}" sibTransId="{BDE7162B-4F4E-4832-97C5-FDED38AAF779}"/>
     <dgm:cxn modelId="{2B4FE169-B4F8-478B-9B72-277AB372D9D8}" srcId="{BED8E5D3-9B08-47FD-87A3-93717DBBD3C3}" destId="{0BBABD46-440E-4FB7-B3B2-04336E0A6FD7}" srcOrd="1" destOrd="0" parTransId="{7181549E-85C7-4DE0-A28D-439A60CB787E}" sibTransId="{10B6B0EA-1F90-4396-9212-AE757B915F1D}"/>
-    <dgm:cxn modelId="{EBEA21B5-7F25-4F68-9C4D-2D3BFDFA19DB}" type="presOf" srcId="{07D9BDC5-00EA-4C21-AEDF-A04FC4A0DF96}" destId="{CFDB7E57-D6E0-49A6-B7E9-B7D9A5285696}" srcOrd="0" destOrd="0" presId="urn:microsoft.com/office/officeart/2005/8/layout/vList2"/>
-    <dgm:cxn modelId="{2A9E9735-23AD-46CB-8EA5-1EB279B466C0}" type="presOf" srcId="{59D516C2-7DE6-48A3-A42D-B3FE85DB3394}" destId="{51DD6D3B-5562-4A8B-B8FD-0B9BEDF08F4C}" srcOrd="0" destOrd="0" presId="urn:microsoft.com/office/officeart/2005/8/layout/vList2"/>
-    <dgm:cxn modelId="{F40CDAD4-731A-4844-85FB-4AC6F363ED54}" srcId="{59D516C2-7DE6-48A3-A42D-B3FE85DB3394}" destId="{653AD1D0-B6C7-4F64-931F-EE917382B7CC}" srcOrd="2" destOrd="0" parTransId="{BCEE53CF-215A-4893-A1F0-1F0CFC14C48F}" sibTransId="{4AA8C3E2-8CE0-492C-9950-A1A10FD643D3}"/>
+    <dgm:cxn modelId="{90D9E84B-EB68-44D9-9C17-50E3883C90B4}" type="presOf" srcId="{E50F85DD-BB31-4E24-AC36-35BBDC41352E}" destId="{645128F0-9A6F-4D8B-A5BA-3926BB625618}" srcOrd="0" destOrd="0" presId="urn:microsoft.com/office/officeart/2005/8/layout/vList2"/>
     <dgm:cxn modelId="{0C9C4AEE-1D78-446F-A0DD-ECBA8B2EBD40}" type="presOf" srcId="{653AD1D0-B6C7-4F64-931F-EE917382B7CC}" destId="{CFDB7E57-D6E0-49A6-B7E9-B7D9A5285696}" srcOrd="0" destOrd="2" presId="urn:microsoft.com/office/officeart/2005/8/layout/vList2"/>
     <dgm:cxn modelId="{908D2EB9-8B08-4C3B-8A82-FD04223E5AC8}" type="presOf" srcId="{0BBABD46-440E-4FB7-B3B2-04336E0A6FD7}" destId="{68C47070-41EC-4ED1-AF7F-44B161B18174}" srcOrd="0" destOrd="0" presId="urn:microsoft.com/office/officeart/2005/8/layout/vList2"/>
-    <dgm:cxn modelId="{125DBBC5-FC10-461E-85A3-DBB46673ACDF}" srcId="{59D516C2-7DE6-48A3-A42D-B3FE85DB3394}" destId="{50478BC3-7606-4B57-9F76-97C6D3D64996}" srcOrd="1" destOrd="0" parTransId="{F83CBFAB-DFD3-49AB-99B9-59C9EAAA7F55}" sibTransId="{48F0E2E8-B35A-4599-B846-3B6DE4046CED}"/>
-    <dgm:cxn modelId="{D53F0562-23F4-4EF1-AA41-63F7342212AA}" srcId="{BED8E5D3-9B08-47FD-87A3-93717DBBD3C3}" destId="{59D516C2-7DE6-48A3-A42D-B3FE85DB3394}" srcOrd="0" destOrd="0" parTransId="{86FE2646-2DE2-455F-BDCB-1A3D16AF24D7}" sibTransId="{BDE7162B-4F4E-4832-97C5-FDED38AAF779}"/>
-    <dgm:cxn modelId="{7B1A9E83-8DCB-4021-9D14-03CB7B08913C}" srcId="{E50F85DD-BB31-4E24-AC36-35BBDC41352E}" destId="{148A1843-5D27-4CE4-AB3C-73808D9F71BC}" srcOrd="0" destOrd="0" parTransId="{D717F117-E474-4483-990B-092E942C5D52}" sibTransId="{81CB20B6-29F3-425C-8B2E-DAD654A79105}"/>
+    <dgm:cxn modelId="{A609724F-AFC5-4EFD-9FE3-5266BBE01D6C}" srcId="{BED8E5D3-9B08-47FD-87A3-93717DBBD3C3}" destId="{E50F85DD-BB31-4E24-AC36-35BBDC41352E}" srcOrd="2" destOrd="0" parTransId="{8F091D5F-CDFC-4C19-B1E0-88862171967F}" sibTransId="{4401B9B4-9513-4B5C-B807-ADBCF01C501C}"/>
+    <dgm:cxn modelId="{F40CDAD4-731A-4844-85FB-4AC6F363ED54}" srcId="{59D516C2-7DE6-48A3-A42D-B3FE85DB3394}" destId="{653AD1D0-B6C7-4F64-931F-EE917382B7CC}" srcOrd="2" destOrd="0" parTransId="{BCEE53CF-215A-4893-A1F0-1F0CFC14C48F}" sibTransId="{4AA8C3E2-8CE0-492C-9950-A1A10FD643D3}"/>
+    <dgm:cxn modelId="{EBEA21B5-7F25-4F68-9C4D-2D3BFDFA19DB}" type="presOf" srcId="{07D9BDC5-00EA-4C21-AEDF-A04FC4A0DF96}" destId="{CFDB7E57-D6E0-49A6-B7E9-B7D9A5285696}" srcOrd="0" destOrd="0" presId="urn:microsoft.com/office/officeart/2005/8/layout/vList2"/>
     <dgm:cxn modelId="{12681E7A-66D4-4E5A-9FD2-615976620D68}" type="presOf" srcId="{148A1843-5D27-4CE4-AB3C-73808D9F71BC}" destId="{99B1203C-E356-4BF4-BBCE-D920F1B6277C}" srcOrd="0" destOrd="0" presId="urn:microsoft.com/office/officeart/2005/8/layout/vList2"/>
-    <dgm:cxn modelId="{A609724F-AFC5-4EFD-9FE3-5266BBE01D6C}" srcId="{BED8E5D3-9B08-47FD-87A3-93717DBBD3C3}" destId="{E50F85DD-BB31-4E24-AC36-35BBDC41352E}" srcOrd="2" destOrd="0" parTransId="{8F091D5F-CDFC-4C19-B1E0-88862171967F}" sibTransId="{4401B9B4-9513-4B5C-B807-ADBCF01C501C}"/>
-    <dgm:cxn modelId="{260E1E07-3643-4612-8020-102596171EDE}" type="presOf" srcId="{BED8E5D3-9B08-47FD-87A3-93717DBBD3C3}" destId="{70A80EEA-7031-44FA-873F-826F837E98A5}" srcOrd="0" destOrd="0" presId="urn:microsoft.com/office/officeart/2005/8/layout/vList2"/>
+    <dgm:cxn modelId="{186A8167-39F5-4D09-8C1E-BF5615B1F12C}" srcId="{59D516C2-7DE6-48A3-A42D-B3FE85DB3394}" destId="{07D9BDC5-00EA-4C21-AEDF-A04FC4A0DF96}" srcOrd="0" destOrd="0" parTransId="{42AEE6DA-8C94-4B40-87AF-EC195697F156}" sibTransId="{071F226E-3A3E-4999-BE72-C8BED6546FD2}"/>
     <dgm:cxn modelId="{0E10F5BD-C6E6-4298-B5FC-2CF099F2AB60}" type="presOf" srcId="{50478BC3-7606-4B57-9F76-97C6D3D64996}" destId="{CFDB7E57-D6E0-49A6-B7E9-B7D9A5285696}" srcOrd="0" destOrd="1" presId="urn:microsoft.com/office/officeart/2005/8/layout/vList2"/>
-    <dgm:cxn modelId="{186A8167-39F5-4D09-8C1E-BF5615B1F12C}" srcId="{59D516C2-7DE6-48A3-A42D-B3FE85DB3394}" destId="{07D9BDC5-00EA-4C21-AEDF-A04FC4A0DF96}" srcOrd="0" destOrd="0" parTransId="{42AEE6DA-8C94-4B40-87AF-EC195697F156}" sibTransId="{071F226E-3A3E-4999-BE72-C8BED6546FD2}"/>
-    <dgm:cxn modelId="{90D9E84B-EB68-44D9-9C17-50E3883C90B4}" type="presOf" srcId="{E50F85DD-BB31-4E24-AC36-35BBDC41352E}" destId="{645128F0-9A6F-4D8B-A5BA-3926BB625618}" srcOrd="0" destOrd="0" presId="urn:microsoft.com/office/officeart/2005/8/layout/vList2"/>
     <dgm:cxn modelId="{78D15F8F-9DC4-41C2-9300-3B4B5950BDB3}" type="presParOf" srcId="{70A80EEA-7031-44FA-873F-826F837E98A5}" destId="{51DD6D3B-5562-4A8B-B8FD-0B9BEDF08F4C}" srcOrd="0" destOrd="0" presId="urn:microsoft.com/office/officeart/2005/8/layout/vList2"/>
     <dgm:cxn modelId="{C3A93341-D36E-4DA1-ADEB-80DFDA55A10F}" type="presParOf" srcId="{70A80EEA-7031-44FA-873F-826F837E98A5}" destId="{CFDB7E57-D6E0-49A6-B7E9-B7D9A5285696}" srcOrd="1" destOrd="0" presId="urn:microsoft.com/office/officeart/2005/8/layout/vList2"/>
     <dgm:cxn modelId="{F7085396-A2F4-416D-BEB8-58007FD106CD}" type="presParOf" srcId="{70A80EEA-7031-44FA-873F-826F837E98A5}" destId="{68C47070-41EC-4ED1-AF7F-44B161B18174}" srcOrd="2" destOrd="0" presId="urn:microsoft.com/office/officeart/2005/8/layout/vList2"/>
@@ -11142,7 +11104,7 @@
   <dgm:whole/>
   <dgm:extLst>
     <a:ext uri="http://schemas.microsoft.com/office/drawing/2008/diagram">
-      <dsp:dataModelExt xmlns:dsp="http://schemas.microsoft.com/office/drawing/2008/diagram" relId="rId7" minVer="http://schemas.openxmlformats.org/drawingml/2006/diagram"/>
+      <dsp:dataModelExt xmlns:dsp="http://schemas.microsoft.com/office/drawing/2008/diagram" relId="rId8" minVer="http://schemas.openxmlformats.org/drawingml/2006/diagram"/>
     </a:ext>
   </dgm:extLst>
 </dgm:dataModel>
@@ -11577,13 +11539,13 @@
     </dgm:pt>
   </dgm:ptLst>
   <dgm:cxnLst>
+    <dgm:cxn modelId="{892DA55A-C697-4689-BF5D-93CD045D601F}" srcId="{5AD29136-70F2-4E26-AC4B-F108117A7F45}" destId="{E5B29A56-0376-4CCE-8889-407D20A46EA6}" srcOrd="0" destOrd="0" parTransId="{1FC070CB-05AB-46EB-930B-2DE6A76D114B}" sibTransId="{C0E07BF3-86C5-4235-B48E-B026A0423383}"/>
+    <dgm:cxn modelId="{FBF5BA4C-8703-49C2-9774-0691F02B7409}" srcId="{5AD29136-70F2-4E26-AC4B-F108117A7F45}" destId="{714E1E44-AE4D-447A-A199-0FD725DA4AA4}" srcOrd="2" destOrd="0" parTransId="{ED0B0D1F-229D-45D5-B377-B04E0C0DC99E}" sibTransId="{817793A9-1D59-4764-B9F7-C97A516F1721}"/>
     <dgm:cxn modelId="{5DB2C305-11BB-430C-8488-439ED36F6963}" type="presOf" srcId="{E5B29A56-0376-4CCE-8889-407D20A46EA6}" destId="{79FF8779-D8EA-493D-BDFC-2F7968CC6758}" srcOrd="0" destOrd="0" presId="urn:microsoft.com/office/officeart/2008/layout/LinedList"/>
     <dgm:cxn modelId="{B8A1A20C-C0EF-4F67-BB78-1F296165B796}" type="presOf" srcId="{5AD29136-70F2-4E26-AC4B-F108117A7F45}" destId="{64FB84C1-4CA0-46A8-9EDE-DCCFD954D105}" srcOrd="0" destOrd="0" presId="urn:microsoft.com/office/officeart/2008/layout/LinedList"/>
-    <dgm:cxn modelId="{906EF375-2F0E-42AD-A0C2-40F40E196A19}" srcId="{5AD29136-70F2-4E26-AC4B-F108117A7F45}" destId="{BA85E6C5-BCCA-45F7-8CB8-F25209F0350A}" srcOrd="1" destOrd="0" parTransId="{3A17ED02-B51F-432D-A68E-9BFDD49270EC}" sibTransId="{A5EF6AF7-B2B0-4FCE-A85F-7F6D1F473A62}"/>
     <dgm:cxn modelId="{923954E8-A875-49E0-A1D1-9C7DB384DCE6}" type="presOf" srcId="{BA85E6C5-BCCA-45F7-8CB8-F25209F0350A}" destId="{262821EF-0938-437C-942E-FAAA2EAE23D8}" srcOrd="0" destOrd="0" presId="urn:microsoft.com/office/officeart/2008/layout/LinedList"/>
     <dgm:cxn modelId="{C5ACC972-F8C2-436F-8FFC-1230BC281D80}" type="presOf" srcId="{714E1E44-AE4D-447A-A199-0FD725DA4AA4}" destId="{5EB6F963-6CB3-4690-908C-7FFDC9C49028}" srcOrd="0" destOrd="0" presId="urn:microsoft.com/office/officeart/2008/layout/LinedList"/>
-    <dgm:cxn modelId="{FBF5BA4C-8703-49C2-9774-0691F02B7409}" srcId="{5AD29136-70F2-4E26-AC4B-F108117A7F45}" destId="{714E1E44-AE4D-447A-A199-0FD725DA4AA4}" srcOrd="2" destOrd="0" parTransId="{ED0B0D1F-229D-45D5-B377-B04E0C0DC99E}" sibTransId="{817793A9-1D59-4764-B9F7-C97A516F1721}"/>
-    <dgm:cxn modelId="{892DA55A-C697-4689-BF5D-93CD045D601F}" srcId="{5AD29136-70F2-4E26-AC4B-F108117A7F45}" destId="{E5B29A56-0376-4CCE-8889-407D20A46EA6}" srcOrd="0" destOrd="0" parTransId="{1FC070CB-05AB-46EB-930B-2DE6A76D114B}" sibTransId="{C0E07BF3-86C5-4235-B48E-B026A0423383}"/>
+    <dgm:cxn modelId="{906EF375-2F0E-42AD-A0C2-40F40E196A19}" srcId="{5AD29136-70F2-4E26-AC4B-F108117A7F45}" destId="{BA85E6C5-BCCA-45F7-8CB8-F25209F0350A}" srcOrd="1" destOrd="0" parTransId="{3A17ED02-B51F-432D-A68E-9BFDD49270EC}" sibTransId="{A5EF6AF7-B2B0-4FCE-A85F-7F6D1F473A62}"/>
     <dgm:cxn modelId="{9B357918-9A02-4F06-9811-1F5C1BEB7FD1}" type="presParOf" srcId="{64FB84C1-4CA0-46A8-9EDE-DCCFD954D105}" destId="{E312A998-FA04-4108-8C00-F575E1EE9FBE}" srcOrd="0" destOrd="0" presId="urn:microsoft.com/office/officeart/2008/layout/LinedList"/>
     <dgm:cxn modelId="{CBD48735-191A-4D57-897D-B469D686B253}" type="presParOf" srcId="{64FB84C1-4CA0-46A8-9EDE-DCCFD954D105}" destId="{2FA46673-1817-4D87-83DD-138B1B6161E8}" srcOrd="1" destOrd="0" presId="urn:microsoft.com/office/officeart/2008/layout/LinedList"/>
     <dgm:cxn modelId="{F4B2315E-E494-4E35-B473-5CC91CDC3D8A}" type="presParOf" srcId="{2FA46673-1817-4D87-83DD-138B1B6161E8}" destId="{79FF8779-D8EA-493D-BDFC-2F7968CC6758}" srcOrd="0" destOrd="0" presId="urn:microsoft.com/office/officeart/2008/layout/LinedList"/>
@@ -11661,7 +11623,10 @@
             <a:rPr lang="en-US" sz="2400" dirty="0" err="1"/>
             <a:t>lehet</a:t>
           </a:r>
-          <a:endParaRPr lang="hu-HU" sz="2400" dirty="0"/>
+          <a:r>
+            <a:rPr lang="hu-HU" sz="2400" dirty="0"/>
+            <a:t>, de nem minden szempontból</a:t>
+          </a:r>
         </a:p>
       </dgm:t>
     </dgm:pt>
@@ -11753,48 +11718,6 @@
         </a:p>
       </dgm:t>
     </dgm:pt>
-    <dgm:pt modelId="{17B1F2AB-9CCE-4CE2-90B1-CC7E523DCAEE}">
-      <dgm:prSet custT="1"/>
-      <dgm:spPr/>
-      <dgm:t>
-        <a:bodyPr anchor="ctr"/>
-        <a:lstStyle/>
-        <a:p>
-          <a:pPr algn="just"/>
-          <a:r>
-            <a:rPr lang="hu-HU" sz="2400" dirty="0"/>
-            <a:t>Aki ezt elolvassa, </a:t>
-          </a:r>
-          <a:r>
-            <a:rPr lang="hu-HU" sz="2400" dirty="0" err="1"/>
-            <a:t>kacsintson</a:t>
-          </a:r>
-          <a:endParaRPr lang="en-US" sz="2400" dirty="0"/>
-        </a:p>
-      </dgm:t>
-    </dgm:pt>
-    <dgm:pt modelId="{119BD16E-0168-4182-88BC-056629811E7D}" type="parTrans" cxnId="{FA09D05B-F467-41C6-9BDD-97D6D8250477}">
-      <dgm:prSet/>
-      <dgm:spPr/>
-      <dgm:t>
-        <a:bodyPr/>
-        <a:lstStyle/>
-        <a:p>
-          <a:endParaRPr lang="en-US"/>
-        </a:p>
-      </dgm:t>
-    </dgm:pt>
-    <dgm:pt modelId="{F49F617E-5C9D-41A1-B41C-8528836488D4}" type="sibTrans" cxnId="{FA09D05B-F467-41C6-9BDD-97D6D8250477}">
-      <dgm:prSet/>
-      <dgm:spPr/>
-      <dgm:t>
-        <a:bodyPr/>
-        <a:lstStyle/>
-        <a:p>
-          <a:endParaRPr lang="en-US"/>
-        </a:p>
-      </dgm:t>
-    </dgm:pt>
     <dgm:pt modelId="{FB0A922D-E824-4BF8-879D-C96C272A03BF}" type="pres">
       <dgm:prSet presAssocID="{0F5C71FB-DC0A-4435-A4A3-30556961B764}" presName="vert0" presStyleCnt="0">
         <dgm:presLayoutVars>
@@ -11806,7 +11729,7 @@
       <dgm:spPr/>
     </dgm:pt>
     <dgm:pt modelId="{B476705F-8569-4118-8A86-6FBE58A52419}" type="pres">
-      <dgm:prSet presAssocID="{AE76CF75-914E-4994-B798-02C3A13F60EC}" presName="thickLine" presStyleLbl="alignNode1" presStyleIdx="0" presStyleCnt="3"/>
+      <dgm:prSet presAssocID="{AE76CF75-914E-4994-B798-02C3A13F60EC}" presName="thickLine" presStyleLbl="alignNode1" presStyleIdx="0" presStyleCnt="2"/>
       <dgm:spPr/>
     </dgm:pt>
     <dgm:pt modelId="{D245AF81-8817-4572-B62F-E865A8AF118F}" type="pres">
@@ -11814,7 +11737,7 @@
       <dgm:spPr/>
     </dgm:pt>
     <dgm:pt modelId="{930FB5FB-3F96-436B-8773-93839EF461FB}" type="pres">
-      <dgm:prSet presAssocID="{AE76CF75-914E-4994-B798-02C3A13F60EC}" presName="tx1" presStyleLbl="revTx" presStyleIdx="0" presStyleCnt="3"/>
+      <dgm:prSet presAssocID="{AE76CF75-914E-4994-B798-02C3A13F60EC}" presName="tx1" presStyleLbl="revTx" presStyleIdx="0" presStyleCnt="2"/>
       <dgm:spPr/>
     </dgm:pt>
     <dgm:pt modelId="{48528145-AF37-47DC-A22F-7CDD36F205D3}" type="pres">
@@ -11822,7 +11745,7 @@
       <dgm:spPr/>
     </dgm:pt>
     <dgm:pt modelId="{4E786B78-44F7-410D-9251-9C2AFD22A55E}" type="pres">
-      <dgm:prSet presAssocID="{692C0C7E-BAB9-49DE-8485-F6F018308312}" presName="thickLine" presStyleLbl="alignNode1" presStyleIdx="1" presStyleCnt="3"/>
+      <dgm:prSet presAssocID="{692C0C7E-BAB9-49DE-8485-F6F018308312}" presName="thickLine" presStyleLbl="alignNode1" presStyleIdx="1" presStyleCnt="2"/>
       <dgm:spPr/>
     </dgm:pt>
     <dgm:pt modelId="{57B471E5-640E-4507-9399-6E0598E686D0}" type="pres">
@@ -11830,33 +11753,15 @@
       <dgm:spPr/>
     </dgm:pt>
     <dgm:pt modelId="{29B805B5-6ABC-4104-8373-0D63EE815FAF}" type="pres">
-      <dgm:prSet presAssocID="{692C0C7E-BAB9-49DE-8485-F6F018308312}" presName="tx1" presStyleLbl="revTx" presStyleIdx="1" presStyleCnt="3"/>
+      <dgm:prSet presAssocID="{692C0C7E-BAB9-49DE-8485-F6F018308312}" presName="tx1" presStyleLbl="revTx" presStyleIdx="1" presStyleCnt="2"/>
       <dgm:spPr/>
     </dgm:pt>
     <dgm:pt modelId="{5CA0B3D6-375B-4FB6-9C1C-3B04FEB2C5C2}" type="pres">
       <dgm:prSet presAssocID="{692C0C7E-BAB9-49DE-8485-F6F018308312}" presName="vert1" presStyleCnt="0"/>
       <dgm:spPr/>
     </dgm:pt>
-    <dgm:pt modelId="{F9A111F5-6ED4-4136-BF36-88EA82353CE2}" type="pres">
-      <dgm:prSet presAssocID="{17B1F2AB-9CCE-4CE2-90B1-CC7E523DCAEE}" presName="thickLine" presStyleLbl="alignNode1" presStyleIdx="2" presStyleCnt="3"/>
-      <dgm:spPr/>
-    </dgm:pt>
-    <dgm:pt modelId="{E7641004-3C57-4C36-AD24-4B50FF58F9A1}" type="pres">
-      <dgm:prSet presAssocID="{17B1F2AB-9CCE-4CE2-90B1-CC7E523DCAEE}" presName="horz1" presStyleCnt="0"/>
-      <dgm:spPr/>
-    </dgm:pt>
-    <dgm:pt modelId="{C3BBC625-1140-4642-B954-48858C509C41}" type="pres">
-      <dgm:prSet presAssocID="{17B1F2AB-9CCE-4CE2-90B1-CC7E523DCAEE}" presName="tx1" presStyleLbl="revTx" presStyleIdx="2" presStyleCnt="3"/>
-      <dgm:spPr/>
-    </dgm:pt>
-    <dgm:pt modelId="{C72136CB-F103-4C0F-B616-85D3F9169E7D}" type="pres">
-      <dgm:prSet presAssocID="{17B1F2AB-9CCE-4CE2-90B1-CC7E523DCAEE}" presName="vert1" presStyleCnt="0"/>
-      <dgm:spPr/>
-    </dgm:pt>
   </dgm:ptLst>
   <dgm:cxnLst>
-    <dgm:cxn modelId="{A85989BB-F53F-4E4B-BE62-26125D65FC3B}" type="presOf" srcId="{17B1F2AB-9CCE-4CE2-90B1-CC7E523DCAEE}" destId="{C3BBC625-1140-4642-B954-48858C509C41}" srcOrd="0" destOrd="0" presId="urn:microsoft.com/office/officeart/2008/layout/LinedList"/>
-    <dgm:cxn modelId="{FA09D05B-F467-41C6-9BDD-97D6D8250477}" srcId="{0F5C71FB-DC0A-4435-A4A3-30556961B764}" destId="{17B1F2AB-9CCE-4CE2-90B1-CC7E523DCAEE}" srcOrd="2" destOrd="0" parTransId="{119BD16E-0168-4182-88BC-056629811E7D}" sibTransId="{F49F617E-5C9D-41A1-B41C-8528836488D4}"/>
     <dgm:cxn modelId="{2BE72191-B68E-4FE1-A323-8EA71F689846}" type="presOf" srcId="{0F5C71FB-DC0A-4435-A4A3-30556961B764}" destId="{FB0A922D-E824-4BF8-879D-C96C272A03BF}" srcOrd="0" destOrd="0" presId="urn:microsoft.com/office/officeart/2008/layout/LinedList"/>
     <dgm:cxn modelId="{D713C265-027E-4772-90E1-33DB4BF40F22}" srcId="{0F5C71FB-DC0A-4435-A4A3-30556961B764}" destId="{692C0C7E-BAB9-49DE-8485-F6F018308312}" srcOrd="1" destOrd="0" parTransId="{C29B7E56-F459-4637-8D18-2CB23AD46206}" sibTransId="{6EDFCA5F-268C-4DAA-A455-3464E71DA233}"/>
     <dgm:cxn modelId="{4588AD14-A5FC-4903-83EA-B61E376903C5}" type="presOf" srcId="{AE76CF75-914E-4994-B798-02C3A13F60EC}" destId="{930FB5FB-3F96-436B-8773-93839EF461FB}" srcOrd="0" destOrd="0" presId="urn:microsoft.com/office/officeart/2008/layout/LinedList"/>
@@ -11870,10 +11775,6 @@
     <dgm:cxn modelId="{B52A83A2-B3B8-44FD-9589-D8B5BD72E49A}" type="presParOf" srcId="{FB0A922D-E824-4BF8-879D-C96C272A03BF}" destId="{57B471E5-640E-4507-9399-6E0598E686D0}" srcOrd="3" destOrd="0" presId="urn:microsoft.com/office/officeart/2008/layout/LinedList"/>
     <dgm:cxn modelId="{1E882085-A5FA-459B-8D00-4C8F738DB433}" type="presParOf" srcId="{57B471E5-640E-4507-9399-6E0598E686D0}" destId="{29B805B5-6ABC-4104-8373-0D63EE815FAF}" srcOrd="0" destOrd="0" presId="urn:microsoft.com/office/officeart/2008/layout/LinedList"/>
     <dgm:cxn modelId="{B8AFA68C-6829-4FFE-829F-73D2DA019310}" type="presParOf" srcId="{57B471E5-640E-4507-9399-6E0598E686D0}" destId="{5CA0B3D6-375B-4FB6-9C1C-3B04FEB2C5C2}" srcOrd="1" destOrd="0" presId="urn:microsoft.com/office/officeart/2008/layout/LinedList"/>
-    <dgm:cxn modelId="{9243BE9D-C38E-4F02-8840-7DD2AB19E208}" type="presParOf" srcId="{FB0A922D-E824-4BF8-879D-C96C272A03BF}" destId="{F9A111F5-6ED4-4136-BF36-88EA82353CE2}" srcOrd="4" destOrd="0" presId="urn:microsoft.com/office/officeart/2008/layout/LinedList"/>
-    <dgm:cxn modelId="{0E11F20F-B8F5-4CD5-974D-E4465D1C6586}" type="presParOf" srcId="{FB0A922D-E824-4BF8-879D-C96C272A03BF}" destId="{E7641004-3C57-4C36-AD24-4B50FF58F9A1}" srcOrd="5" destOrd="0" presId="urn:microsoft.com/office/officeart/2008/layout/LinedList"/>
-    <dgm:cxn modelId="{203846E0-E5A0-4615-BB39-8B48322A9B92}" type="presParOf" srcId="{E7641004-3C57-4C36-AD24-4B50FF58F9A1}" destId="{C3BBC625-1140-4642-B954-48858C509C41}" srcOrd="0" destOrd="0" presId="urn:microsoft.com/office/officeart/2008/layout/LinedList"/>
-    <dgm:cxn modelId="{E3211EE2-88F4-4207-B92A-FF95C7477558}" type="presParOf" srcId="{E7641004-3C57-4C36-AD24-4B50FF58F9A1}" destId="{C72136CB-F103-4C0F-B616-85D3F9169E7D}" srcOrd="1" destOrd="0" presId="urn:microsoft.com/office/officeart/2008/layout/LinedList"/>
   </dgm:cxnLst>
   <dgm:bg/>
   <dgm:whole/>
@@ -12178,7 +12079,14 @@
     </dgm:pt>
     <dgm:pt modelId="{565FC5D3-980D-4891-9985-2AAE4BF7A601}">
       <dgm:prSet phldrT="[Szöveg]" custT="1"/>
-      <dgm:spPr/>
+      <dgm:spPr>
+        <a:blipFill rotWithShape="0">
+          <a:blip xmlns:r="http://schemas.openxmlformats.org/officeDocument/2006/relationships" r:embed="rId1"/>
+          <a:stretch>
+            <a:fillRect/>
+          </a:stretch>
+        </a:blipFill>
+      </dgm:spPr>
       <dgm:t>
         <a:bodyPr/>
         <a:lstStyle/>
@@ -12622,7 +12530,6 @@
             <a:rPr lang="hu-HU" sz="2000" kern="1200"/>
             <a:t>Mérnöki fejlesztési folyamat szimulálása</a:t>
           </a:r>
-          <a:endParaRPr lang="hu-HU" sz="2000" kern="1200"/>
         </a:p>
       </dsp:txBody>
       <dsp:txXfrm>
@@ -12747,7 +12654,6 @@
             <a:rPr lang="hu-HU" sz="2000" kern="1200"/>
             <a:t>Vasúti elemekből álló modell</a:t>
           </a:r>
-          <a:endParaRPr lang="hu-HU" sz="2000" kern="1200"/>
         </a:p>
       </dsp:txBody>
       <dsp:txXfrm>
@@ -12872,7 +12778,6 @@
             <a:rPr lang="hu-HU" sz="2000" kern="1200"/>
             <a:t>6 különböző kényszer vizsgálata</a:t>
           </a:r>
-          <a:endParaRPr lang="hu-HU" sz="2000" kern="1200"/>
         </a:p>
       </dsp:txBody>
       <dsp:txXfrm>
@@ -12997,7 +12902,6 @@
             <a:rPr lang="hu-HU" sz="2000" kern="1200"/>
             <a:t>10 eszközre már elkészült a tesztelés, de Linuxon</a:t>
           </a:r>
-          <a:endParaRPr lang="hu-HU" sz="2000" kern="1200"/>
         </a:p>
       </dsp:txBody>
       <dsp:txXfrm>
@@ -13122,7 +13026,6 @@
             <a:rPr lang="hu-HU" sz="2000" kern="1200"/>
             <a:t>Különböző forgatókönyvek</a:t>
           </a:r>
-          <a:endParaRPr lang="hu-HU" sz="2000" kern="1200"/>
         </a:p>
       </dsp:txBody>
       <dsp:txXfrm>
@@ -14230,11 +14133,6 @@
             </a:rPr>
             <a:t>Egy solution, két project</a:t>
           </a:r>
-          <a:endParaRPr lang="hu-HU" sz="2200" kern="1200">
-            <a:solidFill>
-              <a:schemeClr val="tx1"/>
-            </a:solidFill>
-          </a:endParaRPr>
         </a:p>
         <a:p>
           <a:pPr marL="171450" lvl="1" indent="-171450" algn="l" defTabSz="755650">
@@ -14257,11 +14155,6 @@
             </a:rPr>
             <a:t>TSL nyelv az adattípusok leírására</a:t>
           </a:r>
-          <a:endParaRPr lang="hu-HU" sz="1700" kern="1200">
-            <a:solidFill>
-              <a:schemeClr val="tx1"/>
-            </a:solidFill>
-          </a:endParaRPr>
         </a:p>
         <a:p>
           <a:pPr marL="171450" lvl="1" indent="-171450" algn="l" defTabSz="755650">
@@ -14284,11 +14177,6 @@
             </a:rPr>
             <a:t>C# az adateléréshez és manipulációhoz</a:t>
           </a:r>
-          <a:endParaRPr lang="hu-HU" sz="1700" kern="1200">
-            <a:solidFill>
-              <a:schemeClr val="tx1"/>
-            </a:solidFill>
-          </a:endParaRPr>
         </a:p>
       </dsp:txBody>
       <dsp:txXfrm rot="10800000">
@@ -14412,11 +14300,6 @@
             </a:rPr>
             <a:t>Accessorok</a:t>
           </a:r>
-          <a:endParaRPr lang="hu-HU" sz="2200" kern="1200">
-            <a:solidFill>
-              <a:schemeClr val="tx1"/>
-            </a:solidFill>
-          </a:endParaRPr>
         </a:p>
         <a:p>
           <a:pPr marL="171450" lvl="1" indent="-171450" algn="l" defTabSz="755650">
@@ -14439,11 +14322,6 @@
             </a:rPr>
             <a:t>Automatikus</a:t>
           </a:r>
-          <a:endParaRPr lang="hu-HU" sz="1700" kern="1200">
-            <a:solidFill>
-              <a:schemeClr val="tx1"/>
-            </a:solidFill>
-          </a:endParaRPr>
         </a:p>
         <a:p>
           <a:pPr marL="171450" lvl="1" indent="-171450" algn="l" defTabSz="755650">
@@ -14466,11 +14344,6 @@
             </a:rPr>
             <a:t>Objektum-orientált</a:t>
           </a:r>
-          <a:endParaRPr lang="hu-HU" sz="1700" kern="1200">
-            <a:solidFill>
-              <a:schemeClr val="tx1"/>
-            </a:solidFill>
-          </a:endParaRPr>
         </a:p>
       </dsp:txBody>
       <dsp:txXfrm rot="10800000">
@@ -14580,18 +14453,13 @@
             <a:buNone/>
           </a:pPr>
           <a:r>
-            <a:rPr lang="hu-HU" sz="2200" kern="1200">
+            <a:rPr lang="hu-HU" sz="2200" kern="1200" dirty="0">
               <a:solidFill>
                 <a:schemeClr val="tx1"/>
               </a:solidFill>
             </a:rPr>
             <a:t>LINQ támogatott, de vannak nehézségek</a:t>
           </a:r>
-          <a:endParaRPr lang="hu-HU" sz="2200" kern="1200">
-            <a:solidFill>
-              <a:schemeClr val="tx1"/>
-            </a:solidFill>
-          </a:endParaRPr>
         </a:p>
       </dsp:txBody>
       <dsp:txXfrm rot="10800000">
@@ -14726,7 +14594,6 @@
             <a:rPr lang="hu-HU" sz="2200" kern="1200"/>
             <a:t>Két eszközteszt futtatása Windows környezetben</a:t>
           </a:r>
-          <a:endParaRPr lang="hu-HU" sz="2200" kern="1200"/>
         </a:p>
       </dsp:txBody>
       <dsp:txXfrm>
@@ -14787,7 +14654,6 @@
             <a:rPr lang="hu-HU" sz="1700" kern="1200"/>
             <a:t>RDF4J &amp; Jena</a:t>
           </a:r>
-          <a:endParaRPr lang="hu-HU" sz="1700" kern="1200"/>
         </a:p>
       </dsp:txBody>
       <dsp:txXfrm>
@@ -14865,7 +14731,6 @@
             <a:rPr lang="hu-HU" sz="2200" kern="1200"/>
             <a:t>Train Benchmark forgatókönyvek implementálása a Graph Engine használatával</a:t>
           </a:r>
-          <a:endParaRPr lang="hu-HU" sz="2200" kern="1200"/>
         </a:p>
       </dsp:txBody>
       <dsp:txXfrm>
@@ -14943,7 +14808,6 @@
             <a:rPr lang="hu-HU" sz="2200" kern="1200"/>
             <a:t>6-ból 2 kényszer</a:t>
           </a:r>
-          <a:endParaRPr lang="hu-HU" sz="2200" kern="1200"/>
         </a:p>
       </dsp:txBody>
       <dsp:txXfrm>
@@ -15021,7 +14885,6 @@
             <a:rPr lang="hu-HU" sz="2200" kern="1200"/>
             <a:t>Különböző méretű modelleken</a:t>
           </a:r>
-          <a:endParaRPr lang="hu-HU" sz="2200" kern="1200"/>
         </a:p>
       </dsp:txBody>
       <dsp:txXfrm>
@@ -15082,7 +14945,6 @@
             <a:rPr lang="hu-HU" sz="1700" kern="1200"/>
             <a:t>Kb. 5000 - 2,3 millió elem</a:t>
           </a:r>
-          <a:endParaRPr lang="hu-HU" sz="1700" kern="1200"/>
         </a:p>
       </dsp:txBody>
       <dsp:txXfrm>
@@ -16397,7 +16259,7 @@
       </dsp:nvSpPr>
       <dsp:spPr>
         <a:xfrm>
-          <a:off x="0" y="1466"/>
+          <a:off x="0" y="0"/>
           <a:ext cx="4153982" cy="0"/>
         </a:xfrm>
         <a:prstGeom prst="line">
@@ -16446,8 +16308,8 @@
       </dsp:nvSpPr>
       <dsp:spPr>
         <a:xfrm>
-          <a:off x="0" y="1466"/>
-          <a:ext cx="4153982" cy="1000024"/>
+          <a:off x="0" y="0"/>
+          <a:ext cx="4153982" cy="1501502"/>
         </a:xfrm>
         <a:prstGeom prst="rect">
           <a:avLst/>
@@ -16520,12 +16382,15 @@
             <a:rPr lang="en-US" sz="2400" kern="1200" dirty="0" err="1"/>
             <a:t>lehet</a:t>
           </a:r>
-          <a:endParaRPr lang="hu-HU" sz="2400" kern="1200" dirty="0"/>
+          <a:r>
+            <a:rPr lang="hu-HU" sz="2400" kern="1200" dirty="0"/>
+            <a:t>, de nem minden szempontból</a:t>
+          </a:r>
         </a:p>
       </dsp:txBody>
       <dsp:txXfrm>
-        <a:off x="0" y="1466"/>
-        <a:ext cx="4153982" cy="1000024"/>
+        <a:off x="0" y="0"/>
+        <a:ext cx="4153982" cy="1501502"/>
       </dsp:txXfrm>
     </dsp:sp>
     <dsp:sp modelId="{4E786B78-44F7-410D-9251-9C2AFD22A55E}">
@@ -16535,7 +16400,7 @@
       </dsp:nvSpPr>
       <dsp:spPr>
         <a:xfrm>
-          <a:off x="0" y="1001490"/>
+          <a:off x="0" y="1501502"/>
           <a:ext cx="4153982" cy="0"/>
         </a:xfrm>
         <a:prstGeom prst="line">
@@ -16584,8 +16449,8 @@
       </dsp:nvSpPr>
       <dsp:spPr>
         <a:xfrm>
-          <a:off x="0" y="1001490"/>
-          <a:ext cx="4153982" cy="1000024"/>
+          <a:off x="0" y="1501502"/>
+          <a:ext cx="4153982" cy="1501502"/>
         </a:xfrm>
         <a:prstGeom prst="rect">
           <a:avLst/>
@@ -16658,122 +16523,8 @@
         </a:p>
       </dsp:txBody>
       <dsp:txXfrm>
-        <a:off x="0" y="1001490"/>
-        <a:ext cx="4153982" cy="1000024"/>
-      </dsp:txXfrm>
-    </dsp:sp>
-    <dsp:sp modelId="{F9A111F5-6ED4-4136-BF36-88EA82353CE2}">
-      <dsp:nvSpPr>
-        <dsp:cNvPr id="0" name=""/>
-        <dsp:cNvSpPr/>
-      </dsp:nvSpPr>
-      <dsp:spPr>
-        <a:xfrm>
-          <a:off x="0" y="2001514"/>
-          <a:ext cx="4153982" cy="0"/>
-        </a:xfrm>
-        <a:prstGeom prst="line">
-          <a:avLst/>
-        </a:prstGeom>
-        <a:solidFill>
-          <a:schemeClr val="accent1">
-            <a:hueOff val="0"/>
-            <a:satOff val="0"/>
-            <a:lumOff val="0"/>
-            <a:alphaOff val="0"/>
-          </a:schemeClr>
-        </a:solidFill>
-        <a:ln w="25400" cap="flat" cmpd="sng" algn="ctr">
-          <a:solidFill>
-            <a:schemeClr val="accent1">
-              <a:hueOff val="0"/>
-              <a:satOff val="0"/>
-              <a:lumOff val="0"/>
-              <a:alphaOff val="0"/>
-            </a:schemeClr>
-          </a:solidFill>
-          <a:prstDash val="solid"/>
-        </a:ln>
-        <a:effectLst/>
-      </dsp:spPr>
-      <dsp:style>
-        <a:lnRef idx="2">
-          <a:scrgbClr r="0" g="0" b="0"/>
-        </a:lnRef>
-        <a:fillRef idx="1">
-          <a:scrgbClr r="0" g="0" b="0"/>
-        </a:fillRef>
-        <a:effectRef idx="0">
-          <a:scrgbClr r="0" g="0" b="0"/>
-        </a:effectRef>
-        <a:fontRef idx="minor">
-          <a:schemeClr val="lt1"/>
-        </a:fontRef>
-      </dsp:style>
-    </dsp:sp>
-    <dsp:sp modelId="{C3BBC625-1140-4642-B954-48858C509C41}">
-      <dsp:nvSpPr>
-        <dsp:cNvPr id="0" name=""/>
-        <dsp:cNvSpPr/>
-      </dsp:nvSpPr>
-      <dsp:spPr>
-        <a:xfrm>
-          <a:off x="0" y="2001514"/>
-          <a:ext cx="4153982" cy="1000024"/>
-        </a:xfrm>
-        <a:prstGeom prst="rect">
-          <a:avLst/>
-        </a:prstGeom>
-        <a:noFill/>
-        <a:ln>
-          <a:noFill/>
-        </a:ln>
-        <a:effectLst/>
-      </dsp:spPr>
-      <dsp:style>
-        <a:lnRef idx="0">
-          <a:scrgbClr r="0" g="0" b="0"/>
-        </a:lnRef>
-        <a:fillRef idx="0">
-          <a:scrgbClr r="0" g="0" b="0"/>
-        </a:fillRef>
-        <a:effectRef idx="0">
-          <a:scrgbClr r="0" g="0" b="0"/>
-        </a:effectRef>
-        <a:fontRef idx="minor"/>
-      </dsp:style>
-      <dsp:txBody>
-        <a:bodyPr spcFirstLastPara="0" vert="horz" wrap="square" lIns="91440" tIns="91440" rIns="91440" bIns="91440" numCol="1" spcCol="1270" anchor="ctr" anchorCtr="0">
-          <a:noAutofit/>
-        </a:bodyPr>
-        <a:lstStyle/>
-        <a:p>
-          <a:pPr marL="0" lvl="0" indent="0" algn="just" defTabSz="1066800">
-            <a:lnSpc>
-              <a:spcPct val="90000"/>
-            </a:lnSpc>
-            <a:spcBef>
-              <a:spcPct val="0"/>
-            </a:spcBef>
-            <a:spcAft>
-              <a:spcPct val="35000"/>
-            </a:spcAft>
-            <a:buNone/>
-          </a:pPr>
-          <a:r>
-            <a:rPr lang="hu-HU" sz="2400" kern="1200" dirty="0"/>
-            <a:t>Aki ezt elolvassa, </a:t>
-          </a:r>
-          <a:r>
-            <a:rPr lang="hu-HU" sz="2400" kern="1200" dirty="0" err="1"/>
-            <a:t>kacsintson</a:t>
-          </a:r>
-          <a:endParaRPr lang="en-US" sz="2400" kern="1200" dirty="0"/>
-        </a:p>
-      </dsp:txBody>
-      <dsp:txXfrm>
-        <a:off x="0" y="2001514"/>
-        <a:ext cx="4153982" cy="1000024"/>
+        <a:off x="0" y="1501502"/>
+        <a:ext cx="4153982" cy="1501502"/>
       </dsp:txXfrm>
     </dsp:sp>
   </dsp:spTree>
@@ -17167,15 +16918,12 @@
         <a:prstGeom prst="rect">
           <a:avLst/>
         </a:prstGeom>
-        <a:solidFill>
-          <a:schemeClr val="accent1">
-            <a:shade val="80000"/>
-            <a:hueOff val="0"/>
-            <a:satOff val="0"/>
-            <a:lumOff val="0"/>
-            <a:alphaOff val="0"/>
-          </a:schemeClr>
-        </a:solidFill>
+        <a:blipFill rotWithShape="0">
+          <a:blip xmlns:r="http://schemas.openxmlformats.org/officeDocument/2006/relationships" r:embed="rId1"/>
+          <a:stretch>
+            <a:fillRect/>
+          </a:stretch>
+        </a:blipFill>
         <a:ln>
           <a:noFill/>
         </a:ln>
@@ -32625,7 +32373,7 @@
           <a:p>
             <a:fld id="{D320DF98-73A7-40A6-8A84-2EB5B4F2C4CC}" type="datetimeFigureOut">
               <a:rPr lang="hu-HU" smtClean="0"/>
-              <a:t>2017.06.12.</a:t>
+              <a:t>2017.06.13.</a:t>
             </a:fld>
             <a:endParaRPr lang="hu-HU"/>
           </a:p>
@@ -32791,7 +32539,7 @@
             <a:fld id="{B9130191-0BE1-0142-AFC1-0297AE024A0E}" type="datetimeFigureOut">
               <a:rPr lang="en-US" smtClean="0"/>
               <a:pPr/>
-              <a:t>6/12/2017</a:t>
+              <a:t>6/13/2017</a:t>
             </a:fld>
             <a:endParaRPr lang="en-US"/>
           </a:p>
@@ -33192,6 +32940,466 @@
           <a:lstStyle/>
           <a:p>
             <a:r>
+              <a:rPr lang="hu-HU" dirty="0"/>
+              <a:t>RDF4J</a:t>
+            </a:r>
+            <a:r>
+              <a:rPr lang="hu-HU" baseline="0" dirty="0"/>
+              <a:t> és Jena RDF gráf alapú eszközök, ezért ezt választottam ki</a:t>
+            </a:r>
+          </a:p>
+          <a:p>
+            <a:endParaRPr lang="hu-HU" baseline="0" dirty="0"/>
+          </a:p>
+        </p:txBody>
+      </p:sp>
+      <p:sp>
+        <p:nvSpPr>
+          <p:cNvPr id="4" name="Slide Number Placeholder 3"/>
+          <p:cNvSpPr>
+            <a:spLocks noGrp="1"/>
+          </p:cNvSpPr>
+          <p:nvPr>
+            <p:ph type="sldNum" sz="quarter" idx="10"/>
+          </p:nvPr>
+        </p:nvSpPr>
+        <p:spPr/>
+        <p:txBody>
+          <a:bodyPr/>
+          <a:lstStyle/>
+          <a:p>
+            <a:fld id="{A70A3C59-3253-3B42-8BE0-F6D0BA6B0441}" type="slidenum">
+              <a:rPr lang="en-US" smtClean="0"/>
+              <a:pPr/>
+              <a:t>10</a:t>
+            </a:fld>
+            <a:endParaRPr lang="en-US"/>
+          </a:p>
+        </p:txBody>
+      </p:sp>
+    </p:spTree>
+    <p:extLst>
+      <p:ext uri="{BB962C8B-B14F-4D97-AF65-F5344CB8AC3E}">
+        <p14:creationId xmlns:p14="http://schemas.microsoft.com/office/powerpoint/2010/main" val="2621123209"/>
+      </p:ext>
+    </p:extLst>
+  </p:cSld>
+  <p:clrMapOvr>
+    <a:masterClrMapping/>
+  </p:clrMapOvr>
+</p:notes>
+</file>
+
+<file path=ppt/notesSlides/notesSlide11.xml><?xml version="1.0" encoding="utf-8"?>
+<p:notes xmlns:a="http://schemas.openxmlformats.org/drawingml/2006/main" xmlns:r="http://schemas.openxmlformats.org/officeDocument/2006/relationships" xmlns:p="http://schemas.openxmlformats.org/presentationml/2006/main">
+  <p:cSld>
+    <p:spTree>
+      <p:nvGrpSpPr>
+        <p:cNvPr id="1" name=""/>
+        <p:cNvGrpSpPr/>
+        <p:nvPr/>
+      </p:nvGrpSpPr>
+      <p:grpSpPr>
+        <a:xfrm>
+          <a:off x="0" y="0"/>
+          <a:ext cx="0" cy="0"/>
+          <a:chOff x="0" y="0"/>
+          <a:chExt cx="0" cy="0"/>
+        </a:xfrm>
+      </p:grpSpPr>
+      <p:sp>
+        <p:nvSpPr>
+          <p:cNvPr id="2" name="Slide Image Placeholder 1"/>
+          <p:cNvSpPr>
+            <a:spLocks noGrp="1" noRot="1" noChangeAspect="1"/>
+          </p:cNvSpPr>
+          <p:nvPr>
+            <p:ph type="sldImg"/>
+          </p:nvPr>
+        </p:nvSpPr>
+        <p:spPr/>
+      </p:sp>
+      <p:sp>
+        <p:nvSpPr>
+          <p:cNvPr id="3" name="Notes Placeholder 2"/>
+          <p:cNvSpPr>
+            <a:spLocks noGrp="1"/>
+          </p:cNvSpPr>
+          <p:nvPr>
+            <p:ph type="body" idx="1"/>
+          </p:nvPr>
+        </p:nvSpPr>
+        <p:spPr/>
+        <p:txBody>
+          <a:bodyPr/>
+          <a:lstStyle/>
+          <a:p>
+            <a:r>
+              <a:rPr lang="hu-HU" dirty="0"/>
+              <a:t>Mérésre a </a:t>
+            </a:r>
+            <a:r>
+              <a:rPr lang="hu-HU" dirty="0" err="1"/>
+              <a:t>Stopwatch</a:t>
+            </a:r>
+            <a:r>
+              <a:rPr lang="hu-HU" dirty="0"/>
+              <a:t> osztályt választottam</a:t>
+            </a:r>
+          </a:p>
+          <a:p>
+            <a:r>
+              <a:rPr lang="hu-HU" dirty="0"/>
+              <a:t>Ennek pontossága </a:t>
+            </a:r>
+            <a:r>
+              <a:rPr lang="hu-HU" dirty="0" err="1"/>
+              <a:t>ms</a:t>
+            </a:r>
+            <a:r>
+              <a:rPr lang="hu-HU" dirty="0"/>
+              <a:t> vagy </a:t>
+            </a:r>
+            <a:r>
+              <a:rPr lang="hu-HU" dirty="0" err="1"/>
+              <a:t>ElapsedTicks</a:t>
+            </a:r>
+            <a:endParaRPr lang="hu-HU" baseline="0" dirty="0"/>
+          </a:p>
+          <a:p>
+            <a:r>
+              <a:rPr lang="hu-HU" baseline="0" dirty="0"/>
+              <a:t>Eredetileg úgy gondoltam, hogy a </a:t>
+            </a:r>
+            <a:r>
+              <a:rPr lang="hu-HU" baseline="0" dirty="0" err="1"/>
+              <a:t>ms</a:t>
+            </a:r>
+            <a:r>
+              <a:rPr lang="hu-HU" baseline="0" dirty="0"/>
+              <a:t> pontosság kevés, ezért </a:t>
+            </a:r>
+            <a:r>
+              <a:rPr lang="hu-HU" baseline="0" dirty="0" err="1"/>
+              <a:t>ElapsedTicks</a:t>
+            </a:r>
+            <a:r>
+              <a:rPr lang="hu-HU" baseline="0" dirty="0"/>
+              <a:t>/</a:t>
+            </a:r>
+            <a:r>
+              <a:rPr lang="hu-HU" baseline="0" dirty="0" err="1"/>
+              <a:t>Frequency</a:t>
+            </a:r>
+            <a:r>
+              <a:rPr lang="hu-HU" baseline="0" dirty="0"/>
+              <a:t>-vel lehet nagyobb pontosságot elérni</a:t>
+            </a:r>
+          </a:p>
+          <a:p>
+            <a:endParaRPr lang="hu-HU" dirty="0"/>
+          </a:p>
+        </p:txBody>
+      </p:sp>
+      <p:sp>
+        <p:nvSpPr>
+          <p:cNvPr id="4" name="Slide Number Placeholder 3"/>
+          <p:cNvSpPr>
+            <a:spLocks noGrp="1"/>
+          </p:cNvSpPr>
+          <p:nvPr>
+            <p:ph type="sldNum" sz="quarter" idx="10"/>
+          </p:nvPr>
+        </p:nvSpPr>
+        <p:spPr/>
+        <p:txBody>
+          <a:bodyPr/>
+          <a:lstStyle/>
+          <a:p>
+            <a:fld id="{A70A3C59-3253-3B42-8BE0-F6D0BA6B0441}" type="slidenum">
+              <a:rPr lang="en-US" smtClean="0"/>
+              <a:pPr/>
+              <a:t>11</a:t>
+            </a:fld>
+            <a:endParaRPr lang="en-US"/>
+          </a:p>
+        </p:txBody>
+      </p:sp>
+    </p:spTree>
+    <p:extLst>
+      <p:ext uri="{BB962C8B-B14F-4D97-AF65-F5344CB8AC3E}">
+        <p14:creationId xmlns:p14="http://schemas.microsoft.com/office/powerpoint/2010/main" val="63176455"/>
+      </p:ext>
+    </p:extLst>
+  </p:cSld>
+  <p:clrMapOvr>
+    <a:masterClrMapping/>
+  </p:clrMapOvr>
+</p:notes>
+</file>
+
+<file path=ppt/notesSlides/notesSlide12.xml><?xml version="1.0" encoding="utf-8"?>
+<p:notes xmlns:a="http://schemas.openxmlformats.org/drawingml/2006/main" xmlns:r="http://schemas.openxmlformats.org/officeDocument/2006/relationships" xmlns:p="http://schemas.openxmlformats.org/presentationml/2006/main">
+  <p:cSld>
+    <p:spTree>
+      <p:nvGrpSpPr>
+        <p:cNvPr id="1" name=""/>
+        <p:cNvGrpSpPr/>
+        <p:nvPr/>
+      </p:nvGrpSpPr>
+      <p:grpSpPr>
+        <a:xfrm>
+          <a:off x="0" y="0"/>
+          <a:ext cx="0" cy="0"/>
+          <a:chOff x="0" y="0"/>
+          <a:chExt cx="0" cy="0"/>
+        </a:xfrm>
+      </p:grpSpPr>
+      <p:sp>
+        <p:nvSpPr>
+          <p:cNvPr id="2" name="Slide Image Placeholder 1"/>
+          <p:cNvSpPr>
+            <a:spLocks noGrp="1" noRot="1" noChangeAspect="1"/>
+          </p:cNvSpPr>
+          <p:nvPr>
+            <p:ph type="sldImg"/>
+          </p:nvPr>
+        </p:nvSpPr>
+        <p:spPr/>
+      </p:sp>
+      <p:sp>
+        <p:nvSpPr>
+          <p:cNvPr id="3" name="Notes Placeholder 2"/>
+          <p:cNvSpPr>
+            <a:spLocks noGrp="1"/>
+          </p:cNvSpPr>
+          <p:nvPr>
+            <p:ph type="body" idx="1"/>
+          </p:nvPr>
+        </p:nvSpPr>
+        <p:spPr/>
+        <p:txBody>
+          <a:bodyPr/>
+          <a:lstStyle/>
+          <a:p>
+            <a:r>
+              <a:rPr lang="hu-HU" noProof="0" dirty="0" err="1"/>
+              <a:t>Recheck</a:t>
+            </a:r>
+            <a:r>
+              <a:rPr lang="hu-HU" noProof="0" dirty="0"/>
+              <a:t> eredményei minden esetben megegyeznek a </a:t>
+            </a:r>
+            <a:r>
+              <a:rPr lang="hu-HU" noProof="0" dirty="0" err="1"/>
+              <a:t>Check</a:t>
+            </a:r>
+            <a:r>
+              <a:rPr lang="hu-HU" noProof="0" dirty="0"/>
+              <a:t> eredményeivel.</a:t>
+            </a:r>
+          </a:p>
+        </p:txBody>
+      </p:sp>
+      <p:sp>
+        <p:nvSpPr>
+          <p:cNvPr id="4" name="Slide Number Placeholder 3"/>
+          <p:cNvSpPr>
+            <a:spLocks noGrp="1"/>
+          </p:cNvSpPr>
+          <p:nvPr>
+            <p:ph type="sldNum" sz="quarter" idx="10"/>
+          </p:nvPr>
+        </p:nvSpPr>
+        <p:spPr/>
+        <p:txBody>
+          <a:bodyPr/>
+          <a:lstStyle/>
+          <a:p>
+            <a:fld id="{A70A3C59-3253-3B42-8BE0-F6D0BA6B0441}" type="slidenum">
+              <a:rPr lang="en-US" smtClean="0"/>
+              <a:pPr/>
+              <a:t>12</a:t>
+            </a:fld>
+            <a:endParaRPr lang="en-US"/>
+          </a:p>
+        </p:txBody>
+      </p:sp>
+    </p:spTree>
+    <p:extLst>
+      <p:ext uri="{BB962C8B-B14F-4D97-AF65-F5344CB8AC3E}">
+        <p14:creationId xmlns:p14="http://schemas.microsoft.com/office/powerpoint/2010/main" val="2520712550"/>
+      </p:ext>
+    </p:extLst>
+  </p:cSld>
+  <p:clrMapOvr>
+    <a:masterClrMapping/>
+  </p:clrMapOvr>
+</p:notes>
+</file>
+
+<file path=ppt/notesSlides/notesSlide13.xml><?xml version="1.0" encoding="utf-8"?>
+<p:notes xmlns:a="http://schemas.openxmlformats.org/drawingml/2006/main" xmlns:r="http://schemas.openxmlformats.org/officeDocument/2006/relationships" xmlns:p="http://schemas.openxmlformats.org/presentationml/2006/main">
+  <p:cSld>
+    <p:spTree>
+      <p:nvGrpSpPr>
+        <p:cNvPr id="1" name=""/>
+        <p:cNvGrpSpPr/>
+        <p:nvPr/>
+      </p:nvGrpSpPr>
+      <p:grpSpPr>
+        <a:xfrm>
+          <a:off x="0" y="0"/>
+          <a:ext cx="0" cy="0"/>
+          <a:chOff x="0" y="0"/>
+          <a:chExt cx="0" cy="0"/>
+        </a:xfrm>
+      </p:grpSpPr>
+      <p:sp>
+        <p:nvSpPr>
+          <p:cNvPr id="2" name="Slide Image Placeholder 1"/>
+          <p:cNvSpPr>
+            <a:spLocks noGrp="1" noRot="1" noChangeAspect="1"/>
+          </p:cNvSpPr>
+          <p:nvPr>
+            <p:ph type="sldImg"/>
+          </p:nvPr>
+        </p:nvSpPr>
+        <p:spPr/>
+      </p:sp>
+      <p:sp>
+        <p:nvSpPr>
+          <p:cNvPr id="3" name="Notes Placeholder 2"/>
+          <p:cNvSpPr>
+            <a:spLocks noGrp="1"/>
+          </p:cNvSpPr>
+          <p:nvPr>
+            <p:ph type="body" idx="1"/>
+          </p:nvPr>
+        </p:nvSpPr>
+        <p:spPr/>
+        <p:txBody>
+          <a:bodyPr/>
+          <a:lstStyle/>
+          <a:p>
+            <a:r>
+              <a:rPr lang="hu-HU" dirty="0"/>
+              <a:t>Az eredmények az egyik kényszerhez tartozóan</a:t>
+            </a:r>
+          </a:p>
+          <a:p>
+            <a:r>
+              <a:rPr lang="hu-HU" dirty="0" err="1"/>
+              <a:t>Inject</a:t>
+            </a:r>
+            <a:r>
+              <a:rPr lang="hu-HU" baseline="0" dirty="0"/>
+              <a:t> eredménye javult -&gt; nagyobb modellnél könnyebb olyan helyet találni, ahova lehet hibát injektálni</a:t>
+            </a:r>
+          </a:p>
+          <a:p>
+            <a:r>
+              <a:rPr lang="hu-HU" baseline="0" dirty="0" err="1"/>
+              <a:t>Repair</a:t>
+            </a:r>
+            <a:r>
+              <a:rPr lang="hu-HU" baseline="0" dirty="0"/>
+              <a:t> keresés – javítás a </a:t>
+            </a:r>
+            <a:r>
+              <a:rPr lang="hu-HU" baseline="0" dirty="0" err="1"/>
+              <a:t>check</a:t>
+            </a:r>
+            <a:r>
+              <a:rPr lang="hu-HU" baseline="0" dirty="0"/>
+              <a:t> eredményeihez hasonló</a:t>
+            </a:r>
+            <a:endParaRPr lang="hu-HU" dirty="0"/>
+          </a:p>
+        </p:txBody>
+      </p:sp>
+      <p:sp>
+        <p:nvSpPr>
+          <p:cNvPr id="4" name="Slide Number Placeholder 3"/>
+          <p:cNvSpPr>
+            <a:spLocks noGrp="1"/>
+          </p:cNvSpPr>
+          <p:nvPr>
+            <p:ph type="sldNum" sz="quarter" idx="10"/>
+          </p:nvPr>
+        </p:nvSpPr>
+        <p:spPr/>
+        <p:txBody>
+          <a:bodyPr/>
+          <a:lstStyle/>
+          <a:p>
+            <a:fld id="{A70A3C59-3253-3B42-8BE0-F6D0BA6B0441}" type="slidenum">
+              <a:rPr lang="en-US" smtClean="0"/>
+              <a:pPr/>
+              <a:t>13</a:t>
+            </a:fld>
+            <a:endParaRPr lang="en-US"/>
+          </a:p>
+        </p:txBody>
+      </p:sp>
+    </p:spTree>
+    <p:extLst>
+      <p:ext uri="{BB962C8B-B14F-4D97-AF65-F5344CB8AC3E}">
+        <p14:creationId xmlns:p14="http://schemas.microsoft.com/office/powerpoint/2010/main" val="3554251715"/>
+      </p:ext>
+    </p:extLst>
+  </p:cSld>
+  <p:clrMapOvr>
+    <a:masterClrMapping/>
+  </p:clrMapOvr>
+</p:notes>
+</file>
+
+<file path=ppt/notesSlides/notesSlide14.xml><?xml version="1.0" encoding="utf-8"?>
+<p:notes xmlns:a="http://schemas.openxmlformats.org/drawingml/2006/main" xmlns:r="http://schemas.openxmlformats.org/officeDocument/2006/relationships" xmlns:p="http://schemas.openxmlformats.org/presentationml/2006/main">
+  <p:cSld>
+    <p:spTree>
+      <p:nvGrpSpPr>
+        <p:cNvPr id="1" name=""/>
+        <p:cNvGrpSpPr/>
+        <p:nvPr/>
+      </p:nvGrpSpPr>
+      <p:grpSpPr>
+        <a:xfrm>
+          <a:off x="0" y="0"/>
+          <a:ext cx="0" cy="0"/>
+          <a:chOff x="0" y="0"/>
+          <a:chExt cx="0" cy="0"/>
+        </a:xfrm>
+      </p:grpSpPr>
+      <p:sp>
+        <p:nvSpPr>
+          <p:cNvPr id="2" name="Slide Image Placeholder 1"/>
+          <p:cNvSpPr>
+            <a:spLocks noGrp="1" noRot="1" noChangeAspect="1"/>
+          </p:cNvSpPr>
+          <p:nvPr>
+            <p:ph type="sldImg"/>
+          </p:nvPr>
+        </p:nvSpPr>
+        <p:spPr/>
+      </p:sp>
+      <p:sp>
+        <p:nvSpPr>
+          <p:cNvPr id="3" name="Notes Placeholder 2"/>
+          <p:cNvSpPr>
+            <a:spLocks noGrp="1"/>
+          </p:cNvSpPr>
+          <p:nvPr>
+            <p:ph type="body" idx="1"/>
+          </p:nvPr>
+        </p:nvSpPr>
+        <p:spPr/>
+        <p:txBody>
+          <a:bodyPr/>
+          <a:lstStyle/>
+          <a:p>
+            <a:r>
               <a:rPr lang="hu-HU" noProof="0" dirty="0" err="1"/>
               <a:t>Graph</a:t>
             </a:r>
@@ -33207,6 +33415,70 @@
               <a:rPr lang="hu-HU" noProof="0" dirty="0"/>
               <a:t> előnyei és hátrányai a másik két eszközhöz képest.</a:t>
             </a:r>
+          </a:p>
+          <a:p>
+            <a:r>
+              <a:rPr lang="hu-HU" noProof="0" dirty="0"/>
+              <a:t>Előnyök:</a:t>
+            </a:r>
+          </a:p>
+          <a:p>
+            <a:r>
+              <a:rPr lang="hu-HU" noProof="0" dirty="0"/>
+              <a:t>	Nagyobb modellekre hatékonyabb</a:t>
+            </a:r>
+            <a:r>
+              <a:rPr lang="hu-HU" baseline="0" noProof="0" dirty="0"/>
+              <a:t> lehet, de például a </a:t>
+            </a:r>
+            <a:r>
+              <a:rPr lang="hu-HU" baseline="0" noProof="0" dirty="0" err="1"/>
+              <a:t>Repair</a:t>
+            </a:r>
+            <a:r>
+              <a:rPr lang="hu-HU" baseline="0" noProof="0" dirty="0"/>
+              <a:t> esetében ez nem látszott</a:t>
+            </a:r>
+          </a:p>
+          <a:p>
+            <a:r>
+              <a:rPr lang="hu-HU" baseline="0" noProof="0" dirty="0"/>
+              <a:t>	A modell méretétől függetlenül a kis részének a módosítása gyors</a:t>
+            </a:r>
+          </a:p>
+          <a:p>
+            <a:r>
+              <a:rPr lang="hu-HU" baseline="0" noProof="0" dirty="0" err="1"/>
+              <a:t>Hártányok</a:t>
+            </a:r>
+            <a:endParaRPr lang="hu-HU" baseline="0" noProof="0" dirty="0"/>
+          </a:p>
+          <a:p>
+            <a:r>
+              <a:rPr lang="hu-HU" baseline="0" noProof="0" dirty="0"/>
+              <a:t>	Kisebb méretre rosszabb</a:t>
+            </a:r>
+          </a:p>
+          <a:p>
+            <a:r>
+              <a:rPr lang="hu-HU" baseline="0" noProof="0" dirty="0"/>
+              <a:t>	Beolvasás lassabb volt, ennek legfőbb oka a beolvasásra választott könyvtár lassúsága</a:t>
+            </a:r>
+          </a:p>
+          <a:p>
+            <a:r>
+              <a:rPr lang="hu-HU" baseline="0" noProof="0" dirty="0"/>
+              <a:t>	Az azonos típusokat nem lehet egy lekérdezésbe írni, ez lassítja a rendszert (sok lekérdezés </a:t>
+            </a:r>
+            <a:r>
+              <a:rPr lang="hu-HU" baseline="0" noProof="0" dirty="0" err="1"/>
+              <a:t>overhead</a:t>
+            </a:r>
+            <a:r>
+              <a:rPr lang="hu-HU" baseline="0" noProof="0" dirty="0"/>
+              <a:t>)</a:t>
+            </a:r>
+            <a:endParaRPr lang="hu-HU" noProof="0" dirty="0"/>
           </a:p>
         </p:txBody>
       </p:sp>
@@ -33247,7 +33519,208 @@
 </p:notes>
 </file>
 
-<file path=ppt/notesSlides/notesSlide11.xml><?xml version="1.0" encoding="utf-8"?>
+<file path=ppt/notesSlides/notesSlide15.xml><?xml version="1.0" encoding="utf-8"?>
+<p:notes xmlns:a="http://schemas.openxmlformats.org/drawingml/2006/main" xmlns:r="http://schemas.openxmlformats.org/officeDocument/2006/relationships" xmlns:p="http://schemas.openxmlformats.org/presentationml/2006/main">
+  <p:cSld>
+    <p:spTree>
+      <p:nvGrpSpPr>
+        <p:cNvPr id="1" name=""/>
+        <p:cNvGrpSpPr/>
+        <p:nvPr/>
+      </p:nvGrpSpPr>
+      <p:grpSpPr>
+        <a:xfrm>
+          <a:off x="0" y="0"/>
+          <a:ext cx="0" cy="0"/>
+          <a:chOff x="0" y="0"/>
+          <a:chExt cx="0" cy="0"/>
+        </a:xfrm>
+      </p:grpSpPr>
+      <p:sp>
+        <p:nvSpPr>
+          <p:cNvPr id="2" name="Slide Image Placeholder 1"/>
+          <p:cNvSpPr>
+            <a:spLocks noGrp="1" noRot="1" noChangeAspect="1"/>
+          </p:cNvSpPr>
+          <p:nvPr>
+            <p:ph type="sldImg"/>
+          </p:nvPr>
+        </p:nvSpPr>
+        <p:spPr/>
+      </p:sp>
+      <p:sp>
+        <p:nvSpPr>
+          <p:cNvPr id="3" name="Notes Placeholder 2"/>
+          <p:cNvSpPr>
+            <a:spLocks noGrp="1"/>
+          </p:cNvSpPr>
+          <p:nvPr>
+            <p:ph type="body" idx="1"/>
+          </p:nvPr>
+        </p:nvSpPr>
+        <p:spPr/>
+        <p:txBody>
+          <a:bodyPr/>
+          <a:lstStyle/>
+          <a:p>
+            <a:r>
+              <a:rPr lang="hu-HU" dirty="0"/>
+              <a:t>Lefuttattam</a:t>
+            </a:r>
+            <a:r>
+              <a:rPr lang="hu-HU" baseline="0" dirty="0"/>
+              <a:t> a </a:t>
+            </a:r>
+            <a:r>
+              <a:rPr lang="hu-HU" baseline="0" dirty="0" err="1"/>
+              <a:t>Train</a:t>
+            </a:r>
+            <a:r>
+              <a:rPr lang="hu-HU" baseline="0" dirty="0"/>
+              <a:t> Benchmark két választott eszközén a teljesítménymérést</a:t>
+            </a:r>
+          </a:p>
+          <a:p>
+            <a:r>
+              <a:rPr lang="hu-HU" baseline="0" dirty="0"/>
+              <a:t>Ez a két eszköz a Jena és az RDF4J volt</a:t>
+            </a:r>
+          </a:p>
+          <a:p>
+            <a:r>
+              <a:rPr lang="hu-HU" baseline="0" dirty="0"/>
+              <a:t>Implementáltam egy választott </a:t>
+            </a:r>
+            <a:r>
+              <a:rPr lang="hu-HU" baseline="0" dirty="0" err="1"/>
+              <a:t>gráflekérdező</a:t>
+            </a:r>
+            <a:r>
+              <a:rPr lang="hu-HU" baseline="0" dirty="0"/>
+              <a:t> eszközre, ez volt a </a:t>
+            </a:r>
+            <a:r>
+              <a:rPr lang="hu-HU" baseline="0" dirty="0" err="1"/>
+              <a:t>Graph</a:t>
+            </a:r>
+            <a:r>
+              <a:rPr lang="hu-HU" baseline="0" dirty="0"/>
+              <a:t> </a:t>
+            </a:r>
+            <a:r>
+              <a:rPr lang="hu-HU" baseline="0" dirty="0" err="1"/>
+              <a:t>Engine</a:t>
+            </a:r>
+            <a:r>
+              <a:rPr lang="hu-HU" baseline="0" dirty="0"/>
+              <a:t>.</a:t>
+            </a:r>
+          </a:p>
+          <a:p>
+            <a:r>
+              <a:rPr lang="hu-HU" baseline="0" dirty="0"/>
+              <a:t>A kapott eredményeket kiértékeltem és ez alapján levontam a konklúziót a </a:t>
+            </a:r>
+            <a:r>
+              <a:rPr lang="hu-HU" baseline="0" dirty="0" err="1"/>
+              <a:t>Graph</a:t>
+            </a:r>
+            <a:r>
+              <a:rPr lang="hu-HU" baseline="0" dirty="0"/>
+              <a:t> </a:t>
+            </a:r>
+            <a:r>
+              <a:rPr lang="hu-HU" baseline="0" dirty="0" err="1"/>
+              <a:t>Engine</a:t>
+            </a:r>
+            <a:r>
+              <a:rPr lang="hu-HU" baseline="0" dirty="0"/>
+              <a:t> előnyeiről és hátrányairól</a:t>
+            </a:r>
+          </a:p>
+          <a:p>
+            <a:endParaRPr lang="hu-HU" baseline="0" dirty="0"/>
+          </a:p>
+          <a:p>
+            <a:r>
+              <a:rPr lang="hu-HU" baseline="0" dirty="0"/>
+              <a:t>Létezik egy LIKQ nevű projekt a </a:t>
+            </a:r>
+            <a:r>
+              <a:rPr lang="hu-HU" baseline="0" dirty="0" err="1"/>
+              <a:t>Graph</a:t>
+            </a:r>
+            <a:r>
+              <a:rPr lang="hu-HU" baseline="0" dirty="0"/>
+              <a:t> </a:t>
+            </a:r>
+            <a:r>
+              <a:rPr lang="hu-HU" baseline="0" dirty="0" err="1"/>
+              <a:t>Engine</a:t>
+            </a:r>
+            <a:r>
+              <a:rPr lang="hu-HU" baseline="0" dirty="0"/>
+              <a:t> projekten belül, ami a gráf csúcsai közötti navigációt valósítja meg, ellenben még nincs hozzá dokumentáció, nem sikerült működésre bírni.</a:t>
+            </a:r>
+          </a:p>
+          <a:p>
+            <a:r>
+              <a:rPr lang="hu-HU" baseline="0" dirty="0"/>
+              <a:t>Ez nagy előrelépés lehet, így ha megvalósul, akkor érdemes a teszteket </a:t>
+            </a:r>
+            <a:r>
+              <a:rPr lang="hu-HU" baseline="0" dirty="0" err="1"/>
+              <a:t>újrafuttatni</a:t>
+            </a:r>
+            <a:endParaRPr lang="hu-HU" baseline="0" dirty="0"/>
+          </a:p>
+          <a:p>
+            <a:r>
+              <a:rPr lang="hu-HU" baseline="0" dirty="0"/>
+              <a:t>LINQ támogatása több típusú csúcs eléréséhez.</a:t>
+            </a:r>
+            <a:endParaRPr lang="hu-HU" dirty="0"/>
+          </a:p>
+        </p:txBody>
+      </p:sp>
+      <p:sp>
+        <p:nvSpPr>
+          <p:cNvPr id="4" name="Slide Number Placeholder 3"/>
+          <p:cNvSpPr>
+            <a:spLocks noGrp="1"/>
+          </p:cNvSpPr>
+          <p:nvPr>
+            <p:ph type="sldNum" sz="quarter" idx="10"/>
+          </p:nvPr>
+        </p:nvSpPr>
+        <p:spPr/>
+        <p:txBody>
+          <a:bodyPr/>
+          <a:lstStyle/>
+          <a:p>
+            <a:fld id="{A70A3C59-3253-3B42-8BE0-F6D0BA6B0441}" type="slidenum">
+              <a:rPr lang="en-US" smtClean="0"/>
+              <a:pPr/>
+              <a:t>15</a:t>
+            </a:fld>
+            <a:endParaRPr lang="en-US"/>
+          </a:p>
+        </p:txBody>
+      </p:sp>
+    </p:spTree>
+    <p:extLst>
+      <p:ext uri="{BB962C8B-B14F-4D97-AF65-F5344CB8AC3E}">
+        <p14:creationId xmlns:p14="http://schemas.microsoft.com/office/powerpoint/2010/main" val="3382713487"/>
+      </p:ext>
+    </p:extLst>
+  </p:cSld>
+  <p:clrMapOvr>
+    <a:masterClrMapping/>
+  </p:clrMapOvr>
+</p:notes>
+</file>
+
+<file path=ppt/notesSlides/notesSlide16.xml><?xml version="1.0" encoding="utf-8"?>
 <p:notes xmlns:a="http://schemas.openxmlformats.org/drawingml/2006/main" xmlns:r="http://schemas.openxmlformats.org/officeDocument/2006/relationships" xmlns:p="http://schemas.openxmlformats.org/presentationml/2006/main">
   <p:cSld>
     <p:spTree>
@@ -33313,7 +33786,7 @@
             <a:fld id="{A70A3C59-3253-3B42-8BE0-F6D0BA6B0441}" type="slidenum">
               <a:rPr lang="en-US" smtClean="0"/>
               <a:pPr/>
-              <a:t>15</a:t>
+              <a:t>16</a:t>
             </a:fld>
             <a:endParaRPr lang="en-US"/>
           </a:p>
@@ -33332,7 +33805,7 @@
 </p:notes>
 </file>
 
-<file path=ppt/notesSlides/notesSlide12.xml><?xml version="1.0" encoding="utf-8"?>
+<file path=ppt/notesSlides/notesSlide17.xml><?xml version="1.0" encoding="utf-8"?>
 <p:notes xmlns:a="http://schemas.openxmlformats.org/drawingml/2006/main" xmlns:r="http://schemas.openxmlformats.org/officeDocument/2006/relationships" xmlns:p="http://schemas.openxmlformats.org/presentationml/2006/main">
   <p:cSld>
     <p:spTree>
@@ -33462,7 +33935,7 @@
             <a:fld id="{A70A3C59-3253-3B42-8BE0-F6D0BA6B0441}" type="slidenum">
               <a:rPr lang="en-US" smtClean="0"/>
               <a:pPr/>
-              <a:t>16</a:t>
+              <a:t>17</a:t>
             </a:fld>
             <a:endParaRPr lang="en-US"/>
           </a:p>
@@ -33472,6 +33945,216 @@
     <p:extLst>
       <p:ext uri="{BB962C8B-B14F-4D97-AF65-F5344CB8AC3E}">
         <p14:creationId xmlns:p14="http://schemas.microsoft.com/office/powerpoint/2010/main" val="432445988"/>
+      </p:ext>
+    </p:extLst>
+  </p:cSld>
+  <p:clrMapOvr>
+    <a:masterClrMapping/>
+  </p:clrMapOvr>
+</p:notes>
+</file>
+
+<file path=ppt/notesSlides/notesSlide18.xml><?xml version="1.0" encoding="utf-8"?>
+<p:notes xmlns:a="http://schemas.openxmlformats.org/drawingml/2006/main" xmlns:r="http://schemas.openxmlformats.org/officeDocument/2006/relationships" xmlns:p="http://schemas.openxmlformats.org/presentationml/2006/main">
+  <p:cSld>
+    <p:spTree>
+      <p:nvGrpSpPr>
+        <p:cNvPr id="1" name=""/>
+        <p:cNvGrpSpPr/>
+        <p:nvPr/>
+      </p:nvGrpSpPr>
+      <p:grpSpPr>
+        <a:xfrm>
+          <a:off x="0" y="0"/>
+          <a:ext cx="0" cy="0"/>
+          <a:chOff x="0" y="0"/>
+          <a:chExt cx="0" cy="0"/>
+        </a:xfrm>
+      </p:grpSpPr>
+      <p:sp>
+        <p:nvSpPr>
+          <p:cNvPr id="2" name="Slide Image Placeholder 1"/>
+          <p:cNvSpPr>
+            <a:spLocks noGrp="1" noRot="1" noChangeAspect="1"/>
+          </p:cNvSpPr>
+          <p:nvPr>
+            <p:ph type="sldImg"/>
+          </p:nvPr>
+        </p:nvSpPr>
+        <p:spPr/>
+      </p:sp>
+      <p:sp>
+        <p:nvSpPr>
+          <p:cNvPr id="3" name="Notes Placeholder 2"/>
+          <p:cNvSpPr>
+            <a:spLocks noGrp="1"/>
+          </p:cNvSpPr>
+          <p:nvPr>
+            <p:ph type="body" idx="1"/>
+          </p:nvPr>
+        </p:nvSpPr>
+        <p:spPr/>
+        <p:txBody>
+          <a:bodyPr/>
+          <a:lstStyle/>
+          <a:p>
+            <a:r>
+              <a:rPr lang="hu-HU" dirty="0"/>
+              <a:t>Köszönöm a figyelmet!</a:t>
+            </a:r>
+          </a:p>
+          <a:p>
+            <a:r>
+              <a:rPr lang="hu-HU" dirty="0"/>
+              <a:t>Lefuttattam</a:t>
+            </a:r>
+            <a:r>
+              <a:rPr lang="hu-HU" baseline="0" dirty="0"/>
+              <a:t> a </a:t>
+            </a:r>
+            <a:r>
+              <a:rPr lang="hu-HU" baseline="0" dirty="0" err="1"/>
+              <a:t>Train</a:t>
+            </a:r>
+            <a:r>
+              <a:rPr lang="hu-HU" baseline="0" dirty="0"/>
+              <a:t> Benchmark két választott eszközén a teljesítménymérést</a:t>
+            </a:r>
+          </a:p>
+          <a:p>
+            <a:r>
+              <a:rPr lang="hu-HU" baseline="0" dirty="0"/>
+              <a:t>Ez a két eszköz a Jena és az RDF4J volt</a:t>
+            </a:r>
+          </a:p>
+          <a:p>
+            <a:r>
+              <a:rPr lang="hu-HU" baseline="0" dirty="0"/>
+              <a:t>Implementáltam egy választott </a:t>
+            </a:r>
+            <a:r>
+              <a:rPr lang="hu-HU" baseline="0" dirty="0" err="1"/>
+              <a:t>gráflekérdező</a:t>
+            </a:r>
+            <a:r>
+              <a:rPr lang="hu-HU" baseline="0" dirty="0"/>
+              <a:t> eszközre, ez volt a </a:t>
+            </a:r>
+            <a:r>
+              <a:rPr lang="hu-HU" baseline="0" dirty="0" err="1"/>
+              <a:t>Graph</a:t>
+            </a:r>
+            <a:r>
+              <a:rPr lang="hu-HU" baseline="0" dirty="0"/>
+              <a:t> </a:t>
+            </a:r>
+            <a:r>
+              <a:rPr lang="hu-HU" baseline="0" dirty="0" err="1"/>
+              <a:t>Engine</a:t>
+            </a:r>
+            <a:r>
+              <a:rPr lang="hu-HU" baseline="0" dirty="0"/>
+              <a:t>.</a:t>
+            </a:r>
+          </a:p>
+          <a:p>
+            <a:r>
+              <a:rPr lang="hu-HU" baseline="0" dirty="0"/>
+              <a:t>A kapott eredményeket kiértékeltem és ez alapján levontam a konklúziót a </a:t>
+            </a:r>
+            <a:r>
+              <a:rPr lang="hu-HU" baseline="0" dirty="0" err="1"/>
+              <a:t>Graph</a:t>
+            </a:r>
+            <a:r>
+              <a:rPr lang="hu-HU" baseline="0" dirty="0"/>
+              <a:t> </a:t>
+            </a:r>
+            <a:r>
+              <a:rPr lang="hu-HU" baseline="0" dirty="0" err="1"/>
+              <a:t>Engine</a:t>
+            </a:r>
+            <a:r>
+              <a:rPr lang="hu-HU" baseline="0" dirty="0"/>
+              <a:t> előnyeiről és hátrányairól</a:t>
+            </a:r>
+          </a:p>
+          <a:p>
+            <a:endParaRPr lang="hu-HU" baseline="0" dirty="0"/>
+          </a:p>
+          <a:p>
+            <a:r>
+              <a:rPr lang="hu-HU" baseline="0" dirty="0"/>
+              <a:t>Létezik egy LIKQ nevű projekt a </a:t>
+            </a:r>
+            <a:r>
+              <a:rPr lang="hu-HU" baseline="0" dirty="0" err="1"/>
+              <a:t>Graph</a:t>
+            </a:r>
+            <a:r>
+              <a:rPr lang="hu-HU" baseline="0" dirty="0"/>
+              <a:t> </a:t>
+            </a:r>
+            <a:r>
+              <a:rPr lang="hu-HU" baseline="0" dirty="0" err="1"/>
+              <a:t>Engine</a:t>
+            </a:r>
+            <a:r>
+              <a:rPr lang="hu-HU" baseline="0" dirty="0"/>
+              <a:t> projekten belül, ami a gráf csúcsai közötti navigációt valósítja meg, ellenben még nincs hozzá dokumentáció, nem sikerült működésre bírni.</a:t>
+            </a:r>
+          </a:p>
+          <a:p>
+            <a:r>
+              <a:rPr lang="hu-HU" baseline="0" dirty="0"/>
+              <a:t>Ez nagy előrelépés lehet, így ha megvalósul, akkor érdemes a teszteket </a:t>
+            </a:r>
+            <a:r>
+              <a:rPr lang="hu-HU" baseline="0" dirty="0" err="1"/>
+              <a:t>újrafuttatni</a:t>
+            </a:r>
+            <a:endParaRPr lang="hu-HU" baseline="0" dirty="0"/>
+          </a:p>
+          <a:p>
+            <a:r>
+              <a:rPr lang="hu-HU" baseline="0"/>
+              <a:t>LINQ támogatása több típusú csúcs eléréséhez.</a:t>
+            </a:r>
+            <a:endParaRPr lang="hu-HU"/>
+          </a:p>
+          <a:p>
+            <a:endParaRPr lang="hu-HU" dirty="0"/>
+          </a:p>
+        </p:txBody>
+      </p:sp>
+      <p:sp>
+        <p:nvSpPr>
+          <p:cNvPr id="4" name="Slide Number Placeholder 3"/>
+          <p:cNvSpPr>
+            <a:spLocks noGrp="1"/>
+          </p:cNvSpPr>
+          <p:nvPr>
+            <p:ph type="sldNum" sz="quarter" idx="10"/>
+          </p:nvPr>
+        </p:nvSpPr>
+        <p:spPr/>
+        <p:txBody>
+          <a:bodyPr/>
+          <a:lstStyle/>
+          <a:p>
+            <a:fld id="{A70A3C59-3253-3B42-8BE0-F6D0BA6B0441}" type="slidenum">
+              <a:rPr lang="en-US" smtClean="0"/>
+              <a:pPr/>
+              <a:t>24</a:t>
+            </a:fld>
+            <a:endParaRPr lang="en-US"/>
+          </a:p>
+        </p:txBody>
+      </p:sp>
+    </p:spTree>
+    <p:extLst>
+      <p:ext uri="{BB962C8B-B14F-4D97-AF65-F5344CB8AC3E}">
+        <p14:creationId xmlns:p14="http://schemas.microsoft.com/office/powerpoint/2010/main" val="1181446072"/>
       </p:ext>
     </p:extLst>
   </p:cSld>
@@ -33525,6 +34208,101 @@
           <a:bodyPr/>
           <a:lstStyle/>
           <a:p>
+            <a:r>
+              <a:rPr lang="hu-HU" dirty="0"/>
+              <a:t>A feladataim</a:t>
+            </a:r>
+            <a:r>
+              <a:rPr lang="hu-HU" baseline="0" dirty="0"/>
+              <a:t> a következők voltak:</a:t>
+            </a:r>
+          </a:p>
+          <a:p>
+            <a:r>
+              <a:rPr lang="hu-HU" baseline="0" dirty="0"/>
+              <a:t>Ismertetni a </a:t>
+            </a:r>
+            <a:r>
+              <a:rPr lang="hu-HU" baseline="0" dirty="0" err="1"/>
+              <a:t>Train</a:t>
+            </a:r>
+            <a:r>
+              <a:rPr lang="hu-HU" baseline="0" dirty="0"/>
+              <a:t> benchmark projektet,</a:t>
+            </a:r>
+          </a:p>
+          <a:p>
+            <a:r>
+              <a:rPr lang="hu-HU" baseline="0" dirty="0"/>
+              <a:t>Választani egy </a:t>
+            </a:r>
+            <a:r>
+              <a:rPr lang="hu-HU" baseline="0" dirty="0" err="1"/>
+              <a:t>gráflekérdező</a:t>
+            </a:r>
+            <a:r>
+              <a:rPr lang="hu-HU" baseline="0" dirty="0"/>
+              <a:t> rendszert és implementálni a forgatókönyveket erre a rendszerre</a:t>
+            </a:r>
+          </a:p>
+          <a:p>
+            <a:r>
+              <a:rPr lang="hu-HU" baseline="0" dirty="0"/>
+              <a:t>Ez lett a </a:t>
+            </a:r>
+            <a:r>
+              <a:rPr lang="hu-HU" baseline="0" dirty="0" err="1"/>
+              <a:t>Graph</a:t>
+            </a:r>
+            <a:r>
+              <a:rPr lang="hu-HU" baseline="0" dirty="0"/>
+              <a:t> </a:t>
+            </a:r>
+            <a:r>
+              <a:rPr lang="hu-HU" baseline="0" dirty="0" err="1"/>
+              <a:t>Engine</a:t>
+            </a:r>
+            <a:endParaRPr lang="hu-HU" baseline="0" dirty="0"/>
+          </a:p>
+          <a:p>
+            <a:r>
+              <a:rPr lang="hu-HU" dirty="0"/>
+              <a:t>Lefuttatni ugyanolyan</a:t>
+            </a:r>
+            <a:r>
+              <a:rPr lang="hu-HU" baseline="0" dirty="0"/>
+              <a:t> környezetben</a:t>
+            </a:r>
+            <a:r>
+              <a:rPr lang="hu-HU" dirty="0"/>
+              <a:t> a választott eszközön</a:t>
+            </a:r>
+            <a:r>
+              <a:rPr lang="hu-HU" baseline="0" dirty="0"/>
+              <a:t>, illetve két olyan eszközön, melyre már megvalósult</a:t>
+            </a:r>
+          </a:p>
+          <a:p>
+            <a:r>
+              <a:rPr lang="hu-HU" baseline="0" dirty="0"/>
+              <a:t>A kapott eredmények összehasonlítása, ezáltal a </a:t>
+            </a:r>
+            <a:r>
+              <a:rPr lang="hu-HU" baseline="0" dirty="0" err="1"/>
+              <a:t>Graph</a:t>
+            </a:r>
+            <a:r>
+              <a:rPr lang="hu-HU" baseline="0" dirty="0"/>
+              <a:t> </a:t>
+            </a:r>
+            <a:r>
+              <a:rPr lang="hu-HU" baseline="0" dirty="0" err="1"/>
+              <a:t>Engine</a:t>
+            </a:r>
+            <a:r>
+              <a:rPr lang="hu-HU" baseline="0" dirty="0"/>
+              <a:t> előnyei és hátrányai meghatározása</a:t>
+            </a:r>
             <a:endParaRPr lang="hu-HU" dirty="0"/>
           </a:p>
         </p:txBody>
@@ -33761,6 +34539,116 @@
               <a:rPr lang="en-US" dirty="0" err="1"/>
               <a:t>születhetnek</a:t>
             </a:r>
+            <a:endParaRPr lang="hu-HU" dirty="0"/>
+          </a:p>
+          <a:p>
+            <a:pPr marL="0" marR="0" lvl="0" indent="0" algn="l" defTabSz="457200" rtl="0" eaLnBrk="1" fontAlgn="auto" latinLnBrk="0" hangingPunct="1">
+              <a:lnSpc>
+                <a:spcPct val="100000"/>
+              </a:lnSpc>
+              <a:spcBef>
+                <a:spcPts val="0"/>
+              </a:spcBef>
+              <a:spcAft>
+                <a:spcPts val="0"/>
+              </a:spcAft>
+              <a:buClrTx/>
+              <a:buSzTx/>
+              <a:buFontTx/>
+              <a:buNone/>
+              <a:tabLst/>
+              <a:defRPr/>
+            </a:pPr>
+            <a:r>
+              <a:rPr lang="hu-HU" dirty="0"/>
+              <a:t>Egy</a:t>
+            </a:r>
+            <a:r>
+              <a:rPr lang="hu-HU" baseline="0" dirty="0"/>
+              <a:t> lehetséges összehasonlítás:</a:t>
+            </a:r>
+          </a:p>
+          <a:p>
+            <a:pPr marL="0" marR="0" lvl="0" indent="0" algn="l" defTabSz="457200" rtl="0" eaLnBrk="1" fontAlgn="auto" latinLnBrk="0" hangingPunct="1">
+              <a:lnSpc>
+                <a:spcPct val="100000"/>
+              </a:lnSpc>
+              <a:spcBef>
+                <a:spcPts val="0"/>
+              </a:spcBef>
+              <a:spcAft>
+                <a:spcPts val="0"/>
+              </a:spcAft>
+              <a:buClrTx/>
+              <a:buSzTx/>
+              <a:buFontTx/>
+              <a:buNone/>
+              <a:tabLst/>
+              <a:defRPr/>
+            </a:pPr>
+            <a:r>
+              <a:rPr lang="en-US" dirty="0" err="1"/>
+              <a:t>Modellvalidációs</a:t>
+            </a:r>
+            <a:r>
+              <a:rPr lang="en-US" dirty="0"/>
+              <a:t> </a:t>
+            </a:r>
+            <a:r>
+              <a:rPr lang="en-US" dirty="0" err="1"/>
+              <a:t>problémák</a:t>
+            </a:r>
+            <a:r>
+              <a:rPr lang="en-US" dirty="0"/>
+              <a:t> – </a:t>
+            </a:r>
+            <a:r>
+              <a:rPr lang="en-US" dirty="0" err="1"/>
+              <a:t>különböző</a:t>
+            </a:r>
+            <a:r>
+              <a:rPr lang="en-US" dirty="0"/>
+              <a:t> </a:t>
+            </a:r>
+            <a:r>
+              <a:rPr lang="en-US" dirty="0" err="1"/>
+              <a:t>modellalapú</a:t>
+            </a:r>
+            <a:r>
+              <a:rPr lang="en-US" dirty="0"/>
+              <a:t> </a:t>
+            </a:r>
+            <a:r>
+              <a:rPr lang="en-US" dirty="0" err="1"/>
+              <a:t>fejlesztés</a:t>
+            </a:r>
+            <a:r>
+              <a:rPr lang="en-US" dirty="0"/>
+              <a:t> </a:t>
+            </a:r>
+            <a:r>
+              <a:rPr lang="en-US" dirty="0" err="1"/>
+              <a:t>során</a:t>
+            </a:r>
+            <a:r>
+              <a:rPr lang="en-US" dirty="0"/>
+              <a:t> </a:t>
+            </a:r>
+            <a:r>
+              <a:rPr lang="en-US" dirty="0" err="1"/>
+              <a:t>bizonyos</a:t>
+            </a:r>
+            <a:r>
+              <a:rPr lang="en-US" dirty="0"/>
+              <a:t> </a:t>
+            </a:r>
+            <a:r>
+              <a:rPr lang="en-US" dirty="0" err="1"/>
+              <a:t>kényszerek</a:t>
+            </a:r>
+            <a:endParaRPr lang="en-US" dirty="0"/>
+          </a:p>
+          <a:p>
             <a:endParaRPr lang="en-US" dirty="0"/>
           </a:p>
           <a:p>
@@ -34026,6 +34914,129 @@
           <a:lstStyle/>
           <a:p>
             <a:r>
+              <a:rPr lang="hu-HU" dirty="0"/>
+              <a:t>A </a:t>
+            </a:r>
+            <a:r>
+              <a:rPr lang="hu-HU" dirty="0" err="1"/>
+              <a:t>Train</a:t>
+            </a:r>
+            <a:r>
+              <a:rPr lang="hu-HU" dirty="0"/>
+              <a:t> Benchmark projekt már sok eszközre</a:t>
+            </a:r>
+            <a:r>
+              <a:rPr lang="hu-HU" baseline="0" dirty="0"/>
+              <a:t> megvalósult</a:t>
+            </a:r>
+          </a:p>
+          <a:p>
+            <a:r>
+              <a:rPr lang="hu-HU" baseline="0" dirty="0"/>
+              <a:t>A dolgozat célja a megvalósítás egy új eszközre (</a:t>
+            </a:r>
+            <a:r>
+              <a:rPr lang="hu-HU" baseline="0" dirty="0" err="1"/>
+              <a:t>Graph</a:t>
+            </a:r>
+            <a:r>
+              <a:rPr lang="hu-HU" baseline="0" dirty="0"/>
+              <a:t> </a:t>
+            </a:r>
+            <a:r>
+              <a:rPr lang="hu-HU" baseline="0" dirty="0" err="1"/>
+              <a:t>Engine</a:t>
+            </a:r>
+            <a:r>
+              <a:rPr lang="hu-HU" baseline="0" dirty="0"/>
+              <a:t>)</a:t>
+            </a:r>
+            <a:endParaRPr lang="hu-HU" dirty="0"/>
+          </a:p>
+        </p:txBody>
+      </p:sp>
+      <p:sp>
+        <p:nvSpPr>
+          <p:cNvPr id="4" name="Slide Number Placeholder 3"/>
+          <p:cNvSpPr>
+            <a:spLocks noGrp="1"/>
+          </p:cNvSpPr>
+          <p:nvPr>
+            <p:ph type="sldNum" sz="quarter" idx="10"/>
+          </p:nvPr>
+        </p:nvSpPr>
+        <p:spPr/>
+        <p:txBody>
+          <a:bodyPr/>
+          <a:lstStyle/>
+          <a:p>
+            <a:fld id="{A70A3C59-3253-3B42-8BE0-F6D0BA6B0441}" type="slidenum">
+              <a:rPr lang="en-US" smtClean="0"/>
+              <a:pPr/>
+              <a:t>5</a:t>
+            </a:fld>
+            <a:endParaRPr lang="en-US"/>
+          </a:p>
+        </p:txBody>
+      </p:sp>
+    </p:spTree>
+    <p:extLst>
+      <p:ext uri="{BB962C8B-B14F-4D97-AF65-F5344CB8AC3E}">
+        <p14:creationId xmlns:p14="http://schemas.microsoft.com/office/powerpoint/2010/main" val="714637564"/>
+      </p:ext>
+    </p:extLst>
+  </p:cSld>
+  <p:clrMapOvr>
+    <a:masterClrMapping/>
+  </p:clrMapOvr>
+</p:notes>
+</file>
+
+<file path=ppt/notesSlides/notesSlide6.xml><?xml version="1.0" encoding="utf-8"?>
+<p:notes xmlns:a="http://schemas.openxmlformats.org/drawingml/2006/main" xmlns:r="http://schemas.openxmlformats.org/officeDocument/2006/relationships" xmlns:p="http://schemas.openxmlformats.org/presentationml/2006/main">
+  <p:cSld>
+    <p:spTree>
+      <p:nvGrpSpPr>
+        <p:cNvPr id="1" name=""/>
+        <p:cNvGrpSpPr/>
+        <p:nvPr/>
+      </p:nvGrpSpPr>
+      <p:grpSpPr>
+        <a:xfrm>
+          <a:off x="0" y="0"/>
+          <a:ext cx="0" cy="0"/>
+          <a:chOff x="0" y="0"/>
+          <a:chExt cx="0" cy="0"/>
+        </a:xfrm>
+      </p:grpSpPr>
+      <p:sp>
+        <p:nvSpPr>
+          <p:cNvPr id="2" name="Slide Image Placeholder 1"/>
+          <p:cNvSpPr>
+            <a:spLocks noGrp="1" noRot="1" noChangeAspect="1"/>
+          </p:cNvSpPr>
+          <p:nvPr>
+            <p:ph type="sldImg"/>
+          </p:nvPr>
+        </p:nvSpPr>
+        <p:spPr/>
+      </p:sp>
+      <p:sp>
+        <p:nvSpPr>
+          <p:cNvPr id="3" name="Notes Placeholder 2"/>
+          <p:cNvSpPr>
+            <a:spLocks noGrp="1"/>
+          </p:cNvSpPr>
+          <p:nvPr>
+            <p:ph type="body" idx="1"/>
+          </p:nvPr>
+        </p:nvSpPr>
+        <p:spPr/>
+        <p:txBody>
+          <a:bodyPr/>
+          <a:lstStyle/>
+          <a:p>
+            <a:r>
               <a:rPr lang="hu-HU" noProof="0" dirty="0"/>
               <a:t>Vasúti elemekből álló modell</a:t>
             </a:r>
@@ -34038,6 +35049,23 @@
             <a:r>
               <a:rPr lang="hu-HU" noProof="0" dirty="0" err="1"/>
               <a:t>stb</a:t>
+            </a:r>
+            <a:endParaRPr lang="hu-HU" noProof="0" dirty="0"/>
+          </a:p>
+          <a:p>
+            <a:r>
+              <a:rPr lang="hu-HU" noProof="0" dirty="0"/>
+              <a:t>Több eszközre megvalósult,</a:t>
+            </a:r>
+            <a:r>
+              <a:rPr lang="hu-HU" baseline="0" noProof="0" dirty="0"/>
+              <a:t> platformfüggetlen eszközökkel, de csak Linuxon lett futtatva</a:t>
+            </a:r>
+          </a:p>
+          <a:p>
+            <a:r>
+              <a:rPr lang="hu-HU" noProof="0" dirty="0"/>
+              <a:t>Három forgatókönyvet határoz meg</a:t>
             </a:r>
             <a:endParaRPr lang="en-US" noProof="0" dirty="0"/>
           </a:p>
@@ -34078,119 +35106,6 @@
     <p:extLst>
       <p:ext uri="{BB962C8B-B14F-4D97-AF65-F5344CB8AC3E}">
         <p14:creationId xmlns:p14="http://schemas.microsoft.com/office/powerpoint/2010/main" val="709621982"/>
-      </p:ext>
-    </p:extLst>
-  </p:cSld>
-  <p:clrMapOvr>
-    <a:masterClrMapping/>
-  </p:clrMapOvr>
-</p:notes>
-</file>
-
-<file path=ppt/notesSlides/notesSlide6.xml><?xml version="1.0" encoding="utf-8"?>
-<p:notes xmlns:a="http://schemas.openxmlformats.org/drawingml/2006/main" xmlns:r="http://schemas.openxmlformats.org/officeDocument/2006/relationships" xmlns:p="http://schemas.openxmlformats.org/presentationml/2006/main">
-  <p:cSld>
-    <p:spTree>
-      <p:nvGrpSpPr>
-        <p:cNvPr id="1" name=""/>
-        <p:cNvGrpSpPr/>
-        <p:nvPr/>
-      </p:nvGrpSpPr>
-      <p:grpSpPr>
-        <a:xfrm>
-          <a:off x="0" y="0"/>
-          <a:ext cx="0" cy="0"/>
-          <a:chOff x="0" y="0"/>
-          <a:chExt cx="0" cy="0"/>
-        </a:xfrm>
-      </p:grpSpPr>
-      <p:sp>
-        <p:nvSpPr>
-          <p:cNvPr id="2" name="Diakép helye 1"/>
-          <p:cNvSpPr>
-            <a:spLocks noGrp="1" noRot="1" noChangeAspect="1"/>
-          </p:cNvSpPr>
-          <p:nvPr>
-            <p:ph type="sldImg"/>
-          </p:nvPr>
-        </p:nvSpPr>
-        <p:spPr/>
-      </p:sp>
-      <p:sp>
-        <p:nvSpPr>
-          <p:cNvPr id="3" name="Jegyzetek helye 2"/>
-          <p:cNvSpPr>
-            <a:spLocks noGrp="1"/>
-          </p:cNvSpPr>
-          <p:nvPr>
-            <p:ph type="body" idx="1"/>
-          </p:nvPr>
-        </p:nvSpPr>
-        <p:spPr/>
-        <p:txBody>
-          <a:bodyPr/>
-          <a:lstStyle/>
-          <a:p>
-            <a:r>
-              <a:rPr lang="en-US" dirty="0" err="1"/>
-              <a:t>Fejlesztés</a:t>
-            </a:r>
-            <a:r>
-              <a:rPr lang="en-US" dirty="0"/>
-              <a:t> </a:t>
-            </a:r>
-            <a:r>
-              <a:rPr lang="en-US" dirty="0" err="1"/>
-              <a:t>lépései</a:t>
-            </a:r>
-            <a:r>
-              <a:rPr lang="en-US" dirty="0"/>
-              <a:t>, </a:t>
-            </a:r>
-            <a:r>
-              <a:rPr lang="en-US" dirty="0" err="1"/>
-              <a:t>különböző</a:t>
-            </a:r>
-            <a:r>
-              <a:rPr lang="en-US" dirty="0"/>
-              <a:t> benchmark </a:t>
-            </a:r>
-            <a:r>
-              <a:rPr lang="en-US" dirty="0" err="1"/>
-              <a:t>forgatókönyvek</a:t>
-            </a:r>
-            <a:endParaRPr lang="hu-HU" dirty="0"/>
-          </a:p>
-        </p:txBody>
-      </p:sp>
-      <p:sp>
-        <p:nvSpPr>
-          <p:cNvPr id="4" name="Dia számának helye 3"/>
-          <p:cNvSpPr>
-            <a:spLocks noGrp="1"/>
-          </p:cNvSpPr>
-          <p:nvPr>
-            <p:ph type="sldNum" sz="quarter" idx="10"/>
-          </p:nvPr>
-        </p:nvSpPr>
-        <p:spPr/>
-        <p:txBody>
-          <a:bodyPr/>
-          <a:lstStyle/>
-          <a:p>
-            <a:fld id="{A70A3C59-3253-3B42-8BE0-F6D0BA6B0441}" type="slidenum">
-              <a:rPr lang="en-US" smtClean="0"/>
-              <a:pPr/>
-              <a:t>7</a:t>
-            </a:fld>
-            <a:endParaRPr lang="en-US"/>
-          </a:p>
-        </p:txBody>
-      </p:sp>
-    </p:spTree>
-    <p:extLst>
-      <p:ext uri="{BB962C8B-B14F-4D97-AF65-F5344CB8AC3E}">
-        <p14:creationId xmlns:p14="http://schemas.microsoft.com/office/powerpoint/2010/main" val="1306959785"/>
       </p:ext>
     </p:extLst>
   </p:cSld>
@@ -34245,6 +35160,168 @@
           <a:lstStyle/>
           <a:p>
             <a:r>
+              <a:rPr lang="en-US" dirty="0" err="1"/>
+              <a:t>Fejlesztés</a:t>
+            </a:r>
+            <a:r>
+              <a:rPr lang="en-US" dirty="0"/>
+              <a:t> </a:t>
+            </a:r>
+            <a:r>
+              <a:rPr lang="en-US" dirty="0" err="1"/>
+              <a:t>lépései</a:t>
+            </a:r>
+            <a:r>
+              <a:rPr lang="en-US" dirty="0"/>
+              <a:t>, </a:t>
+            </a:r>
+            <a:r>
+              <a:rPr lang="en-US" dirty="0" err="1"/>
+              <a:t>különböző</a:t>
+            </a:r>
+            <a:r>
+              <a:rPr lang="en-US" dirty="0"/>
+              <a:t> benchmark </a:t>
+            </a:r>
+            <a:r>
+              <a:rPr lang="en-US" dirty="0" err="1"/>
+              <a:t>forgatókönyvek</a:t>
+            </a:r>
+            <a:endParaRPr lang="hu-HU" dirty="0"/>
+          </a:p>
+          <a:p>
+            <a:r>
+              <a:rPr lang="hu-HU" dirty="0"/>
+              <a:t>A Batch csak a beolvasás és </a:t>
+            </a:r>
+            <a:r>
+              <a:rPr lang="hu-HU" dirty="0" err="1"/>
+              <a:t>validáció</a:t>
+            </a:r>
+            <a:r>
+              <a:rPr lang="hu-HU" dirty="0"/>
+              <a:t> lépésekből</a:t>
+            </a:r>
+            <a:r>
+              <a:rPr lang="hu-HU" baseline="0" dirty="0"/>
+              <a:t> áll, ott nincs módosítás</a:t>
+            </a:r>
+          </a:p>
+          <a:p>
+            <a:r>
+              <a:rPr lang="hu-HU" baseline="0" dirty="0" err="1"/>
+              <a:t>Inject</a:t>
+            </a:r>
+            <a:r>
+              <a:rPr lang="hu-HU" baseline="0" dirty="0"/>
+              <a:t> - Hibainjektálás</a:t>
+            </a:r>
+          </a:p>
+          <a:p>
+            <a:r>
+              <a:rPr lang="hu-HU" baseline="0" dirty="0" err="1"/>
+              <a:t>Repair</a:t>
+            </a:r>
+            <a:r>
+              <a:rPr lang="hu-HU" baseline="0" dirty="0"/>
+              <a:t> - Hibajavítás</a:t>
+            </a:r>
+            <a:endParaRPr lang="hu-HU" dirty="0"/>
+          </a:p>
+        </p:txBody>
+      </p:sp>
+      <p:sp>
+        <p:nvSpPr>
+          <p:cNvPr id="4" name="Dia számának helye 3"/>
+          <p:cNvSpPr>
+            <a:spLocks noGrp="1"/>
+          </p:cNvSpPr>
+          <p:nvPr>
+            <p:ph type="sldNum" sz="quarter" idx="10"/>
+          </p:nvPr>
+        </p:nvSpPr>
+        <p:spPr/>
+        <p:txBody>
+          <a:bodyPr/>
+          <a:lstStyle/>
+          <a:p>
+            <a:fld id="{A70A3C59-3253-3B42-8BE0-F6D0BA6B0441}" type="slidenum">
+              <a:rPr lang="en-US" smtClean="0"/>
+              <a:pPr/>
+              <a:t>7</a:t>
+            </a:fld>
+            <a:endParaRPr lang="en-US"/>
+          </a:p>
+        </p:txBody>
+      </p:sp>
+    </p:spTree>
+    <p:extLst>
+      <p:ext uri="{BB962C8B-B14F-4D97-AF65-F5344CB8AC3E}">
+        <p14:creationId xmlns:p14="http://schemas.microsoft.com/office/powerpoint/2010/main" val="1306959785"/>
+      </p:ext>
+    </p:extLst>
+  </p:cSld>
+  <p:clrMapOvr>
+    <a:masterClrMapping/>
+  </p:clrMapOvr>
+</p:notes>
+</file>
+
+<file path=ppt/notesSlides/notesSlide8.xml><?xml version="1.0" encoding="utf-8"?>
+<p:notes xmlns:a="http://schemas.openxmlformats.org/drawingml/2006/main" xmlns:r="http://schemas.openxmlformats.org/officeDocument/2006/relationships" xmlns:p="http://schemas.openxmlformats.org/presentationml/2006/main">
+  <p:cSld>
+    <p:spTree>
+      <p:nvGrpSpPr>
+        <p:cNvPr id="1" name=""/>
+        <p:cNvGrpSpPr/>
+        <p:nvPr/>
+      </p:nvGrpSpPr>
+      <p:grpSpPr>
+        <a:xfrm>
+          <a:off x="0" y="0"/>
+          <a:ext cx="0" cy="0"/>
+          <a:chOff x="0" y="0"/>
+          <a:chExt cx="0" cy="0"/>
+        </a:xfrm>
+      </p:grpSpPr>
+      <p:sp>
+        <p:nvSpPr>
+          <p:cNvPr id="2" name="Diakép helye 1"/>
+          <p:cNvSpPr>
+            <a:spLocks noGrp="1" noRot="1" noChangeAspect="1"/>
+          </p:cNvSpPr>
+          <p:nvPr>
+            <p:ph type="sldImg"/>
+          </p:nvPr>
+        </p:nvSpPr>
+        <p:spPr/>
+      </p:sp>
+      <p:sp>
+        <p:nvSpPr>
+          <p:cNvPr id="3" name="Jegyzetek helye 2"/>
+          <p:cNvSpPr>
+            <a:spLocks noGrp="1"/>
+          </p:cNvSpPr>
+          <p:nvPr>
+            <p:ph type="body" idx="1"/>
+          </p:nvPr>
+        </p:nvSpPr>
+        <p:spPr/>
+        <p:txBody>
+          <a:bodyPr/>
+          <a:lstStyle/>
+          <a:p>
+            <a:r>
+              <a:rPr lang="hu-HU" dirty="0"/>
+              <a:t>A Microsoft cég</a:t>
+            </a:r>
+            <a:r>
+              <a:rPr lang="hu-HU" baseline="0" dirty="0"/>
+              <a:t> egy projektje</a:t>
+            </a:r>
+          </a:p>
+          <a:p>
+            <a:r>
               <a:rPr lang="en-US" dirty="0"/>
               <a:t>Slave-</a:t>
             </a:r>
@@ -34422,254 +35499,6 @@
     <p:extLst>
       <p:ext uri="{BB962C8B-B14F-4D97-AF65-F5344CB8AC3E}">
         <p14:creationId xmlns:p14="http://schemas.microsoft.com/office/powerpoint/2010/main" val="1201794871"/>
-      </p:ext>
-    </p:extLst>
-  </p:cSld>
-  <p:clrMapOvr>
-    <a:masterClrMapping/>
-  </p:clrMapOvr>
-</p:notes>
-</file>
-
-<file path=ppt/notesSlides/notesSlide8.xml><?xml version="1.0" encoding="utf-8"?>
-<p:notes xmlns:a="http://schemas.openxmlformats.org/drawingml/2006/main" xmlns:r="http://schemas.openxmlformats.org/officeDocument/2006/relationships" xmlns:p="http://schemas.openxmlformats.org/presentationml/2006/main">
-  <p:cSld>
-    <p:spTree>
-      <p:nvGrpSpPr>
-        <p:cNvPr id="1" name=""/>
-        <p:cNvGrpSpPr/>
-        <p:nvPr/>
-      </p:nvGrpSpPr>
-      <p:grpSpPr>
-        <a:xfrm>
-          <a:off x="0" y="0"/>
-          <a:ext cx="0" cy="0"/>
-          <a:chOff x="0" y="0"/>
-          <a:chExt cx="0" cy="0"/>
-        </a:xfrm>
-      </p:grpSpPr>
-      <p:sp>
-        <p:nvSpPr>
-          <p:cNvPr id="2" name="Slide Image Placeholder 1"/>
-          <p:cNvSpPr>
-            <a:spLocks noGrp="1" noRot="1" noChangeAspect="1"/>
-          </p:cNvSpPr>
-          <p:nvPr>
-            <p:ph type="sldImg"/>
-          </p:nvPr>
-        </p:nvSpPr>
-        <p:spPr/>
-      </p:sp>
-      <p:sp>
-        <p:nvSpPr>
-          <p:cNvPr id="3" name="Notes Placeholder 2"/>
-          <p:cNvSpPr>
-            <a:spLocks noGrp="1"/>
-          </p:cNvSpPr>
-          <p:nvPr>
-            <p:ph type="body" idx="1"/>
-          </p:nvPr>
-        </p:nvSpPr>
-        <p:spPr/>
-        <p:txBody>
-          <a:bodyPr/>
-          <a:lstStyle/>
-          <a:p>
-            <a:r>
-              <a:rPr lang="en-US" dirty="0" err="1"/>
-              <a:t>Esetünkben</a:t>
-            </a:r>
-            <a:r>
-              <a:rPr lang="en-US" dirty="0"/>
-              <a:t>  a </a:t>
-            </a:r>
-            <a:r>
-              <a:rPr lang="en-US" dirty="0" err="1"/>
-              <a:t>kliens</a:t>
-            </a:r>
-            <a:r>
-              <a:rPr lang="en-US" dirty="0"/>
-              <a:t>, </a:t>
-            </a:r>
-            <a:r>
-              <a:rPr lang="en-US" dirty="0" err="1"/>
-              <a:t>szerver</a:t>
-            </a:r>
-            <a:r>
-              <a:rPr lang="en-US" dirty="0"/>
-              <a:t> </a:t>
-            </a:r>
-            <a:r>
-              <a:rPr lang="en-US" dirty="0" err="1"/>
-              <a:t>együtt</a:t>
-            </a:r>
-            <a:endParaRPr lang="en-US" dirty="0"/>
-          </a:p>
-          <a:p>
-            <a:r>
-              <a:rPr lang="en-US" dirty="0"/>
-              <a:t>TSL </a:t>
-            </a:r>
-            <a:r>
-              <a:rPr lang="en-US" dirty="0" err="1"/>
-              <a:t>nyelv</a:t>
-            </a:r>
-            <a:r>
-              <a:rPr lang="en-US" dirty="0"/>
-              <a:t>  C-</a:t>
-            </a:r>
-            <a:r>
-              <a:rPr lang="en-US" dirty="0" err="1"/>
-              <a:t>hez</a:t>
-            </a:r>
-            <a:r>
-              <a:rPr lang="en-US" dirty="0"/>
-              <a:t> </a:t>
-            </a:r>
-            <a:r>
-              <a:rPr lang="en-US" dirty="0" err="1"/>
-              <a:t>hasonló</a:t>
-            </a:r>
-            <a:r>
-              <a:rPr lang="en-US" dirty="0"/>
-              <a:t>, struct-</a:t>
-            </a:r>
-            <a:r>
-              <a:rPr lang="en-US" dirty="0" err="1"/>
-              <a:t>szer</a:t>
-            </a:r>
-            <a:r>
-              <a:rPr lang="hu-HU" dirty="0"/>
-              <a:t>ű</a:t>
-            </a:r>
-            <a:r>
-              <a:rPr lang="en-US" dirty="0"/>
-              <a:t> </a:t>
-            </a:r>
-            <a:r>
-              <a:rPr lang="en-US" dirty="0" err="1"/>
-              <a:t>konténerekben</a:t>
-            </a:r>
-            <a:r>
-              <a:rPr lang="en-US" dirty="0"/>
-              <a:t> </a:t>
-            </a:r>
-            <a:r>
-              <a:rPr lang="en-US" dirty="0" err="1"/>
-              <a:t>tárolja</a:t>
-            </a:r>
-            <a:r>
-              <a:rPr lang="en-US" dirty="0"/>
-              <a:t> a Graph Engine a </a:t>
-            </a:r>
-            <a:r>
-              <a:rPr lang="en-US" dirty="0" err="1"/>
-              <a:t>csúcsokat</a:t>
-            </a:r>
-            <a:r>
-              <a:rPr lang="en-US" dirty="0"/>
-              <a:t>, </a:t>
-            </a:r>
-            <a:r>
-              <a:rPr lang="en-US" dirty="0" err="1"/>
-              <a:t>ezeknek</a:t>
-            </a:r>
-            <a:r>
-              <a:rPr lang="en-US" dirty="0"/>
-              <a:t> </a:t>
-            </a:r>
-            <a:r>
-              <a:rPr lang="en-US" dirty="0" err="1"/>
-              <a:t>kötött</a:t>
-            </a:r>
-            <a:r>
-              <a:rPr lang="en-US" dirty="0"/>
-              <a:t> </a:t>
-            </a:r>
-            <a:r>
-              <a:rPr lang="en-US" dirty="0" err="1"/>
-              <a:t>típusa</a:t>
-            </a:r>
-            <a:r>
-              <a:rPr lang="en-US" dirty="0"/>
-              <a:t> van.</a:t>
-            </a:r>
-          </a:p>
-          <a:p>
-            <a:r>
-              <a:rPr lang="en-US" dirty="0"/>
-              <a:t>C# </a:t>
-            </a:r>
-            <a:r>
-              <a:rPr lang="en-US" dirty="0" err="1"/>
-              <a:t>projektben</a:t>
-            </a:r>
-            <a:r>
-              <a:rPr lang="en-US" dirty="0"/>
-              <a:t> </a:t>
-            </a:r>
-            <a:r>
-              <a:rPr lang="en-US" dirty="0" err="1"/>
-              <a:t>minden</a:t>
-            </a:r>
-            <a:r>
-              <a:rPr lang="en-US" dirty="0"/>
-              <a:t> </a:t>
-            </a:r>
-            <a:r>
-              <a:rPr lang="en-US" dirty="0" err="1"/>
-              <a:t>más</a:t>
-            </a:r>
-            <a:r>
-              <a:rPr lang="en-US" dirty="0"/>
-              <a:t> (a program)</a:t>
-            </a:r>
-          </a:p>
-          <a:p>
-            <a:r>
-              <a:rPr lang="en-US" dirty="0" err="1"/>
-              <a:t>Accessorok</a:t>
-            </a:r>
-            <a:r>
-              <a:rPr lang="en-US" dirty="0"/>
-              <a:t> – </a:t>
-            </a:r>
-            <a:r>
-              <a:rPr lang="en-US" dirty="0" err="1"/>
-              <a:t>Adatelérés</a:t>
-            </a:r>
-            <a:endParaRPr lang="hu-HU" dirty="0"/>
-          </a:p>
-        </p:txBody>
-      </p:sp>
-      <p:sp>
-        <p:nvSpPr>
-          <p:cNvPr id="4" name="Slide Number Placeholder 3"/>
-          <p:cNvSpPr>
-            <a:spLocks noGrp="1"/>
-          </p:cNvSpPr>
-          <p:nvPr>
-            <p:ph type="sldNum" sz="quarter" idx="10"/>
-          </p:nvPr>
-        </p:nvSpPr>
-        <p:spPr/>
-        <p:txBody>
-          <a:bodyPr/>
-          <a:lstStyle/>
-          <a:p>
-            <a:fld id="{A70A3C59-3253-3B42-8BE0-F6D0BA6B0441}" type="slidenum">
-              <a:rPr lang="en-US" smtClean="0"/>
-              <a:pPr/>
-              <a:t>9</a:t>
-            </a:fld>
-            <a:endParaRPr lang="en-US"/>
-          </a:p>
-        </p:txBody>
-      </p:sp>
-    </p:spTree>
-    <p:extLst>
-      <p:ext uri="{BB962C8B-B14F-4D97-AF65-F5344CB8AC3E}">
-        <p14:creationId xmlns:p14="http://schemas.microsoft.com/office/powerpoint/2010/main" val="1475731141"/>
       </p:ext>
     </p:extLst>
   </p:cSld>
@@ -34724,21 +35553,186 @@
           <a:lstStyle/>
           <a:p>
             <a:r>
-              <a:rPr lang="hu-HU" noProof="0" dirty="0" err="1"/>
-              <a:t>Recheck</a:t>
-            </a:r>
-            <a:r>
-              <a:rPr lang="hu-HU" noProof="0" dirty="0"/>
-              <a:t> eredményei minden esetben megegyeznek a </a:t>
-            </a:r>
-            <a:r>
-              <a:rPr lang="hu-HU" noProof="0" dirty="0" err="1"/>
-              <a:t>Check</a:t>
-            </a:r>
-            <a:r>
-              <a:rPr lang="hu-HU" noProof="0" dirty="0"/>
-              <a:t> eredményeivel.</a:t>
-            </a:r>
+              <a:rPr lang="en-US" dirty="0" err="1"/>
+              <a:t>Esetünkben</a:t>
+            </a:r>
+            <a:r>
+              <a:rPr lang="en-US" dirty="0"/>
+              <a:t>  a </a:t>
+            </a:r>
+            <a:r>
+              <a:rPr lang="en-US" dirty="0" err="1"/>
+              <a:t>kliens</a:t>
+            </a:r>
+            <a:r>
+              <a:rPr lang="en-US" dirty="0"/>
+              <a:t>, </a:t>
+            </a:r>
+            <a:r>
+              <a:rPr lang="en-US" dirty="0" err="1"/>
+              <a:t>szerver</a:t>
+            </a:r>
+            <a:r>
+              <a:rPr lang="en-US" dirty="0"/>
+              <a:t> </a:t>
+            </a:r>
+            <a:r>
+              <a:rPr lang="en-US" dirty="0" err="1"/>
+              <a:t>együtt</a:t>
+            </a:r>
+            <a:endParaRPr lang="en-US" dirty="0"/>
+          </a:p>
+          <a:p>
+            <a:r>
+              <a:rPr lang="en-US" dirty="0"/>
+              <a:t>TSL </a:t>
+            </a:r>
+            <a:r>
+              <a:rPr lang="en-US" dirty="0" err="1"/>
+              <a:t>nyelv</a:t>
+            </a:r>
+            <a:r>
+              <a:rPr lang="en-US" dirty="0"/>
+              <a:t>  C-</a:t>
+            </a:r>
+            <a:r>
+              <a:rPr lang="en-US" dirty="0" err="1"/>
+              <a:t>hez</a:t>
+            </a:r>
+            <a:r>
+              <a:rPr lang="en-US" dirty="0"/>
+              <a:t> </a:t>
+            </a:r>
+            <a:r>
+              <a:rPr lang="en-US" dirty="0" err="1"/>
+              <a:t>hasonló</a:t>
+            </a:r>
+            <a:r>
+              <a:rPr lang="en-US" dirty="0"/>
+              <a:t>, struct-</a:t>
+            </a:r>
+            <a:r>
+              <a:rPr lang="en-US" dirty="0" err="1"/>
+              <a:t>szer</a:t>
+            </a:r>
+            <a:r>
+              <a:rPr lang="hu-HU" dirty="0"/>
+              <a:t>ű</a:t>
+            </a:r>
+            <a:r>
+              <a:rPr lang="en-US" dirty="0"/>
+              <a:t> </a:t>
+            </a:r>
+            <a:r>
+              <a:rPr lang="en-US" dirty="0" err="1"/>
+              <a:t>konténerekben</a:t>
+            </a:r>
+            <a:r>
+              <a:rPr lang="en-US" dirty="0"/>
+              <a:t> </a:t>
+            </a:r>
+            <a:r>
+              <a:rPr lang="en-US" dirty="0" err="1"/>
+              <a:t>tárolja</a:t>
+            </a:r>
+            <a:r>
+              <a:rPr lang="en-US" dirty="0"/>
+              <a:t> a Graph Engine a </a:t>
+            </a:r>
+            <a:r>
+              <a:rPr lang="en-US" dirty="0" err="1"/>
+              <a:t>csúcsokat</a:t>
+            </a:r>
+            <a:r>
+              <a:rPr lang="en-US" dirty="0"/>
+              <a:t>, </a:t>
+            </a:r>
+            <a:r>
+              <a:rPr lang="en-US" dirty="0" err="1"/>
+              <a:t>ezeknek</a:t>
+            </a:r>
+            <a:r>
+              <a:rPr lang="en-US" dirty="0"/>
+              <a:t> </a:t>
+            </a:r>
+            <a:r>
+              <a:rPr lang="en-US" dirty="0" err="1"/>
+              <a:t>kötött</a:t>
+            </a:r>
+            <a:r>
+              <a:rPr lang="en-US" dirty="0"/>
+              <a:t> </a:t>
+            </a:r>
+            <a:r>
+              <a:rPr lang="en-US" dirty="0" err="1"/>
+              <a:t>típusa</a:t>
+            </a:r>
+            <a:r>
+              <a:rPr lang="en-US" dirty="0"/>
+              <a:t> van.</a:t>
+            </a:r>
+          </a:p>
+          <a:p>
+            <a:r>
+              <a:rPr lang="en-US" dirty="0"/>
+              <a:t>C# </a:t>
+            </a:r>
+            <a:r>
+              <a:rPr lang="en-US" dirty="0" err="1"/>
+              <a:t>projektben</a:t>
+            </a:r>
+            <a:r>
+              <a:rPr lang="en-US" dirty="0"/>
+              <a:t> </a:t>
+            </a:r>
+            <a:r>
+              <a:rPr lang="en-US" dirty="0" err="1"/>
+              <a:t>minden</a:t>
+            </a:r>
+            <a:r>
+              <a:rPr lang="en-US" dirty="0"/>
+              <a:t> </a:t>
+            </a:r>
+            <a:r>
+              <a:rPr lang="en-US" dirty="0" err="1"/>
+              <a:t>más</a:t>
+            </a:r>
+            <a:r>
+              <a:rPr lang="en-US" dirty="0"/>
+              <a:t> (a program)</a:t>
+            </a:r>
+          </a:p>
+          <a:p>
+            <a:r>
+              <a:rPr lang="en-US" dirty="0" err="1"/>
+              <a:t>Accessorok</a:t>
+            </a:r>
+            <a:r>
+              <a:rPr lang="en-US" dirty="0"/>
+              <a:t> – </a:t>
+            </a:r>
+            <a:r>
+              <a:rPr lang="en-US" dirty="0" err="1"/>
+              <a:t>Adatelérés</a:t>
+            </a:r>
+            <a:endParaRPr lang="hu-HU" dirty="0"/>
+          </a:p>
+          <a:p>
+            <a:r>
+              <a:rPr lang="hu-HU" dirty="0"/>
+              <a:t>Objektum-orientált</a:t>
+            </a:r>
+            <a:r>
+              <a:rPr lang="hu-HU" baseline="0" dirty="0"/>
+              <a:t> csúcsok – könnyű adatelérés, módosítás</a:t>
+            </a:r>
+          </a:p>
+          <a:p>
+            <a:r>
+              <a:rPr lang="hu-HU" baseline="0" dirty="0"/>
+              <a:t>LINQ – Csak egy típusú csúcs lekérdezését támogatja</a:t>
+            </a:r>
+            <a:endParaRPr lang="hu-HU" dirty="0"/>
           </a:p>
         </p:txBody>
       </p:sp>
@@ -34760,7 +35754,7 @@
             <a:fld id="{A70A3C59-3253-3B42-8BE0-F6D0BA6B0441}" type="slidenum">
               <a:rPr lang="en-US" smtClean="0"/>
               <a:pPr/>
-              <a:t>12</a:t>
+              <a:t>9</a:t>
             </a:fld>
             <a:endParaRPr lang="en-US"/>
           </a:p>
@@ -34769,7 +35763,7 @@
     </p:spTree>
     <p:extLst>
       <p:ext uri="{BB962C8B-B14F-4D97-AF65-F5344CB8AC3E}">
-        <p14:creationId xmlns:p14="http://schemas.microsoft.com/office/powerpoint/2010/main" val="2520712550"/>
+        <p14:creationId xmlns:p14="http://schemas.microsoft.com/office/powerpoint/2010/main" val="1475731141"/>
       </p:ext>
     </p:extLst>
   </p:cSld>
@@ -39667,7 +40661,7 @@
           <p:nvPr/>
         </p:nvPicPr>
         <p:blipFill>
-          <a:blip r:embed="rId2">
+          <a:blip r:embed="rId3">
             <a:extLst>
               <a:ext uri="{28A0092B-C50C-407E-A947-70E740481C1C}">
                 <a14:useLocalDpi xmlns:a14="http://schemas.microsoft.com/office/drawing/2010/main" val="0"/>
@@ -39711,7 +40705,7 @@
         </p:xfrm>
         <a:graphic>
           <a:graphicData uri="http://schemas.openxmlformats.org/drawingml/2006/diagram">
-            <dgm:relIds xmlns:dgm="http://schemas.openxmlformats.org/drawingml/2006/diagram" xmlns:r="http://schemas.openxmlformats.org/officeDocument/2006/relationships" r:dm="rId3" r:lo="rId4" r:qs="rId5" r:cs="rId6"/>
+            <dgm:relIds xmlns:dgm="http://schemas.openxmlformats.org/drawingml/2006/diagram" xmlns:r="http://schemas.openxmlformats.org/officeDocument/2006/relationships" r:dm="rId4" r:lo="rId5" r:qs="rId6" r:cs="rId7"/>
           </a:graphicData>
         </a:graphic>
       </p:graphicFrame>
@@ -39754,7 +40748,7 @@
           <p:nvPr/>
         </p:nvPicPr>
         <p:blipFill>
-          <a:blip r:embed="rId2">
+          <a:blip r:embed="rId3">
             <a:extLst>
               <a:ext uri="{28A0092B-C50C-407E-A947-70E740481C1C}">
                 <a14:useLocalDpi xmlns:a14="http://schemas.microsoft.com/office/drawing/2010/main" val="0"/>
@@ -39859,7 +40853,7 @@
         </p:xfrm>
         <a:graphic>
           <a:graphicData uri="http://schemas.openxmlformats.org/drawingml/2006/diagram">
-            <dgm:relIds xmlns:dgm="http://schemas.openxmlformats.org/drawingml/2006/diagram" xmlns:r="http://schemas.openxmlformats.org/officeDocument/2006/relationships" r:dm="rId3" r:lo="rId4" r:qs="rId5" r:cs="rId6"/>
+            <dgm:relIds xmlns:dgm="http://schemas.openxmlformats.org/drawingml/2006/diagram" xmlns:r="http://schemas.openxmlformats.org/officeDocument/2006/relationships" r:dm="rId4" r:lo="rId5" r:qs="rId6" r:cs="rId7"/>
           </a:graphicData>
         </a:graphic>
       </p:graphicFrame>
@@ -40228,7 +41222,7 @@
           <p:nvPr/>
         </p:nvPicPr>
         <p:blipFill>
-          <a:blip r:embed="rId2"/>
+          <a:blip r:embed="rId3"/>
           <a:stretch>
             <a:fillRect/>
           </a:stretch>
@@ -40258,7 +41252,7 @@
           <p:nvPr/>
         </p:nvPicPr>
         <p:blipFill>
-          <a:blip r:embed="rId3"/>
+          <a:blip r:embed="rId4"/>
           <a:stretch>
             <a:fillRect/>
           </a:stretch>
@@ -40288,7 +41282,7 @@
           <p:nvPr/>
         </p:nvPicPr>
         <p:blipFill>
-          <a:blip r:embed="rId4"/>
+          <a:blip r:embed="rId5"/>
           <a:stretch>
             <a:fillRect/>
           </a:stretch>
@@ -40318,7 +41312,7 @@
           <p:nvPr/>
         </p:nvPicPr>
         <p:blipFill>
-          <a:blip r:embed="rId4"/>
+          <a:blip r:embed="rId5"/>
           <a:stretch>
             <a:fillRect/>
           </a:stretch>
@@ -40348,7 +41342,7 @@
           <p:nvPr/>
         </p:nvPicPr>
         <p:blipFill>
-          <a:blip r:embed="rId5"/>
+          <a:blip r:embed="rId6"/>
           <a:stretch>
             <a:fillRect/>
           </a:stretch>
@@ -40444,7 +41438,7 @@
           <p:nvPr/>
         </p:nvPicPr>
         <p:blipFill>
-          <a:blip r:embed="rId6"/>
+          <a:blip r:embed="rId7"/>
           <a:stretch>
             <a:fillRect/>
           </a:stretch>
@@ -40546,10 +41540,10 @@
           <a:lstStyle/>
           <a:p>
             <a:r>
-              <a:rPr lang="en-US" err="1"/>
+              <a:rPr lang="en-US" dirty="0" err="1"/>
               <a:t>Következtetés</a:t>
             </a:r>
-            <a:endParaRPr lang="hu-HU"/>
+            <a:endParaRPr lang="hu-HU" dirty="0"/>
           </a:p>
         </p:txBody>
       </p:sp>
@@ -40626,7 +41620,7 @@
           <p:nvPr>
             <p:extLst>
               <p:ext uri="{D42A27DB-BD31-4B8C-83A1-F6EECF244321}">
-                <p14:modId xmlns:p14="http://schemas.microsoft.com/office/powerpoint/2010/main" val="2132087510"/>
+                <p14:modId xmlns:p14="http://schemas.microsoft.com/office/powerpoint/2010/main" val="2114203078"/>
               </p:ext>
             </p:extLst>
           </p:nvPr>
@@ -40656,6 +41650,239 @@
 
 <file path=ppt/slides/slide15.xml><?xml version="1.0" encoding="utf-8"?>
 <p:sld xmlns:a="http://schemas.openxmlformats.org/drawingml/2006/main" xmlns:r="http://schemas.openxmlformats.org/officeDocument/2006/relationships" xmlns:p="http://schemas.openxmlformats.org/presentationml/2006/main">
+  <p:cSld>
+    <p:spTree>
+      <p:nvGrpSpPr>
+        <p:cNvPr id="1" name=""/>
+        <p:cNvGrpSpPr/>
+        <p:nvPr/>
+      </p:nvGrpSpPr>
+      <p:grpSpPr>
+        <a:xfrm>
+          <a:off x="0" y="0"/>
+          <a:ext cx="0" cy="0"/>
+          <a:chOff x="0" y="0"/>
+          <a:chExt cx="0" cy="0"/>
+        </a:xfrm>
+      </p:grpSpPr>
+      <p:sp>
+        <p:nvSpPr>
+          <p:cNvPr id="2" name="Title 1"/>
+          <p:cNvSpPr>
+            <a:spLocks noGrp="1"/>
+          </p:cNvSpPr>
+          <p:nvPr>
+            <p:ph type="title"/>
+          </p:nvPr>
+        </p:nvSpPr>
+        <p:spPr/>
+        <p:txBody>
+          <a:bodyPr/>
+          <a:lstStyle/>
+          <a:p>
+            <a:r>
+              <a:rPr lang="hu-HU" sz="3600" dirty="0"/>
+              <a:t>Összefoglalás, </a:t>
+            </a:r>
+            <a:r>
+              <a:rPr lang="hu-HU" sz="3600" dirty="0" err="1"/>
+              <a:t>továbbfejlesztési</a:t>
+            </a:r>
+            <a:r>
+              <a:rPr lang="hu-HU" sz="3600" dirty="0"/>
+              <a:t> lehetőségek</a:t>
+            </a:r>
+          </a:p>
+        </p:txBody>
+      </p:sp>
+      <p:sp>
+        <p:nvSpPr>
+          <p:cNvPr id="6" name="Content Placeholder 5"/>
+          <p:cNvSpPr>
+            <a:spLocks noGrp="1"/>
+          </p:cNvSpPr>
+          <p:nvPr>
+            <p:ph sz="half" idx="1"/>
+          </p:nvPr>
+        </p:nvSpPr>
+        <p:spPr>
+          <a:xfrm>
+            <a:off x="117414" y="836578"/>
+            <a:ext cx="8884346" cy="2831182"/>
+          </a:xfrm>
+        </p:spPr>
+        <p:txBody>
+          <a:bodyPr/>
+          <a:lstStyle/>
+          <a:p>
+            <a:pPr>
+              <a:buFont typeface="Wingdings" panose="05000000000000000000" pitchFamily="2" charset="2"/>
+              <a:buChar char="ü"/>
+            </a:pPr>
+            <a:r>
+              <a:rPr lang="hu-HU" dirty="0"/>
+              <a:t>A </a:t>
+            </a:r>
+            <a:r>
+              <a:rPr lang="hu-HU" dirty="0" err="1"/>
+              <a:t>Train</a:t>
+            </a:r>
+            <a:r>
+              <a:rPr lang="hu-HU" dirty="0"/>
+              <a:t> Benchmark forgatókönyveinek futtatása két választott eszközön Windows környezetben</a:t>
+            </a:r>
+          </a:p>
+          <a:p>
+            <a:pPr lvl="1">
+              <a:buFont typeface="Wingdings" panose="05000000000000000000" pitchFamily="2" charset="2"/>
+              <a:buChar char="ü"/>
+            </a:pPr>
+            <a:r>
+              <a:rPr lang="hu-HU" dirty="0"/>
+              <a:t>Jena, RDF4J</a:t>
+            </a:r>
+          </a:p>
+          <a:p>
+            <a:pPr>
+              <a:buFont typeface="Wingdings" panose="05000000000000000000" pitchFamily="2" charset="2"/>
+              <a:buChar char="ü"/>
+            </a:pPr>
+            <a:r>
+              <a:rPr lang="hu-HU" dirty="0"/>
+              <a:t>Egy választott </a:t>
+            </a:r>
+            <a:r>
+              <a:rPr lang="hu-HU" dirty="0" err="1"/>
+              <a:t>gráflekérdező</a:t>
+            </a:r>
+            <a:r>
+              <a:rPr lang="hu-HU" dirty="0"/>
+              <a:t> eszközön</a:t>
+            </a:r>
+          </a:p>
+          <a:p>
+            <a:pPr lvl="1">
+              <a:buFont typeface="Wingdings" panose="05000000000000000000" pitchFamily="2" charset="2"/>
+              <a:buChar char="ü"/>
+            </a:pPr>
+            <a:r>
+              <a:rPr lang="hu-HU" dirty="0" err="1"/>
+              <a:t>Graph</a:t>
+            </a:r>
+            <a:r>
+              <a:rPr lang="hu-HU" dirty="0"/>
+              <a:t> </a:t>
+            </a:r>
+            <a:r>
+              <a:rPr lang="hu-HU" dirty="0" err="1"/>
+              <a:t>Engine</a:t>
+            </a:r>
+            <a:endParaRPr lang="hu-HU" dirty="0"/>
+          </a:p>
+          <a:p>
+            <a:pPr>
+              <a:buFont typeface="Wingdings" panose="05000000000000000000" pitchFamily="2" charset="2"/>
+              <a:buChar char="ü"/>
+            </a:pPr>
+            <a:r>
+              <a:rPr lang="hu-HU" dirty="0"/>
+              <a:t>Eredmények értékelése</a:t>
+            </a:r>
+          </a:p>
+        </p:txBody>
+      </p:sp>
+      <p:sp>
+        <p:nvSpPr>
+          <p:cNvPr id="9" name="Content Placeholder 8"/>
+          <p:cNvSpPr>
+            <a:spLocks noGrp="1"/>
+          </p:cNvSpPr>
+          <p:nvPr>
+            <p:ph sz="half" idx="2"/>
+          </p:nvPr>
+        </p:nvSpPr>
+        <p:spPr>
+          <a:xfrm>
+            <a:off x="117414" y="3783613"/>
+            <a:ext cx="8884346" cy="2586707"/>
+          </a:xfrm>
+        </p:spPr>
+        <p:txBody>
+          <a:bodyPr/>
+          <a:lstStyle/>
+          <a:p>
+            <a:r>
+              <a:rPr lang="hu-HU" dirty="0"/>
+              <a:t>Tesztek ismételt elvégzése, ha megvalósul a</a:t>
+            </a:r>
+          </a:p>
+          <a:p>
+            <a:pPr lvl="1"/>
+            <a:r>
+              <a:rPr lang="hu-HU" dirty="0"/>
+              <a:t>LIKQ</a:t>
+            </a:r>
+          </a:p>
+          <a:p>
+            <a:pPr lvl="1"/>
+            <a:r>
+              <a:rPr lang="hu-HU" dirty="0"/>
+              <a:t>LINQ (több különböző típusú csúcs elérése)</a:t>
+            </a:r>
+          </a:p>
+          <a:p>
+            <a:pPr marL="0" indent="0">
+              <a:buNone/>
+            </a:pPr>
+            <a:r>
+              <a:rPr lang="hu-HU" dirty="0"/>
+              <a:t>támogatása</a:t>
+            </a:r>
+          </a:p>
+          <a:p>
+            <a:endParaRPr lang="hu-HU" dirty="0"/>
+          </a:p>
+        </p:txBody>
+      </p:sp>
+      <p:sp>
+        <p:nvSpPr>
+          <p:cNvPr id="5" name="Slide Number Placeholder 4"/>
+          <p:cNvSpPr>
+            <a:spLocks noGrp="1"/>
+          </p:cNvSpPr>
+          <p:nvPr>
+            <p:ph type="sldNum" sz="quarter" idx="10"/>
+          </p:nvPr>
+        </p:nvSpPr>
+        <p:spPr/>
+        <p:txBody>
+          <a:bodyPr/>
+          <a:lstStyle/>
+          <a:p>
+            <a:fld id="{A7C85712-A09B-4560-9D1E-08050AA835BB}" type="slidenum">
+              <a:rPr lang="hu-HU" smtClean="0"/>
+              <a:pPr/>
+              <a:t>15</a:t>
+            </a:fld>
+            <a:endParaRPr lang="hu-HU"/>
+          </a:p>
+        </p:txBody>
+      </p:sp>
+    </p:spTree>
+    <p:extLst>
+      <p:ext uri="{BB962C8B-B14F-4D97-AF65-F5344CB8AC3E}">
+        <p14:creationId xmlns:p14="http://schemas.microsoft.com/office/powerpoint/2010/main" val="3672740930"/>
+      </p:ext>
+    </p:extLst>
+  </p:cSld>
+  <p:clrMapOvr>
+    <a:masterClrMapping/>
+  </p:clrMapOvr>
+</p:sld>
+</file>
+
+<file path=ppt/slides/slide16.xml><?xml version="1.0" encoding="utf-8"?>
+<p:sld xmlns:a="http://schemas.openxmlformats.org/drawingml/2006/main" xmlns:r="http://schemas.openxmlformats.org/officeDocument/2006/relationships" xmlns:p="http://schemas.openxmlformats.org/presentationml/2006/main" show="0">
   <p:cSld>
     <p:spTree>
       <p:nvGrpSpPr>
@@ -40763,7 +41990,7 @@
             <a:fld id="{A7C85712-A09B-4560-9D1E-08050AA835BB}" type="slidenum">
               <a:rPr lang="hu-HU" smtClean="0"/>
               <a:pPr/>
-              <a:t>15</a:t>
+              <a:t>16</a:t>
             </a:fld>
             <a:endParaRPr lang="hu-HU"/>
           </a:p>
@@ -40782,7 +42009,7 @@
 </p:sld>
 </file>
 
-<file path=ppt/slides/slide16.xml><?xml version="1.0" encoding="utf-8"?>
+<file path=ppt/slides/slide17.xml><?xml version="1.0" encoding="utf-8"?>
 <p:sld xmlns:a="http://schemas.openxmlformats.org/drawingml/2006/main" xmlns:r="http://schemas.openxmlformats.org/officeDocument/2006/relationships" xmlns:p="http://schemas.openxmlformats.org/presentationml/2006/main" show="0">
   <p:cSld>
     <p:spTree>
@@ -41004,7 +42231,7 @@
             <a:fld id="{A7C85712-A09B-4560-9D1E-08050AA835BB}" type="slidenum">
               <a:rPr lang="hu-HU" smtClean="0"/>
               <a:pPr/>
-              <a:t>16</a:t>
+              <a:t>17</a:t>
             </a:fld>
             <a:endParaRPr lang="hu-HU"/>
           </a:p>
@@ -41023,8 +42250,1053 @@
 </p:sld>
 </file>
 
-<file path=ppt/slides/slide17.xml><?xml version="1.0" encoding="utf-8"?>
+<file path=ppt/slides/slide18.xml><?xml version="1.0" encoding="utf-8"?>
 <p:sld xmlns:a="http://schemas.openxmlformats.org/drawingml/2006/main" xmlns:r="http://schemas.openxmlformats.org/officeDocument/2006/relationships" xmlns:p="http://schemas.openxmlformats.org/presentationml/2006/main">
+  <p:cSld>
+    <p:spTree>
+      <p:nvGrpSpPr>
+        <p:cNvPr id="1" name=""/>
+        <p:cNvGrpSpPr/>
+        <p:nvPr/>
+      </p:nvGrpSpPr>
+      <p:grpSpPr>
+        <a:xfrm>
+          <a:off x="0" y="0"/>
+          <a:ext cx="0" cy="0"/>
+          <a:chOff x="0" y="0"/>
+          <a:chExt cx="0" cy="0"/>
+        </a:xfrm>
+      </p:grpSpPr>
+      <p:sp>
+        <p:nvSpPr>
+          <p:cNvPr id="2" name="Title 1">
+            <a:extLst>
+              <a:ext uri="{FF2B5EF4-FFF2-40B4-BE49-F238E27FC236}">
+                <a16:creationId xmlns:a16="http://schemas.microsoft.com/office/drawing/2014/main" id="{3E170F84-7F5B-486E-B317-0720717F62BA}"/>
+              </a:ext>
+            </a:extLst>
+          </p:cNvPr>
+          <p:cNvSpPr>
+            <a:spLocks noGrp="1"/>
+          </p:cNvSpPr>
+          <p:nvPr>
+            <p:ph type="title"/>
+          </p:nvPr>
+        </p:nvSpPr>
+        <p:spPr/>
+        <p:txBody>
+          <a:bodyPr/>
+          <a:lstStyle/>
+          <a:p>
+            <a:r>
+              <a:rPr lang="en-US" err="1"/>
+              <a:t>Bírálói</a:t>
+            </a:r>
+            <a:r>
+              <a:rPr lang="en-US"/>
+              <a:t> </a:t>
+            </a:r>
+            <a:r>
+              <a:rPr lang="en-US" err="1"/>
+              <a:t>kérdések</a:t>
+            </a:r>
+            <a:r>
+              <a:rPr lang="en-US"/>
+              <a:t> – 1.</a:t>
+            </a:r>
+            <a:endParaRPr lang="hu-HU"/>
+          </a:p>
+        </p:txBody>
+      </p:sp>
+      <p:sp>
+        <p:nvSpPr>
+          <p:cNvPr id="3" name="Content Placeholder 2">
+            <a:extLst>
+              <a:ext uri="{FF2B5EF4-FFF2-40B4-BE49-F238E27FC236}">
+                <a16:creationId xmlns:a16="http://schemas.microsoft.com/office/drawing/2014/main" id="{64733F9E-0903-47C7-82AB-A8B8906D85D4}"/>
+              </a:ext>
+            </a:extLst>
+          </p:cNvPr>
+          <p:cNvSpPr>
+            <a:spLocks noGrp="1"/>
+          </p:cNvSpPr>
+          <p:nvPr>
+            <p:ph idx="1"/>
+          </p:nvPr>
+        </p:nvSpPr>
+        <p:spPr/>
+        <p:txBody>
+          <a:bodyPr/>
+          <a:lstStyle/>
+          <a:p>
+            <a:r>
+              <a:rPr lang="hu-HU"/>
+              <a:t>Miért a futtatott program felőli időalapú mérést (</a:t>
+            </a:r>
+            <a:r>
+              <a:rPr lang="hu-HU" err="1"/>
+              <a:t>System.Diagnostic.StopWatch</a:t>
+            </a:r>
+            <a:r>
+              <a:rPr lang="hu-HU"/>
+              <a:t>) választott (mely függ a rendszer terhelésétől, háttértaszkoktól, </a:t>
+            </a:r>
+            <a:r>
+              <a:rPr lang="hu-HU" err="1"/>
+              <a:t>stb</a:t>
+            </a:r>
+            <a:r>
+              <a:rPr lang="hu-HU"/>
+              <a:t>) az operációs rendszer által szolgáltatott teljesítményindikátorok helyett (mint kernel/</a:t>
+            </a:r>
+            <a:r>
+              <a:rPr lang="hu-HU" err="1"/>
+              <a:t>user</a:t>
+            </a:r>
+            <a:r>
+              <a:rPr lang="hu-HU"/>
+              <a:t> módban eltöltött idő, elhasznált </a:t>
+            </a:r>
+            <a:r>
+              <a:rPr lang="hu-HU" err="1"/>
+              <a:t>cpu</a:t>
+            </a:r>
+            <a:r>
+              <a:rPr lang="hu-HU"/>
+              <a:t> órajelciklusok száma, </a:t>
+            </a:r>
+            <a:r>
+              <a:rPr lang="hu-HU" err="1"/>
+              <a:t>stb</a:t>
+            </a:r>
+            <a:r>
+              <a:rPr lang="hu-HU"/>
+              <a:t>)? </a:t>
+            </a:r>
+            <a:endParaRPr lang="en-US"/>
+          </a:p>
+          <a:p>
+            <a:pPr lvl="1"/>
+            <a:r>
+              <a:rPr lang="en-US"/>
+              <a:t>.NET </a:t>
+            </a:r>
+            <a:r>
+              <a:rPr lang="en-US" err="1"/>
+              <a:t>keretrendszer</a:t>
+            </a:r>
+            <a:r>
+              <a:rPr lang="en-US"/>
+              <a:t> </a:t>
+            </a:r>
+            <a:r>
+              <a:rPr lang="en-US" err="1"/>
+              <a:t>egyetlen</a:t>
+            </a:r>
+            <a:r>
+              <a:rPr lang="en-US"/>
+              <a:t> </a:t>
+            </a:r>
+            <a:r>
+              <a:rPr lang="en-US" err="1"/>
+              <a:t>támogatott</a:t>
+            </a:r>
+            <a:r>
+              <a:rPr lang="en-US"/>
+              <a:t> </a:t>
+            </a:r>
+            <a:r>
+              <a:rPr lang="en-US" err="1"/>
+              <a:t>osztálya</a:t>
+            </a:r>
+            <a:endParaRPr lang="en-US"/>
+          </a:p>
+          <a:p>
+            <a:pPr lvl="1"/>
+            <a:r>
+              <a:rPr lang="en-US" err="1"/>
+              <a:t>ms-nál</a:t>
+            </a:r>
+            <a:r>
+              <a:rPr lang="en-US"/>
+              <a:t> </a:t>
+            </a:r>
+            <a:r>
+              <a:rPr lang="en-US" err="1"/>
+              <a:t>nem</a:t>
+            </a:r>
+            <a:r>
+              <a:rPr lang="en-US"/>
+              <a:t> </a:t>
+            </a:r>
+            <a:r>
+              <a:rPr lang="en-US" err="1"/>
+              <a:t>kellett</a:t>
+            </a:r>
+            <a:r>
+              <a:rPr lang="en-US"/>
+              <a:t> </a:t>
+            </a:r>
+            <a:r>
+              <a:rPr lang="en-US" err="1"/>
+              <a:t>nagyobb</a:t>
+            </a:r>
+            <a:r>
+              <a:rPr lang="en-US"/>
+              <a:t> </a:t>
+            </a:r>
+            <a:r>
+              <a:rPr lang="en-US" err="1"/>
+              <a:t>pontosság</a:t>
+            </a:r>
+            <a:endParaRPr lang="hu-HU"/>
+          </a:p>
+        </p:txBody>
+      </p:sp>
+      <p:sp>
+        <p:nvSpPr>
+          <p:cNvPr id="4" name="Slide Number Placeholder 3">
+            <a:extLst>
+              <a:ext uri="{FF2B5EF4-FFF2-40B4-BE49-F238E27FC236}">
+                <a16:creationId xmlns:a16="http://schemas.microsoft.com/office/drawing/2014/main" id="{AC6BA789-30F0-4FC0-93DB-80CB68A3E795}"/>
+              </a:ext>
+            </a:extLst>
+          </p:cNvPr>
+          <p:cNvSpPr>
+            <a:spLocks noGrp="1"/>
+          </p:cNvSpPr>
+          <p:nvPr>
+            <p:ph type="sldNum" sz="quarter" idx="10"/>
+          </p:nvPr>
+        </p:nvSpPr>
+        <p:spPr/>
+        <p:txBody>
+          <a:bodyPr/>
+          <a:lstStyle/>
+          <a:p>
+            <a:fld id="{A7C85712-A09B-4560-9D1E-08050AA835BB}" type="slidenum">
+              <a:rPr lang="hu-HU" smtClean="0"/>
+              <a:pPr/>
+              <a:t>18</a:t>
+            </a:fld>
+            <a:endParaRPr lang="hu-HU"/>
+          </a:p>
+        </p:txBody>
+      </p:sp>
+    </p:spTree>
+    <p:extLst>
+      <p:ext uri="{BB962C8B-B14F-4D97-AF65-F5344CB8AC3E}">
+        <p14:creationId xmlns:p14="http://schemas.microsoft.com/office/powerpoint/2010/main" val="1223930910"/>
+      </p:ext>
+    </p:extLst>
+  </p:cSld>
+  <p:clrMapOvr>
+    <a:masterClrMapping/>
+  </p:clrMapOvr>
+</p:sld>
+</file>
+
+<file path=ppt/slides/slide19.xml><?xml version="1.0" encoding="utf-8"?>
+<p:sld xmlns:a="http://schemas.openxmlformats.org/drawingml/2006/main" xmlns:r="http://schemas.openxmlformats.org/officeDocument/2006/relationships" xmlns:p="http://schemas.openxmlformats.org/presentationml/2006/main">
+  <p:cSld>
+    <p:spTree>
+      <p:nvGrpSpPr>
+        <p:cNvPr id="1" name=""/>
+        <p:cNvGrpSpPr/>
+        <p:nvPr/>
+      </p:nvGrpSpPr>
+      <p:grpSpPr>
+        <a:xfrm>
+          <a:off x="0" y="0"/>
+          <a:ext cx="0" cy="0"/>
+          <a:chOff x="0" y="0"/>
+          <a:chExt cx="0" cy="0"/>
+        </a:xfrm>
+      </p:grpSpPr>
+      <p:sp>
+        <p:nvSpPr>
+          <p:cNvPr id="2" name="Title 1">
+            <a:extLst>
+              <a:ext uri="{FF2B5EF4-FFF2-40B4-BE49-F238E27FC236}">
+                <a16:creationId xmlns:a16="http://schemas.microsoft.com/office/drawing/2014/main" id="{31257F3B-6A0F-4039-9BB1-7E960329B498}"/>
+              </a:ext>
+            </a:extLst>
+          </p:cNvPr>
+          <p:cNvSpPr>
+            <a:spLocks noGrp="1"/>
+          </p:cNvSpPr>
+          <p:nvPr>
+            <p:ph type="title"/>
+          </p:nvPr>
+        </p:nvSpPr>
+        <p:spPr/>
+        <p:txBody>
+          <a:bodyPr/>
+          <a:lstStyle/>
+          <a:p>
+            <a:r>
+              <a:rPr lang="en-US" err="1"/>
+              <a:t>Bírálói</a:t>
+            </a:r>
+            <a:r>
+              <a:rPr lang="en-US"/>
+              <a:t> </a:t>
+            </a:r>
+            <a:r>
+              <a:rPr lang="en-US" err="1"/>
+              <a:t>kérdések</a:t>
+            </a:r>
+            <a:r>
+              <a:rPr lang="en-US"/>
+              <a:t> – 2.</a:t>
+            </a:r>
+            <a:endParaRPr lang="hu-HU"/>
+          </a:p>
+        </p:txBody>
+      </p:sp>
+      <p:sp>
+        <p:nvSpPr>
+          <p:cNvPr id="3" name="Content Placeholder 2">
+            <a:extLst>
+              <a:ext uri="{FF2B5EF4-FFF2-40B4-BE49-F238E27FC236}">
+                <a16:creationId xmlns:a16="http://schemas.microsoft.com/office/drawing/2014/main" id="{0C1D5654-6C4D-4041-AAF8-D6E940195B1E}"/>
+              </a:ext>
+            </a:extLst>
+          </p:cNvPr>
+          <p:cNvSpPr>
+            <a:spLocks noGrp="1"/>
+          </p:cNvSpPr>
+          <p:nvPr>
+            <p:ph idx="1"/>
+          </p:nvPr>
+        </p:nvSpPr>
+        <p:spPr/>
+        <p:txBody>
+          <a:bodyPr/>
+          <a:lstStyle/>
+          <a:p>
+            <a:r>
+              <a:rPr lang="hu-HU"/>
+              <a:t> Látva (és ön által is identifikálva) a </a:t>
+            </a:r>
+            <a:r>
+              <a:rPr lang="hu-HU" err="1"/>
+              <a:t>dotNetRDF</a:t>
+            </a:r>
+            <a:r>
+              <a:rPr lang="hu-HU"/>
+              <a:t> és a LINQ által okozott szűk keresztmetszetet próbálkozott-e más RDF olvasóval és más implementációval?</a:t>
+            </a:r>
+            <a:endParaRPr lang="en-US"/>
+          </a:p>
+          <a:p>
+            <a:pPr lvl="1"/>
+            <a:r>
+              <a:rPr lang="en-US"/>
+              <a:t>A Train Benchmark </a:t>
+            </a:r>
+            <a:r>
+              <a:rPr lang="en-US" err="1"/>
+              <a:t>mérnöki</a:t>
+            </a:r>
+            <a:r>
+              <a:rPr lang="en-US"/>
+              <a:t> </a:t>
+            </a:r>
+            <a:r>
+              <a:rPr lang="en-US" err="1"/>
+              <a:t>fejlesztést</a:t>
+            </a:r>
+            <a:r>
+              <a:rPr lang="en-US"/>
+              <a:t> </a:t>
+            </a:r>
+            <a:r>
+              <a:rPr lang="en-US" err="1"/>
+              <a:t>szimulál</a:t>
+            </a:r>
+            <a:r>
+              <a:rPr lang="en-US"/>
+              <a:t>, </a:t>
+            </a:r>
+            <a:r>
+              <a:rPr lang="en-US" err="1"/>
+              <a:t>nem</a:t>
+            </a:r>
+            <a:r>
+              <a:rPr lang="en-US"/>
+              <a:t> </a:t>
+            </a:r>
+            <a:r>
+              <a:rPr lang="en-US" err="1"/>
+              <a:t>tökéleteset</a:t>
+            </a:r>
+            <a:r>
+              <a:rPr lang="en-US"/>
+              <a:t>, </a:t>
+            </a:r>
+            <a:r>
+              <a:rPr lang="en-US" err="1"/>
+              <a:t>ezáltal</a:t>
+            </a:r>
+            <a:r>
+              <a:rPr lang="en-US"/>
+              <a:t> </a:t>
+            </a:r>
+            <a:r>
+              <a:rPr lang="en-US" err="1"/>
+              <a:t>nem</a:t>
+            </a:r>
+            <a:r>
+              <a:rPr lang="en-US"/>
+              <a:t> </a:t>
+            </a:r>
+            <a:r>
+              <a:rPr lang="en-US" err="1"/>
+              <a:t>próbálkoztam</a:t>
+            </a:r>
+            <a:r>
+              <a:rPr lang="en-US"/>
+              <a:t> </a:t>
+            </a:r>
+            <a:r>
+              <a:rPr lang="en-US" err="1"/>
+              <a:t>más</a:t>
+            </a:r>
+            <a:r>
+              <a:rPr lang="en-US"/>
+              <a:t> RDF </a:t>
+            </a:r>
+            <a:r>
+              <a:rPr lang="en-US" err="1"/>
+              <a:t>olvasóval</a:t>
+            </a:r>
+            <a:r>
+              <a:rPr lang="en-US"/>
+              <a:t>, </a:t>
+            </a:r>
+            <a:r>
+              <a:rPr lang="en-US" err="1"/>
+              <a:t>ez</a:t>
+            </a:r>
+            <a:r>
+              <a:rPr lang="en-US"/>
+              <a:t> </a:t>
+            </a:r>
+            <a:r>
+              <a:rPr lang="en-US" err="1"/>
+              <a:t>egy</a:t>
+            </a:r>
+            <a:r>
+              <a:rPr lang="en-US"/>
+              <a:t> </a:t>
+            </a:r>
+            <a:r>
+              <a:rPr lang="en-US" err="1"/>
+              <a:t>továbbfejlesztési</a:t>
+            </a:r>
+            <a:r>
+              <a:rPr lang="en-US"/>
+              <a:t> </a:t>
+            </a:r>
+            <a:r>
+              <a:rPr lang="en-US" err="1"/>
+              <a:t>lehetőség</a:t>
+            </a:r>
+            <a:r>
+              <a:rPr lang="en-US"/>
+              <a:t>.</a:t>
+            </a:r>
+          </a:p>
+        </p:txBody>
+      </p:sp>
+      <p:sp>
+        <p:nvSpPr>
+          <p:cNvPr id="4" name="Slide Number Placeholder 3">
+            <a:extLst>
+              <a:ext uri="{FF2B5EF4-FFF2-40B4-BE49-F238E27FC236}">
+                <a16:creationId xmlns:a16="http://schemas.microsoft.com/office/drawing/2014/main" id="{64579BAB-2886-4079-A613-D4D84D0ED15E}"/>
+              </a:ext>
+            </a:extLst>
+          </p:cNvPr>
+          <p:cNvSpPr>
+            <a:spLocks noGrp="1"/>
+          </p:cNvSpPr>
+          <p:nvPr>
+            <p:ph type="sldNum" sz="quarter" idx="10"/>
+          </p:nvPr>
+        </p:nvSpPr>
+        <p:spPr/>
+        <p:txBody>
+          <a:bodyPr/>
+          <a:lstStyle/>
+          <a:p>
+            <a:fld id="{A7C85712-A09B-4560-9D1E-08050AA835BB}" type="slidenum">
+              <a:rPr lang="hu-HU" smtClean="0"/>
+              <a:pPr/>
+              <a:t>19</a:t>
+            </a:fld>
+            <a:endParaRPr lang="hu-HU"/>
+          </a:p>
+        </p:txBody>
+      </p:sp>
+    </p:spTree>
+    <p:extLst>
+      <p:ext uri="{BB962C8B-B14F-4D97-AF65-F5344CB8AC3E}">
+        <p14:creationId xmlns:p14="http://schemas.microsoft.com/office/powerpoint/2010/main" val="2292789109"/>
+      </p:ext>
+    </p:extLst>
+  </p:cSld>
+  <p:clrMapOvr>
+    <a:masterClrMapping/>
+  </p:clrMapOvr>
+</p:sld>
+</file>
+
+<file path=ppt/slides/slide2.xml><?xml version="1.0" encoding="utf-8"?>
+<p:sld xmlns:a="http://schemas.openxmlformats.org/drawingml/2006/main" xmlns:r="http://schemas.openxmlformats.org/officeDocument/2006/relationships" xmlns:p="http://schemas.openxmlformats.org/presentationml/2006/main">
+  <p:cSld>
+    <p:spTree>
+      <p:nvGrpSpPr>
+        <p:cNvPr id="1" name=""/>
+        <p:cNvGrpSpPr/>
+        <p:nvPr/>
+      </p:nvGrpSpPr>
+      <p:grpSpPr>
+        <a:xfrm>
+          <a:off x="0" y="0"/>
+          <a:ext cx="0" cy="0"/>
+          <a:chOff x="0" y="0"/>
+          <a:chExt cx="0" cy="0"/>
+        </a:xfrm>
+      </p:grpSpPr>
+      <p:sp>
+        <p:nvSpPr>
+          <p:cNvPr id="5" name="Title 4"/>
+          <p:cNvSpPr>
+            <a:spLocks noGrp="1"/>
+          </p:cNvSpPr>
+          <p:nvPr>
+            <p:ph type="title"/>
+          </p:nvPr>
+        </p:nvSpPr>
+        <p:spPr/>
+        <p:txBody>
+          <a:bodyPr/>
+          <a:lstStyle/>
+          <a:p>
+            <a:r>
+              <a:rPr lang="hu-HU" dirty="0"/>
+              <a:t>Feladat és motivációja</a:t>
+            </a:r>
+          </a:p>
+        </p:txBody>
+      </p:sp>
+      <p:sp>
+        <p:nvSpPr>
+          <p:cNvPr id="4" name="Slide Number Placeholder 3"/>
+          <p:cNvSpPr>
+            <a:spLocks noGrp="1"/>
+          </p:cNvSpPr>
+          <p:nvPr>
+            <p:ph type="sldNum" sz="quarter" idx="10"/>
+          </p:nvPr>
+        </p:nvSpPr>
+        <p:spPr/>
+        <p:txBody>
+          <a:bodyPr/>
+          <a:lstStyle/>
+          <a:p>
+            <a:fld id="{A7C85712-A09B-4560-9D1E-08050AA835BB}" type="slidenum">
+              <a:rPr lang="hu-HU" smtClean="0"/>
+              <a:pPr/>
+              <a:t>2</a:t>
+            </a:fld>
+            <a:endParaRPr lang="hu-HU"/>
+          </a:p>
+        </p:txBody>
+      </p:sp>
+      <p:sp>
+        <p:nvSpPr>
+          <p:cNvPr id="3" name="Content Placeholder 2"/>
+          <p:cNvSpPr>
+            <a:spLocks noGrp="1"/>
+          </p:cNvSpPr>
+          <p:nvPr>
+            <p:ph idx="1"/>
+          </p:nvPr>
+        </p:nvSpPr>
+        <p:spPr/>
+        <p:txBody>
+          <a:bodyPr/>
+          <a:lstStyle/>
+          <a:p>
+            <a:pPr lvl="0"/>
+            <a:r>
+              <a:rPr lang="hu-HU" dirty="0" err="1"/>
+              <a:t>Train</a:t>
+            </a:r>
+            <a:r>
+              <a:rPr lang="hu-HU" dirty="0"/>
+              <a:t> Benchmark ismertetése</a:t>
+            </a:r>
+          </a:p>
+          <a:p>
+            <a:pPr lvl="0"/>
+            <a:r>
+              <a:rPr lang="hu-HU" dirty="0"/>
+              <a:t>Implementálása egy választott </a:t>
+            </a:r>
+            <a:r>
+              <a:rPr lang="hu-HU" dirty="0" err="1"/>
+              <a:t>gráflekérdező</a:t>
+            </a:r>
+            <a:r>
+              <a:rPr lang="hu-HU" dirty="0"/>
+              <a:t> rendszerre</a:t>
+            </a:r>
+          </a:p>
+          <a:p>
+            <a:pPr lvl="1"/>
+            <a:r>
+              <a:rPr lang="hu-HU" dirty="0" err="1"/>
+              <a:t>Graph</a:t>
+            </a:r>
+            <a:r>
+              <a:rPr lang="hu-HU" dirty="0"/>
+              <a:t> </a:t>
+            </a:r>
+            <a:r>
+              <a:rPr lang="hu-HU" dirty="0" err="1"/>
+              <a:t>Engine</a:t>
+            </a:r>
+            <a:endParaRPr lang="hu-HU" dirty="0"/>
+          </a:p>
+          <a:p>
+            <a:pPr lvl="0"/>
+            <a:r>
+              <a:rPr lang="hu-HU" dirty="0"/>
+              <a:t>A választott eszközön való futtatás</a:t>
+            </a:r>
+          </a:p>
+          <a:p>
+            <a:pPr lvl="0"/>
+            <a:r>
+              <a:rPr lang="hu-HU" dirty="0"/>
+              <a:t>Két már elkészült eszközön való futtatás</a:t>
+            </a:r>
+          </a:p>
+          <a:p>
+            <a:pPr lvl="1"/>
+            <a:r>
+              <a:rPr lang="hu-HU" dirty="0"/>
+              <a:t>Jena, RDF4J</a:t>
+            </a:r>
+            <a:endParaRPr lang="hu-HU" dirty="0"/>
+          </a:p>
+          <a:p>
+            <a:pPr lvl="0"/>
+            <a:r>
+              <a:rPr lang="hu-HU" dirty="0"/>
+              <a:t>Eredmények kiértékelése</a:t>
+            </a:r>
+          </a:p>
+          <a:p>
+            <a:pPr lvl="0"/>
+            <a:r>
+              <a:rPr lang="hu-HU" dirty="0"/>
+              <a:t>Konklúzió levonása</a:t>
+            </a:r>
+          </a:p>
+        </p:txBody>
+      </p:sp>
+    </p:spTree>
+    <p:extLst>
+      <p:ext uri="{BB962C8B-B14F-4D97-AF65-F5344CB8AC3E}">
+        <p14:creationId xmlns:p14="http://schemas.microsoft.com/office/powerpoint/2010/main" val="1572915044"/>
+      </p:ext>
+    </p:extLst>
+  </p:cSld>
+  <p:clrMapOvr>
+    <a:masterClrMapping/>
+  </p:clrMapOvr>
+</p:sld>
+</file>
+
+<file path=ppt/slides/slide20.xml><?xml version="1.0" encoding="utf-8"?>
+<p:sld xmlns:a="http://schemas.openxmlformats.org/drawingml/2006/main" xmlns:r="http://schemas.openxmlformats.org/officeDocument/2006/relationships" xmlns:p="http://schemas.openxmlformats.org/presentationml/2006/main">
+  <p:cSld>
+    <p:spTree>
+      <p:nvGrpSpPr>
+        <p:cNvPr id="1" name=""/>
+        <p:cNvGrpSpPr/>
+        <p:nvPr/>
+      </p:nvGrpSpPr>
+      <p:grpSpPr>
+        <a:xfrm>
+          <a:off x="0" y="0"/>
+          <a:ext cx="0" cy="0"/>
+          <a:chOff x="0" y="0"/>
+          <a:chExt cx="0" cy="0"/>
+        </a:xfrm>
+      </p:grpSpPr>
+      <p:sp>
+        <p:nvSpPr>
+          <p:cNvPr id="2" name="Title 1">
+            <a:extLst>
+              <a:ext uri="{FF2B5EF4-FFF2-40B4-BE49-F238E27FC236}">
+                <a16:creationId xmlns:a16="http://schemas.microsoft.com/office/drawing/2014/main" id="{A7A5FBA6-8128-463D-91B2-DB5880FD3FDC}"/>
+              </a:ext>
+            </a:extLst>
+          </p:cNvPr>
+          <p:cNvSpPr>
+            <a:spLocks noGrp="1"/>
+          </p:cNvSpPr>
+          <p:nvPr>
+            <p:ph type="title"/>
+          </p:nvPr>
+        </p:nvSpPr>
+        <p:spPr/>
+        <p:txBody>
+          <a:bodyPr/>
+          <a:lstStyle/>
+          <a:p>
+            <a:r>
+              <a:rPr lang="en-US" err="1"/>
+              <a:t>Bírálói</a:t>
+            </a:r>
+            <a:r>
+              <a:rPr lang="en-US"/>
+              <a:t> </a:t>
+            </a:r>
+            <a:r>
+              <a:rPr lang="en-US" err="1"/>
+              <a:t>kérdések</a:t>
+            </a:r>
+            <a:r>
+              <a:rPr lang="en-US"/>
+              <a:t> – 3.</a:t>
+            </a:r>
+            <a:endParaRPr lang="hu-HU"/>
+          </a:p>
+        </p:txBody>
+      </p:sp>
+      <p:sp>
+        <p:nvSpPr>
+          <p:cNvPr id="3" name="Content Placeholder 2">
+            <a:extLst>
+              <a:ext uri="{FF2B5EF4-FFF2-40B4-BE49-F238E27FC236}">
+                <a16:creationId xmlns:a16="http://schemas.microsoft.com/office/drawing/2014/main" id="{91F77379-8BFA-47D3-BEC9-7118ADF81113}"/>
+              </a:ext>
+            </a:extLst>
+          </p:cNvPr>
+          <p:cNvSpPr>
+            <a:spLocks noGrp="1"/>
+          </p:cNvSpPr>
+          <p:nvPr>
+            <p:ph idx="1"/>
+          </p:nvPr>
+        </p:nvSpPr>
+        <p:spPr/>
+        <p:txBody>
+          <a:bodyPr/>
+          <a:lstStyle/>
+          <a:p>
+            <a:r>
+              <a:rPr lang="hu-HU"/>
+              <a:t>Egyéb teljesítmény mérőszámokat miért nem mért (</a:t>
+            </a:r>
+            <a:r>
+              <a:rPr lang="hu-HU" err="1"/>
+              <a:t>pl</a:t>
+            </a:r>
+            <a:r>
+              <a:rPr lang="hu-HU"/>
+              <a:t> memóriahasználat, „</a:t>
+            </a:r>
+            <a:r>
+              <a:rPr lang="hu-HU" err="1"/>
+              <a:t>heap</a:t>
+            </a:r>
+            <a:r>
+              <a:rPr lang="hu-HU"/>
+              <a:t> </a:t>
+            </a:r>
+            <a:r>
+              <a:rPr lang="hu-HU" err="1"/>
+              <a:t>thrashing</a:t>
+            </a:r>
+            <a:r>
+              <a:rPr lang="hu-HU"/>
+              <a:t>”)?</a:t>
+            </a:r>
+            <a:endParaRPr lang="en-US"/>
+          </a:p>
+          <a:p>
+            <a:pPr lvl="1"/>
+            <a:r>
+              <a:rPr lang="en-US"/>
+              <a:t>A Garbage Collector m</a:t>
+            </a:r>
+            <a:r>
+              <a:rPr lang="hu-HU"/>
+              <a:t>ű</a:t>
+            </a:r>
+            <a:r>
+              <a:rPr lang="en-US" err="1"/>
+              <a:t>ködéséből</a:t>
+            </a:r>
+            <a:r>
+              <a:rPr lang="en-US"/>
+              <a:t> </a:t>
+            </a:r>
+            <a:r>
+              <a:rPr lang="en-US" err="1"/>
+              <a:t>kifolyólag</a:t>
+            </a:r>
+            <a:r>
+              <a:rPr lang="en-US"/>
+              <a:t> a </a:t>
+            </a:r>
+            <a:r>
+              <a:rPr lang="en-US" err="1"/>
+              <a:t>memóriahasználat</a:t>
+            </a:r>
+            <a:r>
+              <a:rPr lang="en-US"/>
+              <a:t> </a:t>
+            </a:r>
+            <a:r>
+              <a:rPr lang="en-US" err="1"/>
+              <a:t>méréséhez</a:t>
+            </a:r>
+            <a:r>
+              <a:rPr lang="en-US"/>
+              <a:t> a </a:t>
+            </a:r>
+            <a:r>
+              <a:rPr lang="en-US" err="1"/>
+              <a:t>memória</a:t>
+            </a:r>
+            <a:r>
+              <a:rPr lang="en-US"/>
+              <a:t> </a:t>
+            </a:r>
+            <a:r>
+              <a:rPr lang="en-US" err="1"/>
+              <a:t>tényleges</a:t>
+            </a:r>
+            <a:r>
+              <a:rPr lang="en-US"/>
+              <a:t> </a:t>
+            </a:r>
+            <a:r>
+              <a:rPr lang="en-US" err="1"/>
+              <a:t>méretére</a:t>
+            </a:r>
+            <a:r>
+              <a:rPr lang="en-US"/>
+              <a:t> </a:t>
+            </a:r>
+            <a:r>
+              <a:rPr lang="en-US" err="1"/>
+              <a:t>kellett</a:t>
+            </a:r>
+            <a:r>
+              <a:rPr lang="en-US"/>
+              <a:t> </a:t>
+            </a:r>
+            <a:r>
+              <a:rPr lang="en-US" err="1"/>
+              <a:t>volna</a:t>
+            </a:r>
+            <a:r>
+              <a:rPr lang="en-US"/>
+              <a:t> </a:t>
+            </a:r>
+            <a:r>
+              <a:rPr lang="en-US" err="1"/>
+              <a:t>korlátot</a:t>
+            </a:r>
+            <a:r>
+              <a:rPr lang="en-US"/>
+              <a:t> </a:t>
+            </a:r>
+            <a:r>
+              <a:rPr lang="en-US" err="1"/>
+              <a:t>állítani</a:t>
+            </a:r>
+            <a:r>
+              <a:rPr lang="en-US"/>
+              <a:t>. </a:t>
+            </a:r>
+            <a:r>
+              <a:rPr lang="en-US" err="1"/>
+              <a:t>Erre</a:t>
+            </a:r>
+            <a:r>
+              <a:rPr lang="en-US"/>
+              <a:t> </a:t>
+            </a:r>
+            <a:r>
+              <a:rPr lang="en-US" err="1"/>
+              <a:t>két</a:t>
+            </a:r>
+            <a:r>
+              <a:rPr lang="en-US"/>
+              <a:t> </a:t>
+            </a:r>
+            <a:r>
+              <a:rPr lang="en-US" err="1"/>
+              <a:t>lehetőség</a:t>
+            </a:r>
+            <a:r>
+              <a:rPr lang="en-US"/>
+              <a:t> </a:t>
+            </a:r>
+            <a:r>
+              <a:rPr lang="en-US" err="1"/>
+              <a:t>kínálkozott</a:t>
+            </a:r>
+            <a:r>
+              <a:rPr lang="en-US"/>
+              <a:t>:</a:t>
+            </a:r>
+          </a:p>
+          <a:p>
+            <a:pPr lvl="2"/>
+            <a:r>
+              <a:rPr lang="en-US" err="1"/>
+              <a:t>Új</a:t>
+            </a:r>
+            <a:r>
+              <a:rPr lang="en-US"/>
+              <a:t> </a:t>
+            </a:r>
+            <a:r>
+              <a:rPr lang="en-US" err="1"/>
+              <a:t>hardverek</a:t>
+            </a:r>
+            <a:r>
+              <a:rPr lang="en-US"/>
+              <a:t> </a:t>
+            </a:r>
+            <a:r>
+              <a:rPr lang="en-US" err="1"/>
+              <a:t>beszerzése</a:t>
+            </a:r>
+            <a:r>
+              <a:rPr lang="en-US"/>
+              <a:t> =&gt; </a:t>
+            </a:r>
+            <a:r>
+              <a:rPr lang="en-US" err="1"/>
+              <a:t>költséges</a:t>
+            </a:r>
+            <a:endParaRPr lang="en-US"/>
+          </a:p>
+          <a:p>
+            <a:pPr lvl="2"/>
+            <a:r>
+              <a:rPr lang="en-US" err="1"/>
+              <a:t>Virtuális</a:t>
+            </a:r>
+            <a:r>
+              <a:rPr lang="en-US"/>
+              <a:t> </a:t>
+            </a:r>
+            <a:r>
+              <a:rPr lang="en-US" err="1"/>
+              <a:t>környezet</a:t>
+            </a:r>
+            <a:r>
+              <a:rPr lang="en-US"/>
+              <a:t> =&gt; </a:t>
+            </a:r>
+            <a:r>
+              <a:rPr lang="en-US" err="1"/>
+              <a:t>lassú</a:t>
+            </a:r>
+            <a:r>
+              <a:rPr lang="en-US"/>
+              <a:t> </a:t>
+            </a:r>
+            <a:r>
+              <a:rPr lang="en-US" err="1"/>
+              <a:t>futási</a:t>
+            </a:r>
+            <a:r>
+              <a:rPr lang="en-US"/>
+              <a:t> </a:t>
+            </a:r>
+            <a:r>
+              <a:rPr lang="en-US" err="1"/>
+              <a:t>idő</a:t>
+            </a:r>
+            <a:r>
+              <a:rPr lang="en-US"/>
+              <a:t> (</a:t>
+            </a:r>
+            <a:r>
+              <a:rPr lang="en-US" err="1"/>
+              <a:t>hetek</a:t>
+            </a:r>
+            <a:r>
+              <a:rPr lang="en-US"/>
+              <a:t>)</a:t>
+            </a:r>
+          </a:p>
+          <a:p>
+            <a:pPr lvl="1"/>
+            <a:endParaRPr lang="hu-HU"/>
+          </a:p>
+        </p:txBody>
+      </p:sp>
+      <p:sp>
+        <p:nvSpPr>
+          <p:cNvPr id="4" name="Slide Number Placeholder 3">
+            <a:extLst>
+              <a:ext uri="{FF2B5EF4-FFF2-40B4-BE49-F238E27FC236}">
+                <a16:creationId xmlns:a16="http://schemas.microsoft.com/office/drawing/2014/main" id="{DE1449DB-3ED0-4538-82BD-53336DCD4323}"/>
+              </a:ext>
+            </a:extLst>
+          </p:cNvPr>
+          <p:cNvSpPr>
+            <a:spLocks noGrp="1"/>
+          </p:cNvSpPr>
+          <p:nvPr>
+            <p:ph type="sldNum" sz="quarter" idx="10"/>
+          </p:nvPr>
+        </p:nvSpPr>
+        <p:spPr/>
+        <p:txBody>
+          <a:bodyPr/>
+          <a:lstStyle/>
+          <a:p>
+            <a:fld id="{A7C85712-A09B-4560-9D1E-08050AA835BB}" type="slidenum">
+              <a:rPr lang="hu-HU" smtClean="0"/>
+              <a:pPr/>
+              <a:t>20</a:t>
+            </a:fld>
+            <a:endParaRPr lang="hu-HU"/>
+          </a:p>
+        </p:txBody>
+      </p:sp>
+    </p:spTree>
+    <p:extLst>
+      <p:ext uri="{BB962C8B-B14F-4D97-AF65-F5344CB8AC3E}">
+        <p14:creationId xmlns:p14="http://schemas.microsoft.com/office/powerpoint/2010/main" val="2768865570"/>
+      </p:ext>
+    </p:extLst>
+  </p:cSld>
+  <p:clrMapOvr>
+    <a:masterClrMapping/>
+  </p:clrMapOvr>
+</p:sld>
+</file>
+
+<file path=ppt/slides/slide21.xml><?xml version="1.0" encoding="utf-8"?>
+<p:sld xmlns:a="http://schemas.openxmlformats.org/drawingml/2006/main" xmlns:r="http://schemas.openxmlformats.org/officeDocument/2006/relationships" xmlns:p="http://schemas.openxmlformats.org/presentationml/2006/main" show="0">
   <p:cSld>
     <p:spTree>
       <p:nvGrpSpPr>
@@ -41084,7 +43356,11 @@
           <p:cNvPr id="7" name="Diagram 6"/>
           <p:cNvGraphicFramePr/>
           <p:nvPr>
-            <p:extLst/>
+            <p:extLst>
+              <p:ext uri="{D42A27DB-BD31-4B8C-83A1-F6EECF244321}">
+                <p14:modId xmlns:p14="http://schemas.microsoft.com/office/powerpoint/2010/main" val="2462177024"/>
+              </p:ext>
+            </p:extLst>
           </p:nvPr>
         </p:nvGraphicFramePr>
         <p:xfrm>
@@ -41175,7 +43451,7 @@
             <a:fld id="{A7C85712-A09B-4560-9D1E-08050AA835BB}" type="slidenum">
               <a:rPr lang="hu-HU" smtClean="0"/>
               <a:pPr/>
-              <a:t>17</a:t>
+              <a:t>21</a:t>
             </a:fld>
             <a:endParaRPr lang="hu-HU"/>
           </a:p>
@@ -41194,8 +43470,8 @@
 </p:sld>
 </file>
 
-<file path=ppt/slides/slide18.xml><?xml version="1.0" encoding="utf-8"?>
-<p:sld xmlns:a="http://schemas.openxmlformats.org/drawingml/2006/main" xmlns:r="http://schemas.openxmlformats.org/officeDocument/2006/relationships" xmlns:p="http://schemas.openxmlformats.org/presentationml/2006/main">
+<file path=ppt/slides/slide22.xml><?xml version="1.0" encoding="utf-8"?>
+<p:sld xmlns:a="http://schemas.openxmlformats.org/drawingml/2006/main" xmlns:r="http://schemas.openxmlformats.org/officeDocument/2006/relationships" xmlns:p="http://schemas.openxmlformats.org/presentationml/2006/main" show="0">
   <p:cSld>
     <p:spTree>
       <p:nvGrpSpPr>
@@ -41276,7 +43552,7 @@
             <a:fld id="{A7C85712-A09B-4560-9D1E-08050AA835BB}" type="slidenum">
               <a:rPr lang="hu-HU" smtClean="0"/>
               <a:pPr/>
-              <a:t>18</a:t>
+              <a:t>22</a:t>
             </a:fld>
             <a:endParaRPr lang="hu-HU"/>
           </a:p>
@@ -41354,8 +43630,8 @@
 </p:sld>
 </file>
 
-<file path=ppt/slides/slide19.xml><?xml version="1.0" encoding="utf-8"?>
-<p:sld xmlns:a="http://schemas.openxmlformats.org/drawingml/2006/main" xmlns:r="http://schemas.openxmlformats.org/officeDocument/2006/relationships" xmlns:p="http://schemas.openxmlformats.org/presentationml/2006/main">
+<file path=ppt/slides/slide23.xml><?xml version="1.0" encoding="utf-8"?>
+<p:sld xmlns:a="http://schemas.openxmlformats.org/drawingml/2006/main" xmlns:r="http://schemas.openxmlformats.org/officeDocument/2006/relationships" xmlns:p="http://schemas.openxmlformats.org/presentationml/2006/main" show="0">
   <p:cSld>
     <p:spTree>
       <p:nvGrpSpPr>
@@ -41454,7 +43730,7 @@
             <a:fld id="{A7C85712-A09B-4560-9D1E-08050AA835BB}" type="slidenum">
               <a:rPr lang="hu-HU" smtClean="0"/>
               <a:pPr/>
-              <a:t>19</a:t>
+              <a:t>23</a:t>
             </a:fld>
             <a:endParaRPr lang="hu-HU"/>
           </a:p>
@@ -41514,7 +43790,7 @@
 </p:sld>
 </file>
 
-<file path=ppt/slides/slide2.xml><?xml version="1.0" encoding="utf-8"?>
+<file path=ppt/slides/slide24.xml><?xml version="1.0" encoding="utf-8"?>
 <p:sld xmlns:a="http://schemas.openxmlformats.org/drawingml/2006/main" xmlns:r="http://schemas.openxmlformats.org/officeDocument/2006/relationships" xmlns:p="http://schemas.openxmlformats.org/presentationml/2006/main">
   <p:cSld>
     <p:spTree>
@@ -41533,7 +43809,7 @@
       </p:grpSpPr>
       <p:sp>
         <p:nvSpPr>
-          <p:cNvPr id="5" name="Title 4"/>
+          <p:cNvPr id="2" name="Title 1"/>
           <p:cNvSpPr>
             <a:spLocks noGrp="1"/>
           </p:cNvSpPr>
@@ -41547,15 +43823,172 @@
           <a:lstStyle/>
           <a:p>
             <a:r>
-              <a:rPr lang="hu-HU" dirty="0"/>
-              <a:t>Feladat és motivációja</a:t>
+              <a:rPr lang="hu-HU" sz="3600" dirty="0"/>
+              <a:t>Összefoglalás, </a:t>
+            </a:r>
+            <a:r>
+              <a:rPr lang="hu-HU" sz="3600" dirty="0" err="1"/>
+              <a:t>továbbfejlesztési</a:t>
+            </a:r>
+            <a:r>
+              <a:rPr lang="hu-HU" sz="3600" dirty="0"/>
+              <a:t> lehetőségek</a:t>
             </a:r>
           </a:p>
         </p:txBody>
       </p:sp>
       <p:sp>
         <p:nvSpPr>
-          <p:cNvPr id="4" name="Slide Number Placeholder 3"/>
+          <p:cNvPr id="6" name="Content Placeholder 5"/>
+          <p:cNvSpPr>
+            <a:spLocks noGrp="1"/>
+          </p:cNvSpPr>
+          <p:nvPr>
+            <p:ph sz="half" idx="1"/>
+          </p:nvPr>
+        </p:nvSpPr>
+        <p:spPr>
+          <a:xfrm>
+            <a:off x="117414" y="836578"/>
+            <a:ext cx="8884346" cy="2831182"/>
+          </a:xfrm>
+        </p:spPr>
+        <p:txBody>
+          <a:bodyPr/>
+          <a:lstStyle/>
+          <a:p>
+            <a:pPr>
+              <a:buFont typeface="Wingdings" panose="05000000000000000000" pitchFamily="2" charset="2"/>
+              <a:buChar char="ü"/>
+            </a:pPr>
+            <a:r>
+              <a:rPr lang="hu-HU" dirty="0"/>
+              <a:t>A </a:t>
+            </a:r>
+            <a:r>
+              <a:rPr lang="hu-HU" dirty="0" err="1"/>
+              <a:t>Train</a:t>
+            </a:r>
+            <a:r>
+              <a:rPr lang="hu-HU" dirty="0"/>
+              <a:t> Benchmark forgatókönyveinek megvalósítása két választott eszközön</a:t>
+            </a:r>
+          </a:p>
+          <a:p>
+            <a:pPr lvl="1">
+              <a:buFont typeface="Wingdings" panose="05000000000000000000" pitchFamily="2" charset="2"/>
+              <a:buChar char="ü"/>
+            </a:pPr>
+            <a:r>
+              <a:rPr lang="hu-HU" dirty="0"/>
+              <a:t>Jena, RDF4J</a:t>
+            </a:r>
+          </a:p>
+          <a:p>
+            <a:pPr>
+              <a:buFont typeface="Wingdings" panose="05000000000000000000" pitchFamily="2" charset="2"/>
+              <a:buChar char="ü"/>
+            </a:pPr>
+            <a:r>
+              <a:rPr lang="hu-HU" dirty="0"/>
+              <a:t>Egy választott </a:t>
+            </a:r>
+            <a:r>
+              <a:rPr lang="hu-HU" dirty="0" err="1"/>
+              <a:t>gráflekérdező</a:t>
+            </a:r>
+            <a:r>
+              <a:rPr lang="hu-HU" dirty="0"/>
+              <a:t> eszközön</a:t>
+            </a:r>
+          </a:p>
+          <a:p>
+            <a:pPr lvl="1">
+              <a:buFont typeface="Wingdings" panose="05000000000000000000" pitchFamily="2" charset="2"/>
+              <a:buChar char="ü"/>
+            </a:pPr>
+            <a:r>
+              <a:rPr lang="hu-HU" dirty="0" err="1"/>
+              <a:t>Graph</a:t>
+            </a:r>
+            <a:r>
+              <a:rPr lang="hu-HU" dirty="0"/>
+              <a:t> </a:t>
+            </a:r>
+            <a:r>
+              <a:rPr lang="hu-HU" dirty="0" err="1"/>
+              <a:t>Engine</a:t>
+            </a:r>
+            <a:endParaRPr lang="hu-HU" dirty="0"/>
+          </a:p>
+          <a:p>
+            <a:pPr>
+              <a:buFont typeface="Wingdings" panose="05000000000000000000" pitchFamily="2" charset="2"/>
+              <a:buChar char="ü"/>
+            </a:pPr>
+            <a:r>
+              <a:rPr lang="hu-HU" dirty="0"/>
+              <a:t>Eredmények értékelése</a:t>
+            </a:r>
+          </a:p>
+        </p:txBody>
+      </p:sp>
+      <p:sp>
+        <p:nvSpPr>
+          <p:cNvPr id="9" name="Content Placeholder 8"/>
+          <p:cNvSpPr>
+            <a:spLocks noGrp="1"/>
+          </p:cNvSpPr>
+          <p:nvPr>
+            <p:ph sz="half" idx="2"/>
+          </p:nvPr>
+        </p:nvSpPr>
+        <p:spPr>
+          <a:xfrm>
+            <a:off x="117414" y="3783613"/>
+            <a:ext cx="8884346" cy="2586707"/>
+          </a:xfrm>
+        </p:spPr>
+        <p:txBody>
+          <a:bodyPr/>
+          <a:lstStyle/>
+          <a:p>
+            <a:r>
+              <a:rPr lang="hu-HU" dirty="0"/>
+              <a:t>Tesztek ismételt elvégzése, ha megvalósul a</a:t>
+            </a:r>
+          </a:p>
+          <a:p>
+            <a:pPr lvl="1"/>
+            <a:r>
+              <a:rPr lang="hu-HU" dirty="0"/>
+              <a:t>LIKQ</a:t>
+            </a:r>
+          </a:p>
+          <a:p>
+            <a:pPr lvl="1"/>
+            <a:r>
+              <a:rPr lang="hu-HU" dirty="0"/>
+              <a:t>LINQ (több különböző típusú csúcs elérése)</a:t>
+            </a:r>
+          </a:p>
+          <a:p>
+            <a:pPr marL="0" indent="0">
+              <a:buNone/>
+            </a:pPr>
+            <a:r>
+              <a:rPr lang="hu-HU" dirty="0"/>
+              <a:t>támogatása</a:t>
+            </a:r>
+          </a:p>
+          <a:p>
+            <a:endParaRPr lang="hu-HU" dirty="0"/>
+          </a:p>
+        </p:txBody>
+      </p:sp>
+      <p:sp>
+        <p:nvSpPr>
+          <p:cNvPr id="5" name="Slide Number Placeholder 4"/>
           <p:cNvSpPr>
             <a:spLocks noGrp="1"/>
           </p:cNvSpPr>
@@ -41571,188 +44004,7 @@
             <a:fld id="{A7C85712-A09B-4560-9D1E-08050AA835BB}" type="slidenum">
               <a:rPr lang="hu-HU" smtClean="0"/>
               <a:pPr/>
-              <a:t>2</a:t>
-            </a:fld>
-            <a:endParaRPr lang="hu-HU"/>
-          </a:p>
-        </p:txBody>
-      </p:sp>
-      <p:sp>
-        <p:nvSpPr>
-          <p:cNvPr id="3" name="Content Placeholder 2"/>
-          <p:cNvSpPr>
-            <a:spLocks noGrp="1"/>
-          </p:cNvSpPr>
-          <p:nvPr>
-            <p:ph idx="1"/>
-          </p:nvPr>
-        </p:nvSpPr>
-        <p:spPr/>
-        <p:txBody>
-          <a:bodyPr/>
-          <a:lstStyle/>
-          <a:p>
-            <a:pPr lvl="0"/>
-            <a:r>
-              <a:rPr lang="hu-HU"/>
-              <a:t>Train Benchmark ismertetése</a:t>
-            </a:r>
-            <a:endParaRPr lang="hu-HU"/>
-          </a:p>
-          <a:p>
-            <a:pPr lvl="0"/>
-            <a:r>
-              <a:rPr lang="hu-HU"/>
-              <a:t>Implementálása egy választott gráflekérdező rendszerre</a:t>
-            </a:r>
-            <a:endParaRPr lang="hu-HU"/>
-          </a:p>
-          <a:p>
-            <a:pPr lvl="1"/>
-            <a:r>
-              <a:rPr lang="hu-HU"/>
-              <a:t>Graph Engine</a:t>
-            </a:r>
-            <a:endParaRPr lang="hu-HU"/>
-          </a:p>
-          <a:p>
-            <a:pPr lvl="0"/>
-            <a:r>
-              <a:rPr lang="hu-HU"/>
-              <a:t>A választott eszközön való futtatás</a:t>
-            </a:r>
-            <a:endParaRPr lang="hu-HU"/>
-          </a:p>
-          <a:p>
-            <a:pPr lvl="1"/>
-            <a:r>
-              <a:rPr lang="hu-HU"/>
-              <a:t>Jena, RDF4J</a:t>
-            </a:r>
-            <a:endParaRPr lang="hu-HU"/>
-          </a:p>
-          <a:p>
-            <a:pPr lvl="0"/>
-            <a:r>
-              <a:rPr lang="hu-HU"/>
-              <a:t>Két már elkészült eszközön való futtatás</a:t>
-            </a:r>
-            <a:endParaRPr lang="hu-HU"/>
-          </a:p>
-          <a:p>
-            <a:pPr lvl="0"/>
-            <a:r>
-              <a:rPr lang="hu-HU"/>
-              <a:t>Eredmények kiértékelése</a:t>
-            </a:r>
-            <a:endParaRPr lang="hu-HU"/>
-          </a:p>
-          <a:p>
-            <a:pPr lvl="0"/>
-            <a:r>
-              <a:rPr lang="hu-HU"/>
-              <a:t>Konklúzió levonása</a:t>
-            </a:r>
-            <a:endParaRPr lang="hu-HU"/>
-          </a:p>
-        </p:txBody>
-      </p:sp>
-    </p:spTree>
-    <p:extLst>
-      <p:ext uri="{BB962C8B-B14F-4D97-AF65-F5344CB8AC3E}">
-        <p14:creationId xmlns:p14="http://schemas.microsoft.com/office/powerpoint/2010/main" val="1572915044"/>
-      </p:ext>
-    </p:extLst>
-  </p:cSld>
-  <p:clrMapOvr>
-    <a:masterClrMapping/>
-  </p:clrMapOvr>
-</p:sld>
-</file>
-
-<file path=ppt/slides/slide20.xml><?xml version="1.0" encoding="utf-8"?>
-<p:sld xmlns:a="http://schemas.openxmlformats.org/drawingml/2006/main" xmlns:r="http://schemas.openxmlformats.org/officeDocument/2006/relationships" xmlns:p="http://schemas.openxmlformats.org/presentationml/2006/main">
-  <p:cSld>
-    <p:spTree>
-      <p:nvGrpSpPr>
-        <p:cNvPr id="1" name=""/>
-        <p:cNvGrpSpPr/>
-        <p:nvPr/>
-      </p:nvGrpSpPr>
-      <p:grpSpPr>
-        <a:xfrm>
-          <a:off x="0" y="0"/>
-          <a:ext cx="0" cy="0"/>
-          <a:chOff x="0" y="0"/>
-          <a:chExt cx="0" cy="0"/>
-        </a:xfrm>
-      </p:grpSpPr>
-      <p:sp>
-        <p:nvSpPr>
-          <p:cNvPr id="5" name="Title 4">
-            <a:extLst>
-              <a:ext uri="{FF2B5EF4-FFF2-40B4-BE49-F238E27FC236}">
-                <a16:creationId xmlns:a16="http://schemas.microsoft.com/office/drawing/2014/main" id="{6E27A8B2-5A76-455E-AA4D-D0E0FFBBEA5F}"/>
-              </a:ext>
-            </a:extLst>
-          </p:cNvPr>
-          <p:cNvSpPr>
-            <a:spLocks noGrp="1"/>
-          </p:cNvSpPr>
-          <p:nvPr>
-            <p:ph type="title"/>
-          </p:nvPr>
-        </p:nvSpPr>
-        <p:spPr/>
-        <p:txBody>
-          <a:bodyPr/>
-          <a:lstStyle/>
-          <a:p>
-            <a:r>
-              <a:rPr lang="en-US" dirty="0" err="1"/>
-              <a:t>Köszönöm</a:t>
-            </a:r>
-            <a:r>
-              <a:rPr lang="en-US" dirty="0"/>
-              <a:t> a </a:t>
-            </a:r>
-            <a:r>
-              <a:rPr lang="en-US" dirty="0" err="1"/>
-              <a:t>figyelmet</a:t>
-            </a:r>
-            <a:r>
-              <a:rPr lang="en-US" dirty="0"/>
-              <a:t>!</a:t>
-            </a:r>
-            <a:endParaRPr lang="hu-HU" dirty="0"/>
-          </a:p>
-        </p:txBody>
-      </p:sp>
-      <p:sp>
-        <p:nvSpPr>
-          <p:cNvPr id="4" name="Slide Number Placeholder 3">
-            <a:extLst>
-              <a:ext uri="{FF2B5EF4-FFF2-40B4-BE49-F238E27FC236}">
-                <a16:creationId xmlns:a16="http://schemas.microsoft.com/office/drawing/2014/main" id="{44CD9085-5428-4582-AA8F-DD9E0B2716A6}"/>
-              </a:ext>
-            </a:extLst>
-          </p:cNvPr>
-          <p:cNvSpPr>
-            <a:spLocks noGrp="1"/>
-          </p:cNvSpPr>
-          <p:nvPr>
-            <p:ph type="sldNum" sz="quarter" idx="10"/>
-          </p:nvPr>
-        </p:nvSpPr>
-        <p:spPr/>
-        <p:txBody>
-          <a:bodyPr/>
-          <a:lstStyle/>
-          <a:p>
-            <a:fld id="{A7C85712-A09B-4560-9D1E-08050AA835BB}" type="slidenum">
-              <a:rPr lang="hu-HU" smtClean="0"/>
-              <a:pPr/>
-              <a:t>20</a:t>
+              <a:t>24</a:t>
             </a:fld>
             <a:endParaRPr lang="hu-HU"/>
           </a:p>
@@ -41761,7 +44013,7 @@
     </p:spTree>
     <p:extLst>
       <p:ext uri="{BB962C8B-B14F-4D97-AF65-F5344CB8AC3E}">
-        <p14:creationId xmlns:p14="http://schemas.microsoft.com/office/powerpoint/2010/main" val="137895269"/>
+        <p14:creationId xmlns:p14="http://schemas.microsoft.com/office/powerpoint/2010/main" val="2424701595"/>
       </p:ext>
     </p:extLst>
   </p:cSld>
@@ -42485,7 +44737,7 @@
           </p:nvPr>
         </p:nvPicPr>
         <p:blipFill>
-          <a:blip r:embed="rId2"/>
+          <a:blip r:embed="rId3"/>
           <a:stretch>
             <a:fillRect/>
           </a:stretch>
@@ -42542,7 +44794,7 @@
           <p:nvPr/>
         </p:nvPicPr>
         <p:blipFill>
-          <a:blip r:embed="rId3"/>
+          <a:blip r:embed="rId4"/>
           <a:stretch>
             <a:fillRect/>
           </a:stretch>
@@ -42743,10 +44995,10 @@
             <p:nvPr/>
           </p:nvPicPr>
           <p:blipFill>
-            <a:blip r:embed="rId4">
+            <a:blip r:embed="rId5">
               <a:extLst>
                 <a:ext uri="{96DAC541-7B7A-43D3-8B79-37D633B846F1}">
-                  <asvg:svgBlip xmlns:asvg="http://schemas.microsoft.com/office/drawing/2016/SVG/main" r:embed="rId5"/>
+                  <asvg:svgBlip xmlns:asvg="http://schemas.microsoft.com/office/drawing/2016/SVG/main" r:embed="rId6"/>
                 </a:ext>
               </a:extLst>
             </a:blip>
@@ -44135,7 +46387,7 @@
             <p:ph idx="1"/>
             <p:extLst>
               <p:ext uri="{D42A27DB-BD31-4B8C-83A1-F6EECF244321}">
-                <p14:modId xmlns:p14="http://schemas.microsoft.com/office/powerpoint/2010/main" val="584703736"/>
+                <p14:modId xmlns:p14="http://schemas.microsoft.com/office/powerpoint/2010/main" val="3424626830"/>
               </p:ext>
             </p:extLst>
           </p:nvPr>

</xml_diff>